<commit_message>
update: sequence diagram for LaunchMainApp
</commit_message>
<xml_diff>
--- a/docs/diagrams/LaunchMainAppSequenceDiagram.pptx
+++ b/docs/diagrams/LaunchMainAppSequenceDiagram.pptx
@@ -208,7 +208,7 @@
           <a:p>
             <a:fld id="{F5CC4B3F-88C1-4FFA-B1B6-F41C21DC6924}" type="datetimeFigureOut">
               <a:rPr lang="en-US" smtClean="0"/>
-              <a:t>10/27/2018</a:t>
+              <a:t>10/31/2018</a:t>
             </a:fld>
             <a:endParaRPr lang="en-US"/>
           </a:p>
@@ -654,7 +654,7 @@
           <a:p>
             <a:fld id="{78C97017-6FC3-485B-9764-EAC9E56C1D49}" type="datetimeFigureOut">
               <a:rPr lang="en-US" smtClean="0"/>
-              <a:t>10/27/2018</a:t>
+              <a:t>10/31/2018</a:t>
             </a:fld>
             <a:endParaRPr lang="en-US"/>
           </a:p>
@@ -822,7 +822,7 @@
           <a:p>
             <a:fld id="{78C97017-6FC3-485B-9764-EAC9E56C1D49}" type="datetimeFigureOut">
               <a:rPr lang="en-US" smtClean="0"/>
-              <a:t>10/27/2018</a:t>
+              <a:t>10/31/2018</a:t>
             </a:fld>
             <a:endParaRPr lang="en-US"/>
           </a:p>
@@ -1000,7 +1000,7 @@
           <a:p>
             <a:fld id="{78C97017-6FC3-485B-9764-EAC9E56C1D49}" type="datetimeFigureOut">
               <a:rPr lang="en-US" smtClean="0"/>
-              <a:t>10/27/2018</a:t>
+              <a:t>10/31/2018</a:t>
             </a:fld>
             <a:endParaRPr lang="en-US"/>
           </a:p>
@@ -1168,7 +1168,7 @@
           <a:p>
             <a:fld id="{78C97017-6FC3-485B-9764-EAC9E56C1D49}" type="datetimeFigureOut">
               <a:rPr lang="en-US" smtClean="0"/>
-              <a:t>10/27/2018</a:t>
+              <a:t>10/31/2018</a:t>
             </a:fld>
             <a:endParaRPr lang="en-US"/>
           </a:p>
@@ -1413,7 +1413,7 @@
           <a:p>
             <a:fld id="{78C97017-6FC3-485B-9764-EAC9E56C1D49}" type="datetimeFigureOut">
               <a:rPr lang="en-US" smtClean="0"/>
-              <a:t>10/27/2018</a:t>
+              <a:t>10/31/2018</a:t>
             </a:fld>
             <a:endParaRPr lang="en-US"/>
           </a:p>
@@ -1698,7 +1698,7 @@
           <a:p>
             <a:fld id="{78C97017-6FC3-485B-9764-EAC9E56C1D49}" type="datetimeFigureOut">
               <a:rPr lang="en-US" smtClean="0"/>
-              <a:t>10/27/2018</a:t>
+              <a:t>10/31/2018</a:t>
             </a:fld>
             <a:endParaRPr lang="en-US"/>
           </a:p>
@@ -2117,7 +2117,7 @@
           <a:p>
             <a:fld id="{78C97017-6FC3-485B-9764-EAC9E56C1D49}" type="datetimeFigureOut">
               <a:rPr lang="en-US" smtClean="0"/>
-              <a:t>10/27/2018</a:t>
+              <a:t>10/31/2018</a:t>
             </a:fld>
             <a:endParaRPr lang="en-US"/>
           </a:p>
@@ -2234,7 +2234,7 @@
           <a:p>
             <a:fld id="{78C97017-6FC3-485B-9764-EAC9E56C1D49}" type="datetimeFigureOut">
               <a:rPr lang="en-US" smtClean="0"/>
-              <a:t>10/27/2018</a:t>
+              <a:t>10/31/2018</a:t>
             </a:fld>
             <a:endParaRPr lang="en-US"/>
           </a:p>
@@ -2329,7 +2329,7 @@
           <a:p>
             <a:fld id="{78C97017-6FC3-485B-9764-EAC9E56C1D49}" type="datetimeFigureOut">
               <a:rPr lang="en-US" smtClean="0"/>
-              <a:t>10/27/2018</a:t>
+              <a:t>10/31/2018</a:t>
             </a:fld>
             <a:endParaRPr lang="en-US"/>
           </a:p>
@@ -2604,7 +2604,7 @@
           <a:p>
             <a:fld id="{78C97017-6FC3-485B-9764-EAC9E56C1D49}" type="datetimeFigureOut">
               <a:rPr lang="en-US" smtClean="0"/>
-              <a:t>10/27/2018</a:t>
+              <a:t>10/31/2018</a:t>
             </a:fld>
             <a:endParaRPr lang="en-US"/>
           </a:p>
@@ -2856,7 +2856,7 @@
           <a:p>
             <a:fld id="{78C97017-6FC3-485B-9764-EAC9E56C1D49}" type="datetimeFigureOut">
               <a:rPr lang="en-US" smtClean="0"/>
-              <a:t>10/27/2018</a:t>
+              <a:t>10/31/2018</a:t>
             </a:fld>
             <a:endParaRPr lang="en-US"/>
           </a:p>
@@ -3067,7 +3067,7 @@
           <a:p>
             <a:fld id="{78C97017-6FC3-485B-9764-EAC9E56C1D49}" type="datetimeFigureOut">
               <a:rPr lang="en-US" smtClean="0"/>
-              <a:t>10/27/2018</a:t>
+              <a:t>10/31/2018</a:t>
             </a:fld>
             <a:endParaRPr lang="en-US"/>
           </a:p>
@@ -3450,8 +3450,8 @@
         </p:nvSpPr>
         <p:spPr>
           <a:xfrm>
-            <a:off x="-1271993" y="623382"/>
-            <a:ext cx="8919787" cy="4966579"/>
+            <a:off x="-1271993" y="544529"/>
+            <a:ext cx="7862830" cy="4966579"/>
           </a:xfrm>
           <a:prstGeom prst="roundRect">
             <a:avLst>
@@ -3654,208 +3654,6 @@
           </a:p>
         </p:txBody>
       </p:sp>
-      <p:cxnSp>
-        <p:nvCxnSpPr>
-          <p:cNvPr id="25" name="Straight Arrow Connector 24"/>
-          <p:cNvCxnSpPr>
-            <a:cxnSpLocks/>
-          </p:cNvCxnSpPr>
-          <p:nvPr/>
-        </p:nvCxnSpPr>
-        <p:spPr>
-          <a:xfrm>
-            <a:off x="53762" y="2283360"/>
-            <a:ext cx="8117276" cy="7002"/>
-          </a:xfrm>
-          <a:prstGeom prst="straightConnector1">
-            <a:avLst/>
-          </a:prstGeom>
-          <a:ln w="19050">
-            <a:solidFill>
-              <a:srgbClr val="0070C0"/>
-            </a:solidFill>
-            <a:tailEnd type="arrow"/>
-          </a:ln>
-        </p:spPr>
-        <p:style>
-          <a:lnRef idx="1">
-            <a:schemeClr val="accent1"/>
-          </a:lnRef>
-          <a:fillRef idx="0">
-            <a:schemeClr val="accent1"/>
-          </a:fillRef>
-          <a:effectRef idx="0">
-            <a:schemeClr val="accent1"/>
-          </a:effectRef>
-          <a:fontRef idx="minor">
-            <a:schemeClr val="tx1"/>
-          </a:fontRef>
-        </p:style>
-      </p:cxnSp>
-      <p:sp>
-        <p:nvSpPr>
-          <p:cNvPr id="39" name="Rectangle 62"/>
-          <p:cNvSpPr/>
-          <p:nvPr/>
-        </p:nvSpPr>
-        <p:spPr>
-          <a:xfrm>
-            <a:off x="7746485" y="945875"/>
-            <a:ext cx="1030504" cy="346760"/>
-          </a:xfrm>
-          <a:prstGeom prst="rect">
-            <a:avLst/>
-          </a:prstGeom>
-          <a:solidFill>
-            <a:schemeClr val="accent4">
-              <a:lumMod val="60000"/>
-              <a:lumOff val="40000"/>
-            </a:schemeClr>
-          </a:solidFill>
-          <a:ln w="19050">
-            <a:solidFill>
-              <a:schemeClr val="accent4">
-                <a:lumMod val="60000"/>
-                <a:lumOff val="40000"/>
-              </a:schemeClr>
-            </a:solidFill>
-          </a:ln>
-          <a:effectLst/>
-        </p:spPr>
-        <p:style>
-          <a:lnRef idx="1">
-            <a:schemeClr val="accent2"/>
-          </a:lnRef>
-          <a:fillRef idx="2">
-            <a:schemeClr val="accent2"/>
-          </a:fillRef>
-          <a:effectRef idx="1">
-            <a:schemeClr val="accent2"/>
-          </a:effectRef>
-          <a:fontRef idx="minor">
-            <a:schemeClr val="dk1"/>
-          </a:fontRef>
-        </p:style>
-        <p:txBody>
-          <a:bodyPr rtlCol="0" anchor="ctr"/>
-          <a:lstStyle/>
-          <a:p>
-            <a:pPr algn="ctr"/>
-            <a:r>
-              <a:rPr lang="en-US" sz="1600" dirty="0">
-                <a:solidFill>
-                  <a:schemeClr val="bg1"/>
-                </a:solidFill>
-              </a:rPr>
-              <a:t>:File</a:t>
-            </a:r>
-            <a:endParaRPr lang="en-SG" sz="1600" dirty="0">
-              <a:solidFill>
-                <a:schemeClr val="bg1"/>
-              </a:solidFill>
-            </a:endParaRPr>
-          </a:p>
-        </p:txBody>
-      </p:sp>
-      <p:cxnSp>
-        <p:nvCxnSpPr>
-          <p:cNvPr id="71" name="Straight Connector 70"/>
-          <p:cNvCxnSpPr>
-            <a:cxnSpLocks/>
-          </p:cNvCxnSpPr>
-          <p:nvPr/>
-        </p:nvCxnSpPr>
-        <p:spPr>
-          <a:xfrm>
-            <a:off x="8258785" y="1301804"/>
-            <a:ext cx="0" cy="1804867"/>
-          </a:xfrm>
-          <a:prstGeom prst="line">
-            <a:avLst/>
-          </a:prstGeom>
-          <a:ln w="19050">
-            <a:solidFill>
-              <a:schemeClr val="accent4">
-                <a:lumMod val="60000"/>
-                <a:lumOff val="40000"/>
-              </a:schemeClr>
-            </a:solidFill>
-            <a:prstDash val="sysDash"/>
-          </a:ln>
-          <a:effectLst/>
-        </p:spPr>
-        <p:style>
-          <a:lnRef idx="1">
-            <a:schemeClr val="accent1"/>
-          </a:lnRef>
-          <a:fillRef idx="2">
-            <a:schemeClr val="accent1"/>
-          </a:fillRef>
-          <a:effectRef idx="1">
-            <a:schemeClr val="accent1"/>
-          </a:effectRef>
-          <a:fontRef idx="minor">
-            <a:schemeClr val="dk1"/>
-          </a:fontRef>
-        </p:style>
-      </p:cxnSp>
-      <p:sp>
-        <p:nvSpPr>
-          <p:cNvPr id="73" name="Rectangle 72"/>
-          <p:cNvSpPr/>
-          <p:nvPr/>
-        </p:nvSpPr>
-        <p:spPr>
-          <a:xfrm>
-            <a:off x="8160145" y="2273199"/>
-            <a:ext cx="152400" cy="284407"/>
-          </a:xfrm>
-          <a:prstGeom prst="rect">
-            <a:avLst/>
-          </a:prstGeom>
-          <a:solidFill>
-            <a:schemeClr val="accent4">
-              <a:lumMod val="60000"/>
-              <a:lumOff val="40000"/>
-            </a:schemeClr>
-          </a:solidFill>
-          <a:ln>
-            <a:solidFill>
-              <a:schemeClr val="accent4">
-                <a:lumMod val="60000"/>
-                <a:lumOff val="40000"/>
-              </a:schemeClr>
-            </a:solidFill>
-          </a:ln>
-          <a:effectLst/>
-        </p:spPr>
-        <p:style>
-          <a:lnRef idx="1">
-            <a:schemeClr val="accent3"/>
-          </a:lnRef>
-          <a:fillRef idx="2">
-            <a:schemeClr val="accent3"/>
-          </a:fillRef>
-          <a:effectRef idx="1">
-            <a:schemeClr val="accent3"/>
-          </a:effectRef>
-          <a:fontRef idx="minor">
-            <a:schemeClr val="dk1"/>
-          </a:fontRef>
-        </p:style>
-        <p:txBody>
-          <a:bodyPr rtlCol="0" anchor="ctr"/>
-          <a:lstStyle/>
-          <a:p>
-            <a:pPr algn="ctr"/>
-            <a:endParaRPr lang="en-SG" sz="1400">
-              <a:solidFill>
-                <a:schemeClr val="dk1"/>
-              </a:solidFill>
-            </a:endParaRPr>
-          </a:p>
-        </p:txBody>
-      </p:sp>
       <p:sp>
         <p:nvSpPr>
           <p:cNvPr id="67" name="Rectangle 66">
@@ -3911,10 +3709,10 @@
       </p:sp>
       <p:sp>
         <p:nvSpPr>
-          <p:cNvPr id="68" name="TextBox 67">
+          <p:cNvPr id="60" name="TextBox 59">
             <a:extLst>
               <a:ext uri="{FF2B5EF4-FFF2-40B4-BE49-F238E27FC236}">
-                <a16:creationId xmlns:a16="http://schemas.microsoft.com/office/drawing/2014/main" id="{D1B49E7A-3D28-4F42-8CA1-50945DE783FE}"/>
+                <a16:creationId xmlns:a16="http://schemas.microsoft.com/office/drawing/2014/main" id="{95F113B2-7CB2-4F0B-BCA7-EAFC23FCD2D6}"/>
               </a:ext>
             </a:extLst>
           </p:cNvPr>
@@ -3923,16 +3721,13 @@
         </p:nvSpPr>
         <p:spPr>
           <a:xfrm>
-            <a:off x="11895" y="2010619"/>
-            <a:ext cx="1920299" cy="184666"/>
+            <a:off x="451406" y="1734177"/>
+            <a:ext cx="1767759" cy="184666"/>
           </a:xfrm>
           <a:prstGeom prst="rect">
             <a:avLst/>
           </a:prstGeom>
           <a:noFill/>
-          <a:ln>
-            <a:noFill/>
-          </a:ln>
         </p:spPr>
         <p:txBody>
           <a:bodyPr wrap="square" lIns="0" tIns="0" rIns="0" bIns="0" rtlCol="0">
@@ -3952,1336 +3747,12 @@
           </a:lstStyle>
           <a:p>
             <a:r>
-              <a:rPr lang="en-US" sz="1200" dirty="0">
-                <a:solidFill>
-                  <a:srgbClr val="FF0000"/>
-                </a:solidFill>
-              </a:rPr>
-              <a:t>[!</a:t>
-            </a:r>
-            <a:r>
-              <a:rPr lang="en-US" sz="1200" dirty="0" err="1">
-                <a:solidFill>
-                  <a:srgbClr val="FF0000"/>
-                </a:solidFill>
-              </a:rPr>
-              <a:t>checkFileExist.exists</a:t>
-            </a:r>
-            <a:r>
-              <a:rPr lang="en-US" sz="1200" dirty="0">
-                <a:solidFill>
-                  <a:srgbClr val="FF0000"/>
-                </a:solidFill>
-              </a:rPr>
-              <a:t>()]</a:t>
-            </a:r>
-          </a:p>
-        </p:txBody>
-      </p:sp>
-      <p:sp>
-        <p:nvSpPr>
-          <p:cNvPr id="87" name="Freeform: Shape 86">
-            <a:extLst>
-              <a:ext uri="{FF2B5EF4-FFF2-40B4-BE49-F238E27FC236}">
-                <a16:creationId xmlns:a16="http://schemas.microsoft.com/office/drawing/2014/main" id="{117DA5C8-3AFA-4783-A847-BC75A4788F63}"/>
-              </a:ext>
-            </a:extLst>
-          </p:cNvPr>
-          <p:cNvSpPr/>
-          <p:nvPr/>
-        </p:nvSpPr>
-        <p:spPr>
-          <a:xfrm>
-            <a:off x="270572" y="2294948"/>
-            <a:ext cx="137997" cy="140367"/>
-          </a:xfrm>
-          <a:custGeom>
-            <a:avLst/>
-            <a:gdLst>
-              <a:gd name="connsiteX0" fmla="*/ 0 w 181569"/>
-              <a:gd name="connsiteY0" fmla="*/ 48189 h 136841"/>
-              <a:gd name="connsiteX1" fmla="*/ 76200 w 181569"/>
-              <a:gd name="connsiteY1" fmla="*/ 564 h 136841"/>
-              <a:gd name="connsiteX2" fmla="*/ 180975 w 181569"/>
-              <a:gd name="connsiteY2" fmla="*/ 76764 h 136841"/>
-              <a:gd name="connsiteX3" fmla="*/ 114300 w 181569"/>
-              <a:gd name="connsiteY3" fmla="*/ 133914 h 136841"/>
-              <a:gd name="connsiteX4" fmla="*/ 19050 w 181569"/>
-              <a:gd name="connsiteY4" fmla="*/ 133914 h 136841"/>
-            </a:gdLst>
-            <a:ahLst/>
-            <a:cxnLst>
-              <a:cxn ang="0">
-                <a:pos x="connsiteX0" y="connsiteY0"/>
-              </a:cxn>
-              <a:cxn ang="0">
-                <a:pos x="connsiteX1" y="connsiteY1"/>
-              </a:cxn>
-              <a:cxn ang="0">
-                <a:pos x="connsiteX2" y="connsiteY2"/>
-              </a:cxn>
-              <a:cxn ang="0">
-                <a:pos x="connsiteX3" y="connsiteY3"/>
-              </a:cxn>
-              <a:cxn ang="0">
-                <a:pos x="connsiteX4" y="connsiteY4"/>
-              </a:cxn>
-            </a:cxnLst>
-            <a:rect l="l" t="t" r="r" b="b"/>
-            <a:pathLst>
-              <a:path w="181569" h="136841">
-                <a:moveTo>
-                  <a:pt x="0" y="48189"/>
-                </a:moveTo>
-                <a:cubicBezTo>
-                  <a:pt x="23019" y="21995"/>
-                  <a:pt x="46038" y="-4199"/>
-                  <a:pt x="76200" y="564"/>
-                </a:cubicBezTo>
-                <a:cubicBezTo>
-                  <a:pt x="106363" y="5326"/>
-                  <a:pt x="174625" y="54539"/>
-                  <a:pt x="180975" y="76764"/>
-                </a:cubicBezTo>
-                <a:cubicBezTo>
-                  <a:pt x="187325" y="98989"/>
-                  <a:pt x="141287" y="124389"/>
-                  <a:pt x="114300" y="133914"/>
-                </a:cubicBezTo>
-                <a:cubicBezTo>
-                  <a:pt x="87313" y="143439"/>
-                  <a:pt x="28575" y="125977"/>
-                  <a:pt x="19050" y="133914"/>
-                </a:cubicBezTo>
-              </a:path>
-            </a:pathLst>
-          </a:custGeom>
-          <a:ln>
-            <a:solidFill>
-              <a:srgbClr val="0070C0"/>
-            </a:solidFill>
-            <a:prstDash val="solid"/>
-            <a:tailEnd type="triangle"/>
-          </a:ln>
-        </p:spPr>
-        <p:style>
-          <a:lnRef idx="1">
-            <a:schemeClr val="accent1"/>
-          </a:lnRef>
-          <a:fillRef idx="0">
-            <a:schemeClr val="accent1"/>
-          </a:fillRef>
-          <a:effectRef idx="0">
-            <a:schemeClr val="accent1"/>
-          </a:effectRef>
-          <a:fontRef idx="minor">
-            <a:schemeClr val="tx1"/>
-          </a:fontRef>
-        </p:style>
-        <p:txBody>
-          <a:bodyPr rot="0" spcFirstLastPara="0" vertOverflow="overflow" horzOverflow="overflow" vert="horz" wrap="square" lIns="91440" tIns="45720" rIns="91440" bIns="45720" numCol="1" spcCol="0" rtlCol="0" fromWordArt="0" anchor="ctr" anchorCtr="0" forceAA="0" compatLnSpc="1">
-            <a:prstTxWarp prst="textNoShape">
-              <a:avLst/>
-            </a:prstTxWarp>
-            <a:noAutofit/>
-          </a:bodyPr>
-          <a:lstStyle/>
-          <a:p>
-            <a:pPr algn="ctr"/>
-            <a:endParaRPr lang="en-SG">
-              <a:solidFill>
-                <a:schemeClr val="tx1"/>
-              </a:solidFill>
-            </a:endParaRPr>
-          </a:p>
-        </p:txBody>
-      </p:sp>
-      <p:sp>
-        <p:nvSpPr>
-          <p:cNvPr id="95" name="TextBox 94">
-            <a:extLst>
-              <a:ext uri="{FF2B5EF4-FFF2-40B4-BE49-F238E27FC236}">
-                <a16:creationId xmlns:a16="http://schemas.microsoft.com/office/drawing/2014/main" id="{78209A16-1650-4EF3-BABC-52F82413D6F1}"/>
-              </a:ext>
-            </a:extLst>
-          </p:cNvPr>
-          <p:cNvSpPr txBox="1"/>
-          <p:nvPr/>
-        </p:nvSpPr>
-        <p:spPr>
-          <a:xfrm>
-            <a:off x="431009" y="3143884"/>
-            <a:ext cx="3570753" cy="184666"/>
-          </a:xfrm>
-          <a:prstGeom prst="rect">
-            <a:avLst/>
-          </a:prstGeom>
-          <a:noFill/>
-        </p:spPr>
-        <p:txBody>
-          <a:bodyPr wrap="square" lIns="0" tIns="0" rIns="0" bIns="0" rtlCol="0">
-            <a:spAutoFit/>
-          </a:bodyPr>
-          <a:lstStyle>
-            <a:defPPr>
-              <a:defRPr lang="en-US"/>
-            </a:defPPr>
-            <a:lvl1pPr algn="r">
-              <a:defRPr sz="1400">
-                <a:solidFill>
-                  <a:srgbClr val="0070C0"/>
-                </a:solidFill>
-              </a:defRPr>
-            </a:lvl1pPr>
-          </a:lstStyle>
-          <a:p>
-            <a:r>
               <a:rPr lang="en-US" sz="1200" dirty="0" err="1"/>
-              <a:t>FirstDayCommand.retrieveRangeOfWeeks</a:t>
-            </a:r>
-            <a:r>
-              <a:rPr lang="en-US" sz="1200" dirty="0"/>
-              <a:t>(</a:t>
-            </a:r>
-            <a:r>
-              <a:rPr lang="en-US" sz="1200" dirty="0" err="1"/>
-              <a:t>rangeOfWeek</a:t>
-            </a:r>
-            <a:r>
-              <a:rPr lang="en-US" sz="1200" dirty="0"/>
-              <a:t>)</a:t>
-            </a:r>
-          </a:p>
-        </p:txBody>
-      </p:sp>
-      <p:sp>
-        <p:nvSpPr>
-          <p:cNvPr id="47" name="Rectangle 46">
-            <a:extLst>
-              <a:ext uri="{FF2B5EF4-FFF2-40B4-BE49-F238E27FC236}">
-                <a16:creationId xmlns:a16="http://schemas.microsoft.com/office/drawing/2014/main" id="{985CF529-AE4A-4508-871D-5AD4A898EC37}"/>
-              </a:ext>
-            </a:extLst>
-          </p:cNvPr>
-          <p:cNvSpPr/>
-          <p:nvPr/>
-        </p:nvSpPr>
-        <p:spPr>
-          <a:xfrm>
-            <a:off x="-514978" y="1985344"/>
-            <a:ext cx="9201773" cy="857120"/>
-          </a:xfrm>
-          <a:prstGeom prst="rect">
-            <a:avLst/>
-          </a:prstGeom>
-          <a:noFill/>
-          <a:ln w="3175">
-            <a:solidFill>
-              <a:srgbClr val="FF0000"/>
-            </a:solidFill>
-          </a:ln>
-        </p:spPr>
-        <p:style>
-          <a:lnRef idx="2">
-            <a:schemeClr val="dk1"/>
-          </a:lnRef>
-          <a:fillRef idx="1">
-            <a:schemeClr val="lt1"/>
-          </a:fillRef>
-          <a:effectRef idx="0">
-            <a:schemeClr val="dk1"/>
-          </a:effectRef>
-          <a:fontRef idx="minor">
-            <a:schemeClr val="dk1"/>
-          </a:fontRef>
-        </p:style>
-        <p:txBody>
-          <a:bodyPr rtlCol="0" anchor="ctr"/>
-          <a:lstStyle/>
-          <a:p>
-            <a:pPr algn="ctr"/>
-            <a:endParaRPr lang="en-SG">
-              <a:solidFill>
-                <a:srgbClr val="FF0000"/>
-              </a:solidFill>
-            </a:endParaRPr>
-          </a:p>
-        </p:txBody>
-      </p:sp>
-      <p:sp>
-        <p:nvSpPr>
-          <p:cNvPr id="48" name="Rectangle: Single Corner Snipped 47">
-            <a:extLst>
-              <a:ext uri="{FF2B5EF4-FFF2-40B4-BE49-F238E27FC236}">
-                <a16:creationId xmlns:a16="http://schemas.microsoft.com/office/drawing/2014/main" id="{AAF06A3A-6DDA-4C0C-8AAF-F7BF6557D27B}"/>
-              </a:ext>
-            </a:extLst>
-          </p:cNvPr>
-          <p:cNvSpPr/>
-          <p:nvPr/>
-        </p:nvSpPr>
-        <p:spPr>
-          <a:xfrm flipV="1">
-            <a:off x="-507491" y="1987600"/>
-            <a:ext cx="278891" cy="160962"/>
-          </a:xfrm>
-          <a:prstGeom prst="snip1Rect">
-            <a:avLst/>
-          </a:prstGeom>
-          <a:noFill/>
-          <a:ln w="3175">
-            <a:solidFill>
-              <a:srgbClr val="FF0000"/>
-            </a:solidFill>
-          </a:ln>
-        </p:spPr>
-        <p:style>
-          <a:lnRef idx="2">
-            <a:schemeClr val="dk1"/>
-          </a:lnRef>
-          <a:fillRef idx="1">
-            <a:schemeClr val="lt1"/>
-          </a:fillRef>
-          <a:effectRef idx="0">
-            <a:schemeClr val="dk1"/>
-          </a:effectRef>
-          <a:fontRef idx="minor">
-            <a:schemeClr val="dk1"/>
-          </a:fontRef>
-        </p:style>
-        <p:txBody>
-          <a:bodyPr rot="0" spcFirstLastPara="0" vertOverflow="overflow" horzOverflow="overflow" vert="horz" wrap="square" lIns="91440" tIns="45720" rIns="91440" bIns="45720" numCol="1" spcCol="0" rtlCol="0" fromWordArt="0" anchor="ctr" anchorCtr="0" forceAA="0" compatLnSpc="1">
-            <a:prstTxWarp prst="textNoShape">
-              <a:avLst/>
-            </a:prstTxWarp>
-            <a:noAutofit/>
-          </a:bodyPr>
-          <a:lstStyle/>
-          <a:p>
-            <a:pPr algn="ctr"/>
-            <a:endParaRPr lang="en-SG" sz="1200" dirty="0">
-              <a:solidFill>
-                <a:schemeClr val="dk1"/>
-              </a:solidFill>
-            </a:endParaRPr>
-          </a:p>
-        </p:txBody>
-      </p:sp>
-      <p:sp>
-        <p:nvSpPr>
-          <p:cNvPr id="52" name="TextBox 51">
-            <a:extLst>
-              <a:ext uri="{FF2B5EF4-FFF2-40B4-BE49-F238E27FC236}">
-                <a16:creationId xmlns:a16="http://schemas.microsoft.com/office/drawing/2014/main" id="{EBC244DB-03E9-4507-8FCF-4EF0AEA2CB7C}"/>
-              </a:ext>
-            </a:extLst>
-          </p:cNvPr>
-          <p:cNvSpPr txBox="1"/>
-          <p:nvPr/>
-        </p:nvSpPr>
-        <p:spPr>
-          <a:xfrm>
-            <a:off x="-651862" y="1987600"/>
-            <a:ext cx="339358" cy="153888"/>
-          </a:xfrm>
-          <a:prstGeom prst="rect">
-            <a:avLst/>
-          </a:prstGeom>
-          <a:noFill/>
-        </p:spPr>
-        <p:txBody>
-          <a:bodyPr wrap="square" lIns="0" tIns="0" rIns="0" bIns="0" rtlCol="0">
-            <a:spAutoFit/>
-          </a:bodyPr>
-          <a:lstStyle/>
-          <a:p>
-            <a:pPr algn="r"/>
-            <a:r>
-              <a:rPr lang="en-US" sz="1000" dirty="0">
-                <a:solidFill>
-                  <a:srgbClr val="FF0000"/>
-                </a:solidFill>
-              </a:rPr>
-              <a:t>alt</a:t>
-            </a:r>
-          </a:p>
-        </p:txBody>
-      </p:sp>
-      <p:sp>
-        <p:nvSpPr>
-          <p:cNvPr id="54" name="TextBox 53">
-            <a:extLst>
-              <a:ext uri="{FF2B5EF4-FFF2-40B4-BE49-F238E27FC236}">
-                <a16:creationId xmlns:a16="http://schemas.microsoft.com/office/drawing/2014/main" id="{AD55A3F2-FD8A-4F4C-A636-EC1D378CDDCD}"/>
-              </a:ext>
-            </a:extLst>
-          </p:cNvPr>
-          <p:cNvSpPr txBox="1"/>
-          <p:nvPr/>
-        </p:nvSpPr>
-        <p:spPr>
-          <a:xfrm>
-            <a:off x="326572" y="3985060"/>
-            <a:ext cx="7198060" cy="184666"/>
-          </a:xfrm>
-          <a:prstGeom prst="rect">
-            <a:avLst/>
-          </a:prstGeom>
-          <a:noFill/>
-        </p:spPr>
-        <p:txBody>
-          <a:bodyPr wrap="square" lIns="0" tIns="0" rIns="0" bIns="0" rtlCol="0">
-            <a:spAutoFit/>
-          </a:bodyPr>
-          <a:lstStyle>
-            <a:defPPr>
-              <a:defRPr lang="en-US"/>
-            </a:defPPr>
-            <a:lvl1pPr algn="r">
-              <a:defRPr sz="1400">
-                <a:solidFill>
-                  <a:srgbClr val="0070C0"/>
-                </a:solidFill>
-              </a:defRPr>
-            </a:lvl1pPr>
-          </a:lstStyle>
-          <a:p>
-            <a:r>
-              <a:rPr lang="en-US" sz="1200" dirty="0" err="1"/>
-              <a:t>updateConfig.setAppTitle</a:t>
-            </a:r>
-            <a:r>
-              <a:rPr lang="en-US" sz="1200" dirty="0"/>
-              <a:t>(“Schedule Planner” + “ – ” + </a:t>
-            </a:r>
-            <a:r>
-              <a:rPr lang="en-US" sz="1200" dirty="0" err="1"/>
-              <a:t>FirstDayCommand.retrieveWeekDescription</a:t>
-            </a:r>
-            <a:r>
-              <a:rPr lang="en-US" sz="1200" dirty="0"/>
-              <a:t>(</a:t>
-            </a:r>
-            <a:r>
-              <a:rPr lang="en-US" sz="1200" dirty="0" err="1"/>
-              <a:t>rangeOfWeek</a:t>
-            </a:r>
-            <a:r>
-              <a:rPr lang="en-US" sz="1200" dirty="0"/>
-              <a:t>))</a:t>
-            </a:r>
-          </a:p>
-        </p:txBody>
-      </p:sp>
-      <p:sp>
-        <p:nvSpPr>
-          <p:cNvPr id="60" name="TextBox 59">
-            <a:extLst>
-              <a:ext uri="{FF2B5EF4-FFF2-40B4-BE49-F238E27FC236}">
-                <a16:creationId xmlns:a16="http://schemas.microsoft.com/office/drawing/2014/main" id="{95F113B2-7CB2-4F0B-BCA7-EAFC23FCD2D6}"/>
-              </a:ext>
-            </a:extLst>
-          </p:cNvPr>
-          <p:cNvSpPr txBox="1"/>
-          <p:nvPr/>
-        </p:nvSpPr>
-        <p:spPr>
-          <a:xfrm>
-            <a:off x="342801" y="2333081"/>
-            <a:ext cx="2019399" cy="185831"/>
-          </a:xfrm>
-          <a:prstGeom prst="rect">
-            <a:avLst/>
-          </a:prstGeom>
-          <a:noFill/>
-        </p:spPr>
-        <p:txBody>
-          <a:bodyPr wrap="square" lIns="0" tIns="0" rIns="0" bIns="0" rtlCol="0">
-            <a:spAutoFit/>
-          </a:bodyPr>
-          <a:lstStyle>
-            <a:defPPr>
-              <a:defRPr lang="en-US"/>
-            </a:defPPr>
-            <a:lvl1pPr algn="r">
-              <a:defRPr sz="1400">
-                <a:solidFill>
-                  <a:srgbClr val="0070C0"/>
-                </a:solidFill>
-              </a:defRPr>
-            </a:lvl1pPr>
-          </a:lstStyle>
-          <a:p>
-            <a:r>
-              <a:rPr lang="en-US" sz="1200" dirty="0" err="1"/>
-              <a:t>checkFileExist.createNewFile</a:t>
+              <a:t>createDefaultFileIfNotExist</a:t>
             </a:r>
             <a:r>
               <a:rPr lang="en-US" sz="1200" dirty="0"/>
               <a:t>()</a:t>
-            </a:r>
-          </a:p>
-        </p:txBody>
-      </p:sp>
-      <p:sp>
-        <p:nvSpPr>
-          <p:cNvPr id="62" name="TextBox 61">
-            <a:extLst>
-              <a:ext uri="{FF2B5EF4-FFF2-40B4-BE49-F238E27FC236}">
-                <a16:creationId xmlns:a16="http://schemas.microsoft.com/office/drawing/2014/main" id="{2641264C-00C3-46AA-81E3-728E70F30649}"/>
-              </a:ext>
-            </a:extLst>
-          </p:cNvPr>
-          <p:cNvSpPr txBox="1"/>
-          <p:nvPr/>
-        </p:nvSpPr>
-        <p:spPr>
-          <a:xfrm>
-            <a:off x="381000" y="2609839"/>
-            <a:ext cx="6934200" cy="184666"/>
-          </a:xfrm>
-          <a:prstGeom prst="rect">
-            <a:avLst/>
-          </a:prstGeom>
-          <a:noFill/>
-        </p:spPr>
-        <p:txBody>
-          <a:bodyPr wrap="square" lIns="0" tIns="0" rIns="0" bIns="0" rtlCol="0">
-            <a:spAutoFit/>
-          </a:bodyPr>
-          <a:lstStyle>
-            <a:defPPr>
-              <a:defRPr lang="en-US"/>
-            </a:defPPr>
-            <a:lvl1pPr algn="r">
-              <a:defRPr sz="1400">
-                <a:solidFill>
-                  <a:srgbClr val="0070C0"/>
-                </a:solidFill>
-              </a:defRPr>
-            </a:lvl1pPr>
-          </a:lstStyle>
-          <a:p>
-            <a:r>
-              <a:rPr lang="en-US" sz="1200" dirty="0" err="1"/>
-              <a:t>FirstDayCommand.saveRangeOfWeeks</a:t>
-            </a:r>
-            <a:r>
-              <a:rPr lang="en-US" sz="1200" dirty="0"/>
-              <a:t>(</a:t>
-            </a:r>
-            <a:r>
-              <a:rPr lang="en-US" sz="1200" dirty="0" err="1"/>
-              <a:t>FirstDayCommand.computeRangeOfWeeks</a:t>
-            </a:r>
-            <a:r>
-              <a:rPr lang="en-US" sz="1200" dirty="0"/>
-              <a:t>(DEFAULT_MONDAY_DATE))</a:t>
-            </a:r>
-          </a:p>
-        </p:txBody>
-      </p:sp>
-      <p:sp>
-        <p:nvSpPr>
-          <p:cNvPr id="69" name="Rectangle 68">
-            <a:extLst>
-              <a:ext uri="{FF2B5EF4-FFF2-40B4-BE49-F238E27FC236}">
-                <a16:creationId xmlns:a16="http://schemas.microsoft.com/office/drawing/2014/main" id="{E0EAE964-4CE1-4FCE-BA65-F3DD8294BFC0}"/>
-              </a:ext>
-            </a:extLst>
-          </p:cNvPr>
-          <p:cNvSpPr/>
-          <p:nvPr/>
-        </p:nvSpPr>
-        <p:spPr>
-          <a:xfrm>
-            <a:off x="107154" y="2357478"/>
-            <a:ext cx="178248" cy="184666"/>
-          </a:xfrm>
-          <a:prstGeom prst="rect">
-            <a:avLst/>
-          </a:prstGeom>
-          <a:solidFill>
-            <a:srgbClr val="0070C0"/>
-          </a:solidFill>
-          <a:ln>
-            <a:solidFill>
-              <a:schemeClr val="tx1"/>
-            </a:solidFill>
-          </a:ln>
-          <a:effectLst/>
-        </p:spPr>
-        <p:style>
-          <a:lnRef idx="1">
-            <a:schemeClr val="accent3"/>
-          </a:lnRef>
-          <a:fillRef idx="2">
-            <a:schemeClr val="accent3"/>
-          </a:fillRef>
-          <a:effectRef idx="1">
-            <a:schemeClr val="accent3"/>
-          </a:effectRef>
-          <a:fontRef idx="minor">
-            <a:schemeClr val="dk1"/>
-          </a:fontRef>
-        </p:style>
-        <p:txBody>
-          <a:bodyPr rtlCol="0" anchor="ctr"/>
-          <a:lstStyle/>
-          <a:p>
-            <a:pPr algn="ctr"/>
-            <a:endParaRPr lang="en-SG" sz="1400" dirty="0"/>
-          </a:p>
-        </p:txBody>
-      </p:sp>
-      <p:sp>
-        <p:nvSpPr>
-          <p:cNvPr id="70" name="Freeform: Shape 69">
-            <a:extLst>
-              <a:ext uri="{FF2B5EF4-FFF2-40B4-BE49-F238E27FC236}">
-                <a16:creationId xmlns:a16="http://schemas.microsoft.com/office/drawing/2014/main" id="{5243C70D-4911-439C-A091-5423ACB500C8}"/>
-              </a:ext>
-            </a:extLst>
-          </p:cNvPr>
-          <p:cNvSpPr/>
-          <p:nvPr/>
-        </p:nvSpPr>
-        <p:spPr>
-          <a:xfrm>
-            <a:off x="294936" y="2606080"/>
-            <a:ext cx="137997" cy="140367"/>
-          </a:xfrm>
-          <a:custGeom>
-            <a:avLst/>
-            <a:gdLst>
-              <a:gd name="connsiteX0" fmla="*/ 0 w 181569"/>
-              <a:gd name="connsiteY0" fmla="*/ 48189 h 136841"/>
-              <a:gd name="connsiteX1" fmla="*/ 76200 w 181569"/>
-              <a:gd name="connsiteY1" fmla="*/ 564 h 136841"/>
-              <a:gd name="connsiteX2" fmla="*/ 180975 w 181569"/>
-              <a:gd name="connsiteY2" fmla="*/ 76764 h 136841"/>
-              <a:gd name="connsiteX3" fmla="*/ 114300 w 181569"/>
-              <a:gd name="connsiteY3" fmla="*/ 133914 h 136841"/>
-              <a:gd name="connsiteX4" fmla="*/ 19050 w 181569"/>
-              <a:gd name="connsiteY4" fmla="*/ 133914 h 136841"/>
-            </a:gdLst>
-            <a:ahLst/>
-            <a:cxnLst>
-              <a:cxn ang="0">
-                <a:pos x="connsiteX0" y="connsiteY0"/>
-              </a:cxn>
-              <a:cxn ang="0">
-                <a:pos x="connsiteX1" y="connsiteY1"/>
-              </a:cxn>
-              <a:cxn ang="0">
-                <a:pos x="connsiteX2" y="connsiteY2"/>
-              </a:cxn>
-              <a:cxn ang="0">
-                <a:pos x="connsiteX3" y="connsiteY3"/>
-              </a:cxn>
-              <a:cxn ang="0">
-                <a:pos x="connsiteX4" y="connsiteY4"/>
-              </a:cxn>
-            </a:cxnLst>
-            <a:rect l="l" t="t" r="r" b="b"/>
-            <a:pathLst>
-              <a:path w="181569" h="136841">
-                <a:moveTo>
-                  <a:pt x="0" y="48189"/>
-                </a:moveTo>
-                <a:cubicBezTo>
-                  <a:pt x="23019" y="21995"/>
-                  <a:pt x="46038" y="-4199"/>
-                  <a:pt x="76200" y="564"/>
-                </a:cubicBezTo>
-                <a:cubicBezTo>
-                  <a:pt x="106363" y="5326"/>
-                  <a:pt x="174625" y="54539"/>
-                  <a:pt x="180975" y="76764"/>
-                </a:cubicBezTo>
-                <a:cubicBezTo>
-                  <a:pt x="187325" y="98989"/>
-                  <a:pt x="141287" y="124389"/>
-                  <a:pt x="114300" y="133914"/>
-                </a:cubicBezTo>
-                <a:cubicBezTo>
-                  <a:pt x="87313" y="143439"/>
-                  <a:pt x="28575" y="125977"/>
-                  <a:pt x="19050" y="133914"/>
-                </a:cubicBezTo>
-              </a:path>
-            </a:pathLst>
-          </a:custGeom>
-          <a:ln>
-            <a:solidFill>
-              <a:srgbClr val="0070C0"/>
-            </a:solidFill>
-            <a:prstDash val="solid"/>
-            <a:tailEnd type="triangle"/>
-          </a:ln>
-        </p:spPr>
-        <p:style>
-          <a:lnRef idx="1">
-            <a:schemeClr val="accent1"/>
-          </a:lnRef>
-          <a:fillRef idx="0">
-            <a:schemeClr val="accent1"/>
-          </a:fillRef>
-          <a:effectRef idx="0">
-            <a:schemeClr val="accent1"/>
-          </a:effectRef>
-          <a:fontRef idx="minor">
-            <a:schemeClr val="tx1"/>
-          </a:fontRef>
-        </p:style>
-        <p:txBody>
-          <a:bodyPr rot="0" spcFirstLastPara="0" vertOverflow="overflow" horzOverflow="overflow" vert="horz" wrap="square" lIns="91440" tIns="45720" rIns="91440" bIns="45720" numCol="1" spcCol="0" rtlCol="0" fromWordArt="0" anchor="ctr" anchorCtr="0" forceAA="0" compatLnSpc="1">
-            <a:prstTxWarp prst="textNoShape">
-              <a:avLst/>
-            </a:prstTxWarp>
-            <a:noAutofit/>
-          </a:bodyPr>
-          <a:lstStyle/>
-          <a:p>
-            <a:pPr algn="ctr"/>
-            <a:endParaRPr lang="en-SG">
-              <a:solidFill>
-                <a:schemeClr val="tx1"/>
-              </a:solidFill>
-            </a:endParaRPr>
-          </a:p>
-        </p:txBody>
-      </p:sp>
-      <p:sp>
-        <p:nvSpPr>
-          <p:cNvPr id="72" name="Rectangle 71">
-            <a:extLst>
-              <a:ext uri="{FF2B5EF4-FFF2-40B4-BE49-F238E27FC236}">
-                <a16:creationId xmlns:a16="http://schemas.microsoft.com/office/drawing/2014/main" id="{E6B9EF1F-2897-4603-91A8-10A66CE1C260}"/>
-              </a:ext>
-            </a:extLst>
-          </p:cNvPr>
-          <p:cNvSpPr/>
-          <p:nvPr/>
-        </p:nvSpPr>
-        <p:spPr>
-          <a:xfrm>
-            <a:off x="107154" y="2600444"/>
-            <a:ext cx="178248" cy="184666"/>
-          </a:xfrm>
-          <a:prstGeom prst="rect">
-            <a:avLst/>
-          </a:prstGeom>
-          <a:solidFill>
-            <a:srgbClr val="0070C0"/>
-          </a:solidFill>
-          <a:ln>
-            <a:solidFill>
-              <a:schemeClr val="tx1"/>
-            </a:solidFill>
-          </a:ln>
-          <a:effectLst/>
-        </p:spPr>
-        <p:style>
-          <a:lnRef idx="1">
-            <a:schemeClr val="accent3"/>
-          </a:lnRef>
-          <a:fillRef idx="2">
-            <a:schemeClr val="accent3"/>
-          </a:fillRef>
-          <a:effectRef idx="1">
-            <a:schemeClr val="accent3"/>
-          </a:effectRef>
-          <a:fontRef idx="minor">
-            <a:schemeClr val="dk1"/>
-          </a:fontRef>
-        </p:style>
-        <p:txBody>
-          <a:bodyPr rtlCol="0" anchor="ctr"/>
-          <a:lstStyle/>
-          <a:p>
-            <a:pPr algn="ctr"/>
-            <a:endParaRPr lang="en-SG" sz="1400" dirty="0"/>
-          </a:p>
-        </p:txBody>
-      </p:sp>
-      <p:sp>
-        <p:nvSpPr>
-          <p:cNvPr id="74" name="Rectangle 73">
-            <a:extLst>
-              <a:ext uri="{FF2B5EF4-FFF2-40B4-BE49-F238E27FC236}">
-                <a16:creationId xmlns:a16="http://schemas.microsoft.com/office/drawing/2014/main" id="{44969846-FCEF-477A-8F11-6D9103A0CA6A}"/>
-              </a:ext>
-            </a:extLst>
-          </p:cNvPr>
-          <p:cNvSpPr/>
-          <p:nvPr/>
-        </p:nvSpPr>
-        <p:spPr>
-          <a:xfrm>
-            <a:off x="102703" y="3204081"/>
-            <a:ext cx="179788" cy="228550"/>
-          </a:xfrm>
-          <a:prstGeom prst="rect">
-            <a:avLst/>
-          </a:prstGeom>
-          <a:solidFill>
-            <a:srgbClr val="0070C0"/>
-          </a:solidFill>
-          <a:ln>
-            <a:solidFill>
-              <a:schemeClr val="tx1"/>
-            </a:solidFill>
-          </a:ln>
-          <a:effectLst/>
-        </p:spPr>
-        <p:style>
-          <a:lnRef idx="1">
-            <a:schemeClr val="accent3"/>
-          </a:lnRef>
-          <a:fillRef idx="2">
-            <a:schemeClr val="accent3"/>
-          </a:fillRef>
-          <a:effectRef idx="1">
-            <a:schemeClr val="accent3"/>
-          </a:effectRef>
-          <a:fontRef idx="minor">
-            <a:schemeClr val="dk1"/>
-          </a:fontRef>
-        </p:style>
-        <p:txBody>
-          <a:bodyPr rtlCol="0" anchor="ctr"/>
-          <a:lstStyle/>
-          <a:p>
-            <a:pPr algn="ctr"/>
-            <a:endParaRPr lang="en-SG" sz="1400" dirty="0"/>
-          </a:p>
-        </p:txBody>
-      </p:sp>
-      <p:sp>
-        <p:nvSpPr>
-          <p:cNvPr id="79" name="Freeform: Shape 78">
-            <a:extLst>
-              <a:ext uri="{FF2B5EF4-FFF2-40B4-BE49-F238E27FC236}">
-                <a16:creationId xmlns:a16="http://schemas.microsoft.com/office/drawing/2014/main" id="{E0BF415F-5D2B-40F5-B0C5-0010E0DD9B52}"/>
-              </a:ext>
-            </a:extLst>
-          </p:cNvPr>
-          <p:cNvSpPr/>
-          <p:nvPr/>
-        </p:nvSpPr>
-        <p:spPr>
-          <a:xfrm>
-            <a:off x="270572" y="3156047"/>
-            <a:ext cx="137997" cy="140367"/>
-          </a:xfrm>
-          <a:custGeom>
-            <a:avLst/>
-            <a:gdLst>
-              <a:gd name="connsiteX0" fmla="*/ 0 w 181569"/>
-              <a:gd name="connsiteY0" fmla="*/ 48189 h 136841"/>
-              <a:gd name="connsiteX1" fmla="*/ 76200 w 181569"/>
-              <a:gd name="connsiteY1" fmla="*/ 564 h 136841"/>
-              <a:gd name="connsiteX2" fmla="*/ 180975 w 181569"/>
-              <a:gd name="connsiteY2" fmla="*/ 76764 h 136841"/>
-              <a:gd name="connsiteX3" fmla="*/ 114300 w 181569"/>
-              <a:gd name="connsiteY3" fmla="*/ 133914 h 136841"/>
-              <a:gd name="connsiteX4" fmla="*/ 19050 w 181569"/>
-              <a:gd name="connsiteY4" fmla="*/ 133914 h 136841"/>
-            </a:gdLst>
-            <a:ahLst/>
-            <a:cxnLst>
-              <a:cxn ang="0">
-                <a:pos x="connsiteX0" y="connsiteY0"/>
-              </a:cxn>
-              <a:cxn ang="0">
-                <a:pos x="connsiteX1" y="connsiteY1"/>
-              </a:cxn>
-              <a:cxn ang="0">
-                <a:pos x="connsiteX2" y="connsiteY2"/>
-              </a:cxn>
-              <a:cxn ang="0">
-                <a:pos x="connsiteX3" y="connsiteY3"/>
-              </a:cxn>
-              <a:cxn ang="0">
-                <a:pos x="connsiteX4" y="connsiteY4"/>
-              </a:cxn>
-            </a:cxnLst>
-            <a:rect l="l" t="t" r="r" b="b"/>
-            <a:pathLst>
-              <a:path w="181569" h="136841">
-                <a:moveTo>
-                  <a:pt x="0" y="48189"/>
-                </a:moveTo>
-                <a:cubicBezTo>
-                  <a:pt x="23019" y="21995"/>
-                  <a:pt x="46038" y="-4199"/>
-                  <a:pt x="76200" y="564"/>
-                </a:cubicBezTo>
-                <a:cubicBezTo>
-                  <a:pt x="106363" y="5326"/>
-                  <a:pt x="174625" y="54539"/>
-                  <a:pt x="180975" y="76764"/>
-                </a:cubicBezTo>
-                <a:cubicBezTo>
-                  <a:pt x="187325" y="98989"/>
-                  <a:pt x="141287" y="124389"/>
-                  <a:pt x="114300" y="133914"/>
-                </a:cubicBezTo>
-                <a:cubicBezTo>
-                  <a:pt x="87313" y="143439"/>
-                  <a:pt x="28575" y="125977"/>
-                  <a:pt x="19050" y="133914"/>
-                </a:cubicBezTo>
-              </a:path>
-            </a:pathLst>
-          </a:custGeom>
-          <a:ln>
-            <a:solidFill>
-              <a:srgbClr val="0070C0"/>
-            </a:solidFill>
-            <a:prstDash val="solid"/>
-            <a:tailEnd type="triangle"/>
-          </a:ln>
-        </p:spPr>
-        <p:style>
-          <a:lnRef idx="1">
-            <a:schemeClr val="accent1"/>
-          </a:lnRef>
-          <a:fillRef idx="0">
-            <a:schemeClr val="accent1"/>
-          </a:fillRef>
-          <a:effectRef idx="0">
-            <a:schemeClr val="accent1"/>
-          </a:effectRef>
-          <a:fontRef idx="minor">
-            <a:schemeClr val="tx1"/>
-          </a:fontRef>
-        </p:style>
-        <p:txBody>
-          <a:bodyPr rot="0" spcFirstLastPara="0" vertOverflow="overflow" horzOverflow="overflow" vert="horz" wrap="square" lIns="91440" tIns="45720" rIns="91440" bIns="45720" numCol="1" spcCol="0" rtlCol="0" fromWordArt="0" anchor="ctr" anchorCtr="0" forceAA="0" compatLnSpc="1">
-            <a:prstTxWarp prst="textNoShape">
-              <a:avLst/>
-            </a:prstTxWarp>
-            <a:noAutofit/>
-          </a:bodyPr>
-          <a:lstStyle/>
-          <a:p>
-            <a:pPr algn="ctr"/>
-            <a:endParaRPr lang="en-SG">
-              <a:solidFill>
-                <a:schemeClr val="tx1"/>
-              </a:solidFill>
-            </a:endParaRPr>
-          </a:p>
-        </p:txBody>
-      </p:sp>
-      <p:sp>
-        <p:nvSpPr>
-          <p:cNvPr id="85" name="Freeform: Shape 84">
-            <a:extLst>
-              <a:ext uri="{FF2B5EF4-FFF2-40B4-BE49-F238E27FC236}">
-                <a16:creationId xmlns:a16="http://schemas.microsoft.com/office/drawing/2014/main" id="{B318E797-BE7D-4575-AB43-66D55A9886AD}"/>
-              </a:ext>
-            </a:extLst>
-          </p:cNvPr>
-          <p:cNvSpPr/>
-          <p:nvPr/>
-        </p:nvSpPr>
-        <p:spPr>
-          <a:xfrm>
-            <a:off x="237448" y="3372983"/>
-            <a:ext cx="178248" cy="120337"/>
-          </a:xfrm>
-          <a:custGeom>
-            <a:avLst/>
-            <a:gdLst>
-              <a:gd name="connsiteX0" fmla="*/ 47625 w 219217"/>
-              <a:gd name="connsiteY0" fmla="*/ 66876 h 163521"/>
-              <a:gd name="connsiteX1" fmla="*/ 142875 w 219217"/>
-              <a:gd name="connsiteY1" fmla="*/ 201 h 163521"/>
-              <a:gd name="connsiteX2" fmla="*/ 219075 w 219217"/>
-              <a:gd name="connsiteY2" fmla="*/ 85926 h 163521"/>
-              <a:gd name="connsiteX3" fmla="*/ 123825 w 219217"/>
-              <a:gd name="connsiteY3" fmla="*/ 162126 h 163521"/>
-              <a:gd name="connsiteX4" fmla="*/ 0 w 219217"/>
-              <a:gd name="connsiteY4" fmla="*/ 143076 h 163521"/>
-            </a:gdLst>
-            <a:ahLst/>
-            <a:cxnLst>
-              <a:cxn ang="0">
-                <a:pos x="connsiteX0" y="connsiteY0"/>
-              </a:cxn>
-              <a:cxn ang="0">
-                <a:pos x="connsiteX1" y="connsiteY1"/>
-              </a:cxn>
-              <a:cxn ang="0">
-                <a:pos x="connsiteX2" y="connsiteY2"/>
-              </a:cxn>
-              <a:cxn ang="0">
-                <a:pos x="connsiteX3" y="connsiteY3"/>
-              </a:cxn>
-              <a:cxn ang="0">
-                <a:pos x="connsiteX4" y="connsiteY4"/>
-              </a:cxn>
-            </a:cxnLst>
-            <a:rect l="l" t="t" r="r" b="b"/>
-            <a:pathLst>
-              <a:path w="219217" h="163521">
-                <a:moveTo>
-                  <a:pt x="47625" y="66876"/>
-                </a:moveTo>
-                <a:cubicBezTo>
-                  <a:pt x="80962" y="31951"/>
-                  <a:pt x="114300" y="-2974"/>
-                  <a:pt x="142875" y="201"/>
-                </a:cubicBezTo>
-                <a:cubicBezTo>
-                  <a:pt x="171450" y="3376"/>
-                  <a:pt x="222250" y="58938"/>
-                  <a:pt x="219075" y="85926"/>
-                </a:cubicBezTo>
-                <a:cubicBezTo>
-                  <a:pt x="215900" y="112914"/>
-                  <a:pt x="160337" y="152601"/>
-                  <a:pt x="123825" y="162126"/>
-                </a:cubicBezTo>
-                <a:cubicBezTo>
-                  <a:pt x="87313" y="171651"/>
-                  <a:pt x="22225" y="128788"/>
-                  <a:pt x="0" y="143076"/>
-                </a:cubicBezTo>
-              </a:path>
-            </a:pathLst>
-          </a:custGeom>
-          <a:ln>
-            <a:solidFill>
-              <a:srgbClr val="0070C0"/>
-            </a:solidFill>
-            <a:prstDash val="dash"/>
-            <a:tailEnd type="triangle"/>
-          </a:ln>
-        </p:spPr>
-        <p:style>
-          <a:lnRef idx="1">
-            <a:schemeClr val="accent1"/>
-          </a:lnRef>
-          <a:fillRef idx="0">
-            <a:schemeClr val="accent1"/>
-          </a:fillRef>
-          <a:effectRef idx="0">
-            <a:schemeClr val="accent1"/>
-          </a:effectRef>
-          <a:fontRef idx="minor">
-            <a:schemeClr val="tx1"/>
-          </a:fontRef>
-        </p:style>
-        <p:txBody>
-          <a:bodyPr rtlCol="0" anchor="ctr"/>
-          <a:lstStyle/>
-          <a:p>
-            <a:pPr algn="ctr"/>
-            <a:endParaRPr lang="en-SG"/>
-          </a:p>
-        </p:txBody>
-      </p:sp>
-      <p:sp>
-        <p:nvSpPr>
-          <p:cNvPr id="89" name="TextBox 88">
-            <a:extLst>
-              <a:ext uri="{FF2B5EF4-FFF2-40B4-BE49-F238E27FC236}">
-                <a16:creationId xmlns:a16="http://schemas.microsoft.com/office/drawing/2014/main" id="{98BF5A9C-02EC-4CCE-9C65-F43328604C02}"/>
-              </a:ext>
-            </a:extLst>
-          </p:cNvPr>
-          <p:cNvSpPr txBox="1"/>
-          <p:nvPr/>
-        </p:nvSpPr>
-        <p:spPr>
-          <a:xfrm>
-            <a:off x="430883" y="3372983"/>
-            <a:ext cx="877856" cy="184666"/>
-          </a:xfrm>
-          <a:prstGeom prst="rect">
-            <a:avLst/>
-          </a:prstGeom>
-          <a:noFill/>
-        </p:spPr>
-        <p:txBody>
-          <a:bodyPr wrap="square" lIns="0" tIns="0" rIns="0" bIns="0" rtlCol="0">
-            <a:spAutoFit/>
-          </a:bodyPr>
-          <a:lstStyle>
-            <a:defPPr>
-              <a:defRPr lang="en-US"/>
-            </a:defPPr>
-            <a:lvl1pPr algn="r">
-              <a:defRPr sz="1400">
-                <a:solidFill>
-                  <a:srgbClr val="0070C0"/>
-                </a:solidFill>
-              </a:defRPr>
-            </a:lvl1pPr>
-          </a:lstStyle>
-          <a:p>
-            <a:r>
-              <a:rPr lang="en-US" sz="1200" dirty="0" err="1"/>
-              <a:t>rangeOfWeek</a:t>
-            </a:r>
-            <a:endParaRPr lang="en-US" sz="1200" dirty="0"/>
-          </a:p>
-        </p:txBody>
-      </p:sp>
-      <p:sp>
-        <p:nvSpPr>
-          <p:cNvPr id="111" name="Rectangle 110">
-            <a:extLst>
-              <a:ext uri="{FF2B5EF4-FFF2-40B4-BE49-F238E27FC236}">
-                <a16:creationId xmlns:a16="http://schemas.microsoft.com/office/drawing/2014/main" id="{7563BA86-AA56-4AF4-9F37-3FD58BB5D6CC}"/>
-              </a:ext>
-            </a:extLst>
-          </p:cNvPr>
-          <p:cNvSpPr/>
-          <p:nvPr/>
-        </p:nvSpPr>
-        <p:spPr>
-          <a:xfrm>
-            <a:off x="-507491" y="3711242"/>
-            <a:ext cx="9201773" cy="1166195"/>
-          </a:xfrm>
-          <a:prstGeom prst="rect">
-            <a:avLst/>
-          </a:prstGeom>
-          <a:noFill/>
-          <a:ln w="3175">
-            <a:solidFill>
-              <a:srgbClr val="FF0000"/>
-            </a:solidFill>
-          </a:ln>
-        </p:spPr>
-        <p:style>
-          <a:lnRef idx="2">
-            <a:schemeClr val="dk1"/>
-          </a:lnRef>
-          <a:fillRef idx="1">
-            <a:schemeClr val="lt1"/>
-          </a:fillRef>
-          <a:effectRef idx="0">
-            <a:schemeClr val="dk1"/>
-          </a:effectRef>
-          <a:fontRef idx="minor">
-            <a:schemeClr val="dk1"/>
-          </a:fontRef>
-        </p:style>
-        <p:txBody>
-          <a:bodyPr rtlCol="0" anchor="ctr"/>
-          <a:lstStyle/>
-          <a:p>
-            <a:pPr algn="ctr"/>
-            <a:endParaRPr lang="en-SG">
-              <a:solidFill>
-                <a:srgbClr val="FF0000"/>
-              </a:solidFill>
-            </a:endParaRPr>
-          </a:p>
-        </p:txBody>
-      </p:sp>
-      <p:sp>
-        <p:nvSpPr>
-          <p:cNvPr id="112" name="Rectangle: Single Corner Snipped 111">
-            <a:extLst>
-              <a:ext uri="{FF2B5EF4-FFF2-40B4-BE49-F238E27FC236}">
-                <a16:creationId xmlns:a16="http://schemas.microsoft.com/office/drawing/2014/main" id="{A7225393-AFD2-418A-A3AC-BAE3EE30DADE}"/>
-              </a:ext>
-            </a:extLst>
-          </p:cNvPr>
-          <p:cNvSpPr/>
-          <p:nvPr/>
-        </p:nvSpPr>
-        <p:spPr>
-          <a:xfrm flipV="1">
-            <a:off x="-515027" y="3703283"/>
-            <a:ext cx="278891" cy="160962"/>
-          </a:xfrm>
-          <a:prstGeom prst="snip1Rect">
-            <a:avLst/>
-          </a:prstGeom>
-          <a:noFill/>
-          <a:ln w="3175">
-            <a:solidFill>
-              <a:srgbClr val="FF0000"/>
-            </a:solidFill>
-          </a:ln>
-        </p:spPr>
-        <p:style>
-          <a:lnRef idx="2">
-            <a:schemeClr val="dk1"/>
-          </a:lnRef>
-          <a:fillRef idx="1">
-            <a:schemeClr val="lt1"/>
-          </a:fillRef>
-          <a:effectRef idx="0">
-            <a:schemeClr val="dk1"/>
-          </a:effectRef>
-          <a:fontRef idx="minor">
-            <a:schemeClr val="dk1"/>
-          </a:fontRef>
-        </p:style>
-        <p:txBody>
-          <a:bodyPr rot="0" spcFirstLastPara="0" vertOverflow="overflow" horzOverflow="overflow" vert="horz" wrap="square" lIns="91440" tIns="45720" rIns="91440" bIns="45720" numCol="1" spcCol="0" rtlCol="0" fromWordArt="0" anchor="ctr" anchorCtr="0" forceAA="0" compatLnSpc="1">
-            <a:prstTxWarp prst="textNoShape">
-              <a:avLst/>
-            </a:prstTxWarp>
-            <a:noAutofit/>
-          </a:bodyPr>
-          <a:lstStyle/>
-          <a:p>
-            <a:pPr algn="ctr"/>
-            <a:endParaRPr lang="en-SG" sz="1200" dirty="0">
-              <a:solidFill>
-                <a:schemeClr val="dk1"/>
-              </a:solidFill>
-            </a:endParaRPr>
-          </a:p>
-        </p:txBody>
-      </p:sp>
-      <p:sp>
-        <p:nvSpPr>
-          <p:cNvPr id="113" name="TextBox 112">
-            <a:extLst>
-              <a:ext uri="{FF2B5EF4-FFF2-40B4-BE49-F238E27FC236}">
-                <a16:creationId xmlns:a16="http://schemas.microsoft.com/office/drawing/2014/main" id="{EBFCCF56-E8EC-4027-8788-1FBE4848E545}"/>
-              </a:ext>
-            </a:extLst>
-          </p:cNvPr>
-          <p:cNvSpPr txBox="1"/>
-          <p:nvPr/>
-        </p:nvSpPr>
-        <p:spPr>
-          <a:xfrm>
-            <a:off x="-659398" y="3703283"/>
-            <a:ext cx="339358" cy="153888"/>
-          </a:xfrm>
-          <a:prstGeom prst="rect">
-            <a:avLst/>
-          </a:prstGeom>
-          <a:noFill/>
-        </p:spPr>
-        <p:txBody>
-          <a:bodyPr wrap="square" lIns="0" tIns="0" rIns="0" bIns="0" rtlCol="0">
-            <a:spAutoFit/>
-          </a:bodyPr>
-          <a:lstStyle/>
-          <a:p>
-            <a:pPr algn="r"/>
-            <a:r>
-              <a:rPr lang="en-US" sz="1000" dirty="0">
-                <a:solidFill>
-                  <a:srgbClr val="FF0000"/>
-                </a:solidFill>
-              </a:rPr>
-              <a:t>alt</a:t>
-            </a:r>
-          </a:p>
-        </p:txBody>
-      </p:sp>
-      <p:sp>
-        <p:nvSpPr>
-          <p:cNvPr id="114" name="TextBox 113">
-            <a:extLst>
-              <a:ext uri="{FF2B5EF4-FFF2-40B4-BE49-F238E27FC236}">
-                <a16:creationId xmlns:a16="http://schemas.microsoft.com/office/drawing/2014/main" id="{8AFE7622-3C83-4B6C-969E-0C0CE7CB987B}"/>
-              </a:ext>
-            </a:extLst>
-          </p:cNvPr>
-          <p:cNvSpPr txBox="1"/>
-          <p:nvPr/>
-        </p:nvSpPr>
-        <p:spPr>
-          <a:xfrm>
-            <a:off x="179462" y="3758216"/>
-            <a:ext cx="5312733" cy="184666"/>
-          </a:xfrm>
-          <a:prstGeom prst="rect">
-            <a:avLst/>
-          </a:prstGeom>
-          <a:noFill/>
-          <a:ln>
-            <a:noFill/>
-          </a:ln>
-        </p:spPr>
-        <p:txBody>
-          <a:bodyPr wrap="square" lIns="0" tIns="0" rIns="0" bIns="0" rtlCol="0">
-            <a:spAutoFit/>
-          </a:bodyPr>
-          <a:lstStyle>
-            <a:defPPr>
-              <a:defRPr lang="en-US"/>
-            </a:defPPr>
-            <a:lvl1pPr algn="r">
-              <a:defRPr sz="1400">
-                <a:solidFill>
-                  <a:srgbClr val="0070C0"/>
-                </a:solidFill>
-              </a:defRPr>
-            </a:lvl1pPr>
-          </a:lstStyle>
-          <a:p>
-            <a:r>
-              <a:rPr lang="en-US" sz="1200" dirty="0">
-                <a:solidFill>
-                  <a:srgbClr val="FF0000"/>
-                </a:solidFill>
-              </a:rPr>
-              <a:t>[</a:t>
-            </a:r>
-            <a:r>
-              <a:rPr lang="en-US" sz="1200" dirty="0" err="1">
-                <a:solidFill>
-                  <a:srgbClr val="FF0000"/>
-                </a:solidFill>
-              </a:rPr>
-              <a:t>FirstDayCommand.isWithinDateRange</a:t>
-            </a:r>
-            <a:r>
-              <a:rPr lang="en-US" sz="1200" dirty="0">
-                <a:solidFill>
-                  <a:srgbClr val="FF0000"/>
-                </a:solidFill>
-              </a:rPr>
-              <a:t>(</a:t>
-            </a:r>
-            <a:r>
-              <a:rPr lang="en-US" sz="1200" dirty="0" err="1">
-                <a:solidFill>
-                  <a:srgbClr val="FF0000"/>
-                </a:solidFill>
-              </a:rPr>
-              <a:t>rangeOfWeek</a:t>
-            </a:r>
-            <a:r>
-              <a:rPr lang="en-US" sz="1200" dirty="0">
-                <a:solidFill>
-                  <a:srgbClr val="FF0000"/>
-                </a:solidFill>
-              </a:rPr>
-              <a:t>[0][0], </a:t>
-            </a:r>
-            <a:r>
-              <a:rPr lang="en-US" sz="1200" dirty="0" err="1">
-                <a:solidFill>
-                  <a:srgbClr val="FF0000"/>
-                </a:solidFill>
-              </a:rPr>
-              <a:t>rangeOfWeek</a:t>
-            </a:r>
-            <a:r>
-              <a:rPr lang="en-US" sz="1200" dirty="0">
-                <a:solidFill>
-                  <a:srgbClr val="FF0000"/>
-                </a:solidFill>
-              </a:rPr>
-              <a:t>[16][1])]</a:t>
             </a:r>
           </a:p>
         </p:txBody>
@@ -5329,12 +3800,101 @@
           </a:fontRef>
         </p:style>
       </p:cxnSp>
+      <p:sp>
+        <p:nvSpPr>
+          <p:cNvPr id="36" name="Rectangle 62">
+            <a:extLst>
+              <a:ext uri="{FF2B5EF4-FFF2-40B4-BE49-F238E27FC236}">
+                <a16:creationId xmlns:a16="http://schemas.microsoft.com/office/drawing/2014/main" id="{2137EE65-4EAF-4E6E-AA90-13646CFC4367}"/>
+              </a:ext>
+            </a:extLst>
+          </p:cNvPr>
+          <p:cNvSpPr/>
+          <p:nvPr/>
+        </p:nvSpPr>
+        <p:spPr>
+          <a:xfrm>
+            <a:off x="2089917" y="858648"/>
+            <a:ext cx="1772845" cy="461538"/>
+          </a:xfrm>
+          <a:prstGeom prst="rect">
+            <a:avLst/>
+          </a:prstGeom>
+          <a:solidFill>
+            <a:srgbClr val="0070C0"/>
+          </a:solidFill>
+          <a:ln w="19050">
+            <a:solidFill>
+              <a:srgbClr val="0070C0"/>
+            </a:solidFill>
+          </a:ln>
+          <a:effectLst/>
+        </p:spPr>
+        <p:style>
+          <a:lnRef idx="1">
+            <a:schemeClr val="accent2"/>
+          </a:lnRef>
+          <a:fillRef idx="2">
+            <a:schemeClr val="accent2"/>
+          </a:fillRef>
+          <a:effectRef idx="1">
+            <a:schemeClr val="accent2"/>
+          </a:effectRef>
+          <a:fontRef idx="minor">
+            <a:schemeClr val="dk1"/>
+          </a:fontRef>
+        </p:style>
+        <p:txBody>
+          <a:bodyPr rtlCol="0" anchor="ctr"/>
+          <a:lstStyle/>
+          <a:p>
+            <a:pPr algn="ctr"/>
+            <a:r>
+              <a:rPr lang="en-US" sz="1600" dirty="0">
+                <a:solidFill>
+                  <a:schemeClr val="bg1"/>
+                </a:solidFill>
+              </a:rPr>
+              <a:t>f: </a:t>
+            </a:r>
+            <a:r>
+              <a:rPr lang="en-US" sz="1600" dirty="0" err="1">
+                <a:solidFill>
+                  <a:schemeClr val="bg1"/>
+                </a:solidFill>
+              </a:rPr>
+              <a:t>FirstDay</a:t>
+            </a:r>
+            <a:endParaRPr lang="en-US" sz="1600" dirty="0">
+              <a:solidFill>
+                <a:schemeClr val="bg1"/>
+              </a:solidFill>
+            </a:endParaRPr>
+          </a:p>
+          <a:p>
+            <a:pPr algn="ctr"/>
+            <a:r>
+              <a:rPr lang="en-US" sz="1600" dirty="0">
+                <a:solidFill>
+                  <a:schemeClr val="bg1"/>
+                </a:solidFill>
+              </a:rPr>
+              <a:t>Command</a:t>
+            </a:r>
+            <a:endParaRPr lang="en-SG" sz="1600" dirty="0">
+              <a:solidFill>
+                <a:schemeClr val="bg1"/>
+              </a:solidFill>
+            </a:endParaRPr>
+          </a:p>
+        </p:txBody>
+      </p:sp>
       <p:cxnSp>
         <p:nvCxnSpPr>
-          <p:cNvPr id="116" name="Straight Connector 115">
+          <p:cNvPr id="37" name="Straight Connector 36">
             <a:extLst>
               <a:ext uri="{FF2B5EF4-FFF2-40B4-BE49-F238E27FC236}">
-                <a16:creationId xmlns:a16="http://schemas.microsoft.com/office/drawing/2014/main" id="{B3D1DE64-0595-45F9-A04C-1E5C4CE4EE2E}"/>
+                <a16:creationId xmlns:a16="http://schemas.microsoft.com/office/drawing/2014/main" id="{CD91DFBE-0D2F-4EC5-B11B-61A23600C0FF}"/>
               </a:ext>
             </a:extLst>
           </p:cNvPr>
@@ -5344,16 +3904,16 @@
           <p:nvPr/>
         </p:nvCxnSpPr>
         <p:spPr>
-          <a:xfrm flipH="1">
-            <a:off x="-528568" y="4301410"/>
-            <a:ext cx="9222850" cy="21910"/>
+          <a:xfrm>
+            <a:off x="2971800" y="1320186"/>
+            <a:ext cx="0" cy="1256676"/>
           </a:xfrm>
           <a:prstGeom prst="line">
             <a:avLst/>
           </a:prstGeom>
           <a:ln w="19050">
             <a:solidFill>
-              <a:srgbClr val="FF0000"/>
+              <a:srgbClr val="0070C0"/>
             </a:solidFill>
             <a:prstDash val="sysDash"/>
           </a:ln>
@@ -5374,12 +3934,408 @@
           </a:fontRef>
         </p:style>
       </p:cxnSp>
-      <p:sp>
-        <p:nvSpPr>
-          <p:cNvPr id="117" name="TextBox 116">
+      <p:cxnSp>
+        <p:nvCxnSpPr>
+          <p:cNvPr id="40" name="Straight Arrow Connector 39">
             <a:extLst>
               <a:ext uri="{FF2B5EF4-FFF2-40B4-BE49-F238E27FC236}">
-                <a16:creationId xmlns:a16="http://schemas.microsoft.com/office/drawing/2014/main" id="{EF4DB82C-D8DF-4B97-8175-101B64D5FF29}"/>
+                <a16:creationId xmlns:a16="http://schemas.microsoft.com/office/drawing/2014/main" id="{28F3D744-B616-4704-946C-64F1AD6DE66B}"/>
+              </a:ext>
+            </a:extLst>
+          </p:cNvPr>
+          <p:cNvCxnSpPr>
+            <a:cxnSpLocks/>
+          </p:cNvCxnSpPr>
+          <p:nvPr/>
+        </p:nvCxnSpPr>
+        <p:spPr>
+          <a:xfrm flipV="1">
+            <a:off x="127020" y="1950133"/>
+            <a:ext cx="2757860" cy="25408"/>
+          </a:xfrm>
+          <a:prstGeom prst="straightConnector1">
+            <a:avLst/>
+          </a:prstGeom>
+          <a:ln w="19050">
+            <a:solidFill>
+              <a:srgbClr val="0070C0"/>
+            </a:solidFill>
+            <a:tailEnd type="arrow"/>
+          </a:ln>
+        </p:spPr>
+        <p:style>
+          <a:lnRef idx="1">
+            <a:schemeClr val="accent1"/>
+          </a:lnRef>
+          <a:fillRef idx="0">
+            <a:schemeClr val="accent1"/>
+          </a:fillRef>
+          <a:effectRef idx="0">
+            <a:schemeClr val="accent1"/>
+          </a:effectRef>
+          <a:fontRef idx="minor">
+            <a:schemeClr val="tx1"/>
+          </a:fontRef>
+        </p:style>
+      </p:cxnSp>
+      <p:sp>
+        <p:nvSpPr>
+          <p:cNvPr id="41" name="Rectangle 40">
+            <a:extLst>
+              <a:ext uri="{FF2B5EF4-FFF2-40B4-BE49-F238E27FC236}">
+                <a16:creationId xmlns:a16="http://schemas.microsoft.com/office/drawing/2014/main" id="{20BD2DAD-08AB-4D84-B003-E4820C6E9272}"/>
+              </a:ext>
+            </a:extLst>
+          </p:cNvPr>
+          <p:cNvSpPr/>
+          <p:nvPr/>
+        </p:nvSpPr>
+        <p:spPr>
+          <a:xfrm>
+            <a:off x="2895600" y="1927745"/>
+            <a:ext cx="173839" cy="357555"/>
+          </a:xfrm>
+          <a:prstGeom prst="rect">
+            <a:avLst/>
+          </a:prstGeom>
+          <a:solidFill>
+            <a:srgbClr val="0070C0"/>
+          </a:solidFill>
+          <a:ln>
+            <a:solidFill>
+              <a:srgbClr val="0070C0"/>
+            </a:solidFill>
+          </a:ln>
+          <a:effectLst/>
+        </p:spPr>
+        <p:style>
+          <a:lnRef idx="1">
+            <a:schemeClr val="accent3"/>
+          </a:lnRef>
+          <a:fillRef idx="2">
+            <a:schemeClr val="accent3"/>
+          </a:fillRef>
+          <a:effectRef idx="1">
+            <a:schemeClr val="accent3"/>
+          </a:effectRef>
+          <a:fontRef idx="minor">
+            <a:schemeClr val="dk1"/>
+          </a:fontRef>
+        </p:style>
+        <p:txBody>
+          <a:bodyPr rtlCol="0" anchor="ctr"/>
+          <a:lstStyle/>
+          <a:p>
+            <a:pPr algn="ctr"/>
+            <a:endParaRPr lang="en-SG" sz="1400"/>
+          </a:p>
+        </p:txBody>
+      </p:sp>
+      <p:cxnSp>
+        <p:nvCxnSpPr>
+          <p:cNvPr id="45" name="Straight Arrow Connector 44">
+            <a:extLst>
+              <a:ext uri="{FF2B5EF4-FFF2-40B4-BE49-F238E27FC236}">
+                <a16:creationId xmlns:a16="http://schemas.microsoft.com/office/drawing/2014/main" id="{34CCFCC6-5F82-4FE9-8947-9C2B2BD7CA4E}"/>
+              </a:ext>
+            </a:extLst>
+          </p:cNvPr>
+          <p:cNvCxnSpPr>
+            <a:cxnSpLocks/>
+          </p:cNvCxnSpPr>
+          <p:nvPr/>
+        </p:nvCxnSpPr>
+        <p:spPr>
+          <a:xfrm flipV="1">
+            <a:off x="138823" y="2273345"/>
+            <a:ext cx="2753626" cy="19914"/>
+          </a:xfrm>
+          <a:prstGeom prst="straightConnector1">
+            <a:avLst/>
+          </a:prstGeom>
+          <a:ln w="19050">
+            <a:solidFill>
+              <a:srgbClr val="0070C0"/>
+            </a:solidFill>
+            <a:prstDash val="sysDash"/>
+            <a:headEnd type="arrow" w="med" len="med"/>
+            <a:tailEnd type="none" w="med" len="med"/>
+          </a:ln>
+        </p:spPr>
+        <p:style>
+          <a:lnRef idx="1">
+            <a:schemeClr val="accent1"/>
+          </a:lnRef>
+          <a:fillRef idx="0">
+            <a:schemeClr val="accent1"/>
+          </a:fillRef>
+          <a:effectRef idx="0">
+            <a:schemeClr val="accent1"/>
+          </a:effectRef>
+          <a:fontRef idx="minor">
+            <a:schemeClr val="tx1"/>
+          </a:fontRef>
+        </p:style>
+      </p:cxnSp>
+      <p:sp>
+        <p:nvSpPr>
+          <p:cNvPr id="49" name="Rectangle 62">
+            <a:extLst>
+              <a:ext uri="{FF2B5EF4-FFF2-40B4-BE49-F238E27FC236}">
+                <a16:creationId xmlns:a16="http://schemas.microsoft.com/office/drawing/2014/main" id="{2BD3B8CC-0D83-4AE8-B05B-4A04FA4D101D}"/>
+              </a:ext>
+            </a:extLst>
+          </p:cNvPr>
+          <p:cNvSpPr/>
+          <p:nvPr/>
+        </p:nvSpPr>
+        <p:spPr>
+          <a:xfrm>
+            <a:off x="4206471" y="858648"/>
+            <a:ext cx="886423" cy="461538"/>
+          </a:xfrm>
+          <a:prstGeom prst="rect">
+            <a:avLst/>
+          </a:prstGeom>
+          <a:solidFill>
+            <a:srgbClr val="0070C0"/>
+          </a:solidFill>
+          <a:ln w="19050">
+            <a:solidFill>
+              <a:srgbClr val="0070C0"/>
+            </a:solidFill>
+          </a:ln>
+          <a:effectLst/>
+        </p:spPr>
+        <p:style>
+          <a:lnRef idx="1">
+            <a:schemeClr val="accent2"/>
+          </a:lnRef>
+          <a:fillRef idx="2">
+            <a:schemeClr val="accent2"/>
+          </a:fillRef>
+          <a:effectRef idx="1">
+            <a:schemeClr val="accent2"/>
+          </a:effectRef>
+          <a:fontRef idx="minor">
+            <a:schemeClr val="dk1"/>
+          </a:fontRef>
+        </p:style>
+        <p:txBody>
+          <a:bodyPr rtlCol="0" anchor="ctr"/>
+          <a:lstStyle/>
+          <a:p>
+            <a:pPr algn="ctr"/>
+            <a:r>
+              <a:rPr lang="en-US" sz="1600" dirty="0">
+                <a:solidFill>
+                  <a:schemeClr val="bg1"/>
+                </a:solidFill>
+              </a:rPr>
+              <a:t>:Config</a:t>
+            </a:r>
+            <a:endParaRPr lang="en-SG" sz="1600" dirty="0">
+              <a:solidFill>
+                <a:schemeClr val="bg1"/>
+              </a:solidFill>
+            </a:endParaRPr>
+          </a:p>
+        </p:txBody>
+      </p:sp>
+      <p:cxnSp>
+        <p:nvCxnSpPr>
+          <p:cNvPr id="50" name="Straight Connector 49">
+            <a:extLst>
+              <a:ext uri="{FF2B5EF4-FFF2-40B4-BE49-F238E27FC236}">
+                <a16:creationId xmlns:a16="http://schemas.microsoft.com/office/drawing/2014/main" id="{64FC4F0E-2461-48AC-8152-52BB50C2B062}"/>
+              </a:ext>
+            </a:extLst>
+          </p:cNvPr>
+          <p:cNvCxnSpPr>
+            <a:cxnSpLocks/>
+          </p:cNvCxnSpPr>
+          <p:nvPr/>
+        </p:nvCxnSpPr>
+        <p:spPr>
+          <a:xfrm>
+            <a:off x="4653318" y="1320186"/>
+            <a:ext cx="0" cy="1956414"/>
+          </a:xfrm>
+          <a:prstGeom prst="line">
+            <a:avLst/>
+          </a:prstGeom>
+          <a:ln w="19050">
+            <a:solidFill>
+              <a:srgbClr val="0070C0"/>
+            </a:solidFill>
+            <a:prstDash val="sysDash"/>
+          </a:ln>
+          <a:effectLst/>
+        </p:spPr>
+        <p:style>
+          <a:lnRef idx="1">
+            <a:schemeClr val="accent1"/>
+          </a:lnRef>
+          <a:fillRef idx="2">
+            <a:schemeClr val="accent1"/>
+          </a:fillRef>
+          <a:effectRef idx="1">
+            <a:schemeClr val="accent1"/>
+          </a:effectRef>
+          <a:fontRef idx="minor">
+            <a:schemeClr val="dk1"/>
+          </a:fontRef>
+        </p:style>
+      </p:cxnSp>
+      <p:cxnSp>
+        <p:nvCxnSpPr>
+          <p:cNvPr id="51" name="Straight Arrow Connector 50">
+            <a:extLst>
+              <a:ext uri="{FF2B5EF4-FFF2-40B4-BE49-F238E27FC236}">
+                <a16:creationId xmlns:a16="http://schemas.microsoft.com/office/drawing/2014/main" id="{95E037EB-F239-4680-9DEE-BB036D9D1EAF}"/>
+              </a:ext>
+            </a:extLst>
+          </p:cNvPr>
+          <p:cNvCxnSpPr>
+            <a:cxnSpLocks/>
+          </p:cNvCxnSpPr>
+          <p:nvPr/>
+        </p:nvCxnSpPr>
+        <p:spPr>
+          <a:xfrm flipV="1">
+            <a:off x="140823" y="2718419"/>
+            <a:ext cx="4414857" cy="25408"/>
+          </a:xfrm>
+          <a:prstGeom prst="straightConnector1">
+            <a:avLst/>
+          </a:prstGeom>
+          <a:ln w="19050">
+            <a:solidFill>
+              <a:srgbClr val="0070C0"/>
+            </a:solidFill>
+            <a:tailEnd type="arrow"/>
+          </a:ln>
+        </p:spPr>
+        <p:style>
+          <a:lnRef idx="1">
+            <a:schemeClr val="accent1"/>
+          </a:lnRef>
+          <a:fillRef idx="0">
+            <a:schemeClr val="accent1"/>
+          </a:fillRef>
+          <a:effectRef idx="0">
+            <a:schemeClr val="accent1"/>
+          </a:effectRef>
+          <a:fontRef idx="minor">
+            <a:schemeClr val="tx1"/>
+          </a:fontRef>
+        </p:style>
+      </p:cxnSp>
+      <p:sp>
+        <p:nvSpPr>
+          <p:cNvPr id="53" name="Rectangle 52">
+            <a:extLst>
+              <a:ext uri="{FF2B5EF4-FFF2-40B4-BE49-F238E27FC236}">
+                <a16:creationId xmlns:a16="http://schemas.microsoft.com/office/drawing/2014/main" id="{FBE91152-CAA0-40F9-A636-95D6D3ED0062}"/>
+              </a:ext>
+            </a:extLst>
+          </p:cNvPr>
+          <p:cNvSpPr/>
+          <p:nvPr/>
+        </p:nvSpPr>
+        <p:spPr>
+          <a:xfrm>
+            <a:off x="4547942" y="2714623"/>
+            <a:ext cx="173839" cy="357555"/>
+          </a:xfrm>
+          <a:prstGeom prst="rect">
+            <a:avLst/>
+          </a:prstGeom>
+          <a:solidFill>
+            <a:srgbClr val="0070C0"/>
+          </a:solidFill>
+          <a:ln>
+            <a:solidFill>
+              <a:srgbClr val="0070C0"/>
+            </a:solidFill>
+          </a:ln>
+          <a:effectLst/>
+        </p:spPr>
+        <p:style>
+          <a:lnRef idx="1">
+            <a:schemeClr val="accent3"/>
+          </a:lnRef>
+          <a:fillRef idx="2">
+            <a:schemeClr val="accent3"/>
+          </a:fillRef>
+          <a:effectRef idx="1">
+            <a:schemeClr val="accent3"/>
+          </a:effectRef>
+          <a:fontRef idx="minor">
+            <a:schemeClr val="dk1"/>
+          </a:fontRef>
+        </p:style>
+        <p:txBody>
+          <a:bodyPr rtlCol="0" anchor="ctr"/>
+          <a:lstStyle/>
+          <a:p>
+            <a:pPr algn="ctr"/>
+            <a:endParaRPr lang="en-SG" sz="1400"/>
+          </a:p>
+        </p:txBody>
+      </p:sp>
+      <p:cxnSp>
+        <p:nvCxnSpPr>
+          <p:cNvPr id="55" name="Straight Arrow Connector 54">
+            <a:extLst>
+              <a:ext uri="{FF2B5EF4-FFF2-40B4-BE49-F238E27FC236}">
+                <a16:creationId xmlns:a16="http://schemas.microsoft.com/office/drawing/2014/main" id="{8E4B7BBA-25B6-4D0E-8872-29814D26F7DF}"/>
+              </a:ext>
+            </a:extLst>
+          </p:cNvPr>
+          <p:cNvCxnSpPr>
+            <a:cxnSpLocks/>
+          </p:cNvCxnSpPr>
+          <p:nvPr/>
+        </p:nvCxnSpPr>
+        <p:spPr>
+          <a:xfrm flipV="1">
+            <a:off x="138823" y="3070180"/>
+            <a:ext cx="4409119" cy="9957"/>
+          </a:xfrm>
+          <a:prstGeom prst="straightConnector1">
+            <a:avLst/>
+          </a:prstGeom>
+          <a:ln w="19050">
+            <a:solidFill>
+              <a:srgbClr val="0070C0"/>
+            </a:solidFill>
+            <a:prstDash val="sysDash"/>
+            <a:headEnd type="arrow" w="med" len="med"/>
+            <a:tailEnd type="none" w="med" len="med"/>
+          </a:ln>
+        </p:spPr>
+        <p:style>
+          <a:lnRef idx="1">
+            <a:schemeClr val="accent1"/>
+          </a:lnRef>
+          <a:fillRef idx="0">
+            <a:schemeClr val="accent1"/>
+          </a:fillRef>
+          <a:effectRef idx="0">
+            <a:schemeClr val="accent1"/>
+          </a:effectRef>
+          <a:fontRef idx="minor">
+            <a:schemeClr val="tx1"/>
+          </a:fontRef>
+        </p:style>
+      </p:cxnSp>
+      <p:sp>
+        <p:nvSpPr>
+          <p:cNvPr id="56" name="TextBox 55">
+            <a:extLst>
+              <a:ext uri="{FF2B5EF4-FFF2-40B4-BE49-F238E27FC236}">
+                <a16:creationId xmlns:a16="http://schemas.microsoft.com/office/drawing/2014/main" id="{96035D04-72BC-4FEB-AC4C-51F9D3C361CE}"/>
               </a:ext>
             </a:extLst>
           </p:cNvPr>
@@ -5388,8 +4344,8 @@
         </p:nvSpPr>
         <p:spPr>
           <a:xfrm>
-            <a:off x="342801" y="4587249"/>
-            <a:ext cx="2948333" cy="184666"/>
+            <a:off x="405844" y="2465604"/>
+            <a:ext cx="2114359" cy="184666"/>
           </a:xfrm>
           <a:prstGeom prst="rect">
             <a:avLst/>
@@ -5415,21 +4371,290 @@
           <a:p>
             <a:r>
               <a:rPr lang="en-US" sz="1200" dirty="0" err="1"/>
-              <a:t>updateConfig.setAppTitle</a:t>
+              <a:t>setAppTitle</a:t>
             </a:r>
             <a:r>
               <a:rPr lang="en-US" sz="1200" dirty="0"/>
-              <a:t>(“Schedule Planner”)</a:t>
-            </a:r>
-          </a:p>
-        </p:txBody>
-      </p:sp>
-      <p:sp>
-        <p:nvSpPr>
-          <p:cNvPr id="118" name="TextBox 117">
+              <a:t>(</a:t>
+            </a:r>
+            <a:r>
+              <a:rPr lang="en-US" sz="1200" dirty="0" err="1"/>
+              <a:t>f.computeAppTitle</a:t>
+            </a:r>
+            <a:r>
+              <a:rPr lang="en-US" sz="1200" dirty="0"/>
+              <a:t>())</a:t>
+            </a:r>
+          </a:p>
+        </p:txBody>
+      </p:sp>
+      <p:sp>
+        <p:nvSpPr>
+          <p:cNvPr id="61" name="Rectangle 62">
             <a:extLst>
               <a:ext uri="{FF2B5EF4-FFF2-40B4-BE49-F238E27FC236}">
-                <a16:creationId xmlns:a16="http://schemas.microsoft.com/office/drawing/2014/main" id="{88C26A78-63A3-46FE-95C3-208B6171DD1E}"/>
+                <a16:creationId xmlns:a16="http://schemas.microsoft.com/office/drawing/2014/main" id="{7A7FFF98-5CAF-43FF-BC90-40BBBC3669F4}"/>
+              </a:ext>
+            </a:extLst>
+          </p:cNvPr>
+          <p:cNvSpPr/>
+          <p:nvPr/>
+        </p:nvSpPr>
+        <p:spPr>
+          <a:xfrm>
+            <a:off x="5279228" y="871109"/>
+            <a:ext cx="1179592" cy="461538"/>
+          </a:xfrm>
+          <a:prstGeom prst="rect">
+            <a:avLst/>
+          </a:prstGeom>
+          <a:solidFill>
+            <a:srgbClr val="0070C0"/>
+          </a:solidFill>
+          <a:ln w="19050">
+            <a:solidFill>
+              <a:srgbClr val="0070C0"/>
+            </a:solidFill>
+          </a:ln>
+          <a:effectLst/>
+        </p:spPr>
+        <p:style>
+          <a:lnRef idx="1">
+            <a:schemeClr val="accent2"/>
+          </a:lnRef>
+          <a:fillRef idx="2">
+            <a:schemeClr val="accent2"/>
+          </a:fillRef>
+          <a:effectRef idx="1">
+            <a:schemeClr val="accent2"/>
+          </a:effectRef>
+          <a:fontRef idx="minor">
+            <a:schemeClr val="dk1"/>
+          </a:fontRef>
+        </p:style>
+        <p:txBody>
+          <a:bodyPr rtlCol="0" anchor="ctr"/>
+          <a:lstStyle/>
+          <a:p>
+            <a:pPr algn="ctr"/>
+            <a:r>
+              <a:rPr lang="en-US" sz="1600" dirty="0">
+                <a:solidFill>
+                  <a:schemeClr val="bg1"/>
+                </a:solidFill>
+              </a:rPr>
+              <a:t>:</a:t>
+            </a:r>
+            <a:r>
+              <a:rPr lang="en-US" sz="1600" dirty="0" err="1">
+                <a:solidFill>
+                  <a:schemeClr val="bg1"/>
+                </a:solidFill>
+              </a:rPr>
+              <a:t>ConfigUtil</a:t>
+            </a:r>
+            <a:endParaRPr lang="en-SG" sz="1600" dirty="0">
+              <a:solidFill>
+                <a:schemeClr val="bg1"/>
+              </a:solidFill>
+            </a:endParaRPr>
+          </a:p>
+        </p:txBody>
+      </p:sp>
+      <p:cxnSp>
+        <p:nvCxnSpPr>
+          <p:cNvPr id="63" name="Straight Connector 62">
+            <a:extLst>
+              <a:ext uri="{FF2B5EF4-FFF2-40B4-BE49-F238E27FC236}">
+                <a16:creationId xmlns:a16="http://schemas.microsoft.com/office/drawing/2014/main" id="{42E2022C-626A-49E1-A032-BC8B14B482D2}"/>
+              </a:ext>
+            </a:extLst>
+          </p:cNvPr>
+          <p:cNvCxnSpPr>
+            <a:cxnSpLocks/>
+          </p:cNvCxnSpPr>
+          <p:nvPr/>
+        </p:nvCxnSpPr>
+        <p:spPr>
+          <a:xfrm>
+            <a:off x="5867885" y="1256030"/>
+            <a:ext cx="0" cy="2858770"/>
+          </a:xfrm>
+          <a:prstGeom prst="line">
+            <a:avLst/>
+          </a:prstGeom>
+          <a:ln w="19050">
+            <a:solidFill>
+              <a:srgbClr val="0070C0"/>
+            </a:solidFill>
+            <a:prstDash val="sysDash"/>
+          </a:ln>
+          <a:effectLst/>
+        </p:spPr>
+        <p:style>
+          <a:lnRef idx="1">
+            <a:schemeClr val="accent1"/>
+          </a:lnRef>
+          <a:fillRef idx="2">
+            <a:schemeClr val="accent1"/>
+          </a:fillRef>
+          <a:effectRef idx="1">
+            <a:schemeClr val="accent1"/>
+          </a:effectRef>
+          <a:fontRef idx="minor">
+            <a:schemeClr val="dk1"/>
+          </a:fontRef>
+        </p:style>
+      </p:cxnSp>
+      <p:cxnSp>
+        <p:nvCxnSpPr>
+          <p:cNvPr id="64" name="Straight Arrow Connector 63">
+            <a:extLst>
+              <a:ext uri="{FF2B5EF4-FFF2-40B4-BE49-F238E27FC236}">
+                <a16:creationId xmlns:a16="http://schemas.microsoft.com/office/drawing/2014/main" id="{4534B8BC-AF36-4AA4-B1EA-15DE2A5F4BCC}"/>
+              </a:ext>
+            </a:extLst>
+          </p:cNvPr>
+          <p:cNvCxnSpPr>
+            <a:cxnSpLocks/>
+          </p:cNvCxnSpPr>
+          <p:nvPr/>
+        </p:nvCxnSpPr>
+        <p:spPr>
+          <a:xfrm flipV="1">
+            <a:off x="170128" y="3494076"/>
+            <a:ext cx="5624922" cy="45871"/>
+          </a:xfrm>
+          <a:prstGeom prst="straightConnector1">
+            <a:avLst/>
+          </a:prstGeom>
+          <a:ln w="19050">
+            <a:solidFill>
+              <a:srgbClr val="0070C0"/>
+            </a:solidFill>
+            <a:tailEnd type="arrow"/>
+          </a:ln>
+        </p:spPr>
+        <p:style>
+          <a:lnRef idx="1">
+            <a:schemeClr val="accent1"/>
+          </a:lnRef>
+          <a:fillRef idx="0">
+            <a:schemeClr val="accent1"/>
+          </a:fillRef>
+          <a:effectRef idx="0">
+            <a:schemeClr val="accent1"/>
+          </a:effectRef>
+          <a:fontRef idx="minor">
+            <a:schemeClr val="tx1"/>
+          </a:fontRef>
+        </p:style>
+      </p:cxnSp>
+      <p:sp>
+        <p:nvSpPr>
+          <p:cNvPr id="65" name="Rectangle 64">
+            <a:extLst>
+              <a:ext uri="{FF2B5EF4-FFF2-40B4-BE49-F238E27FC236}">
+                <a16:creationId xmlns:a16="http://schemas.microsoft.com/office/drawing/2014/main" id="{D85A79D2-9577-4A71-B3B7-03C4B7F02E53}"/>
+              </a:ext>
+            </a:extLst>
+          </p:cNvPr>
+          <p:cNvSpPr/>
+          <p:nvPr/>
+        </p:nvSpPr>
+        <p:spPr>
+          <a:xfrm>
+            <a:off x="5780965" y="3474635"/>
+            <a:ext cx="173839" cy="357555"/>
+          </a:xfrm>
+          <a:prstGeom prst="rect">
+            <a:avLst/>
+          </a:prstGeom>
+          <a:solidFill>
+            <a:srgbClr val="0070C0"/>
+          </a:solidFill>
+          <a:ln>
+            <a:solidFill>
+              <a:srgbClr val="0070C0"/>
+            </a:solidFill>
+          </a:ln>
+          <a:effectLst/>
+        </p:spPr>
+        <p:style>
+          <a:lnRef idx="1">
+            <a:schemeClr val="accent3"/>
+          </a:lnRef>
+          <a:fillRef idx="2">
+            <a:schemeClr val="accent3"/>
+          </a:fillRef>
+          <a:effectRef idx="1">
+            <a:schemeClr val="accent3"/>
+          </a:effectRef>
+          <a:fontRef idx="minor">
+            <a:schemeClr val="dk1"/>
+          </a:fontRef>
+        </p:style>
+        <p:txBody>
+          <a:bodyPr rtlCol="0" anchor="ctr"/>
+          <a:lstStyle/>
+          <a:p>
+            <a:pPr algn="ctr"/>
+            <a:endParaRPr lang="en-SG" sz="1400"/>
+          </a:p>
+        </p:txBody>
+      </p:sp>
+      <p:cxnSp>
+        <p:nvCxnSpPr>
+          <p:cNvPr id="75" name="Straight Arrow Connector 74">
+            <a:extLst>
+              <a:ext uri="{FF2B5EF4-FFF2-40B4-BE49-F238E27FC236}">
+                <a16:creationId xmlns:a16="http://schemas.microsoft.com/office/drawing/2014/main" id="{B3CA530F-9538-436E-9350-D70DB5A530A4}"/>
+              </a:ext>
+            </a:extLst>
+          </p:cNvPr>
+          <p:cNvCxnSpPr>
+            <a:cxnSpLocks/>
+          </p:cNvCxnSpPr>
+          <p:nvPr/>
+        </p:nvCxnSpPr>
+        <p:spPr>
+          <a:xfrm flipV="1">
+            <a:off x="127020" y="3819549"/>
+            <a:ext cx="5663276" cy="12788"/>
+          </a:xfrm>
+          <a:prstGeom prst="straightConnector1">
+            <a:avLst/>
+          </a:prstGeom>
+          <a:ln w="19050">
+            <a:solidFill>
+              <a:srgbClr val="0070C0"/>
+            </a:solidFill>
+            <a:prstDash val="sysDash"/>
+            <a:headEnd type="arrow" w="med" len="med"/>
+            <a:tailEnd type="none" w="med" len="med"/>
+          </a:ln>
+        </p:spPr>
+        <p:style>
+          <a:lnRef idx="1">
+            <a:schemeClr val="accent1"/>
+          </a:lnRef>
+          <a:fillRef idx="0">
+            <a:schemeClr val="accent1"/>
+          </a:fillRef>
+          <a:effectRef idx="0">
+            <a:schemeClr val="accent1"/>
+          </a:effectRef>
+          <a:fontRef idx="minor">
+            <a:schemeClr val="tx1"/>
+          </a:fontRef>
+        </p:style>
+      </p:cxnSp>
+      <p:sp>
+        <p:nvSpPr>
+          <p:cNvPr id="76" name="TextBox 75">
+            <a:extLst>
+              <a:ext uri="{FF2B5EF4-FFF2-40B4-BE49-F238E27FC236}">
+                <a16:creationId xmlns:a16="http://schemas.microsoft.com/office/drawing/2014/main" id="{9AC52F56-1BA5-4972-A07C-E11D427592EB}"/>
               </a:ext>
             </a:extLst>
           </p:cNvPr>
@@ -5438,16 +4663,13 @@
         </p:nvSpPr>
         <p:spPr>
           <a:xfrm>
-            <a:off x="304366" y="4380572"/>
-            <a:ext cx="466486" cy="184666"/>
+            <a:off x="358415" y="3237923"/>
+            <a:ext cx="2943239" cy="184666"/>
           </a:xfrm>
           <a:prstGeom prst="rect">
             <a:avLst/>
           </a:prstGeom>
           <a:noFill/>
-          <a:ln>
-            <a:noFill/>
-          </a:ln>
         </p:spPr>
         <p:txBody>
           <a:bodyPr wrap="square" lIns="0" tIns="0" rIns="0" bIns="0" rtlCol="0">
@@ -5467,12 +4689,28 @@
           </a:lstStyle>
           <a:p>
             <a:r>
-              <a:rPr lang="en-US" sz="1200" dirty="0">
-                <a:solidFill>
-                  <a:srgbClr val="FF0000"/>
-                </a:solidFill>
-              </a:rPr>
-              <a:t>[else]</a:t>
+              <a:rPr lang="en-US" sz="1200" dirty="0" err="1"/>
+              <a:t>saveConfig</a:t>
+            </a:r>
+            <a:r>
+              <a:rPr lang="en-US" sz="1200" dirty="0"/>
+              <a:t>(</a:t>
+            </a:r>
+            <a:r>
+              <a:rPr lang="en-US" sz="1200" dirty="0" err="1"/>
+              <a:t>updateConfig</a:t>
+            </a:r>
+            <a:r>
+              <a:rPr lang="en-US" sz="1200" dirty="0"/>
+              <a:t>, </a:t>
+            </a:r>
+            <a:r>
+              <a:rPr lang="en-US" sz="1200" dirty="0" err="1"/>
+              <a:t>configFilePathUsed</a:t>
+            </a:r>
+            <a:r>
+              <a:rPr lang="en-US" sz="1200" dirty="0"/>
+              <a:t>)</a:t>
             </a:r>
           </a:p>
         </p:txBody>

</xml_diff>

<commit_message>
edit: sequence diagram for changed method name
</commit_message>
<xml_diff>
--- a/docs/diagrams/LaunchMainAppSequenceDiagram.pptx
+++ b/docs/diagrams/LaunchMainAppSequenceDiagram.pptx
@@ -208,7 +208,7 @@
           <a:p>
             <a:fld id="{F5CC4B3F-88C1-4FFA-B1B6-F41C21DC6924}" type="datetimeFigureOut">
               <a:rPr lang="en-US" smtClean="0"/>
-              <a:t>11/3/2018</a:t>
+              <a:t>11/5/2018</a:t>
             </a:fld>
             <a:endParaRPr lang="en-US"/>
           </a:p>
@@ -654,7 +654,7 @@
           <a:p>
             <a:fld id="{78C97017-6FC3-485B-9764-EAC9E56C1D49}" type="datetimeFigureOut">
               <a:rPr lang="en-US" smtClean="0"/>
-              <a:t>11/3/2018</a:t>
+              <a:t>11/5/2018</a:t>
             </a:fld>
             <a:endParaRPr lang="en-US"/>
           </a:p>
@@ -822,7 +822,7 @@
           <a:p>
             <a:fld id="{78C97017-6FC3-485B-9764-EAC9E56C1D49}" type="datetimeFigureOut">
               <a:rPr lang="en-US" smtClean="0"/>
-              <a:t>11/3/2018</a:t>
+              <a:t>11/5/2018</a:t>
             </a:fld>
             <a:endParaRPr lang="en-US"/>
           </a:p>
@@ -1000,7 +1000,7 @@
           <a:p>
             <a:fld id="{78C97017-6FC3-485B-9764-EAC9E56C1D49}" type="datetimeFigureOut">
               <a:rPr lang="en-US" smtClean="0"/>
-              <a:t>11/3/2018</a:t>
+              <a:t>11/5/2018</a:t>
             </a:fld>
             <a:endParaRPr lang="en-US"/>
           </a:p>
@@ -1168,7 +1168,7 @@
           <a:p>
             <a:fld id="{78C97017-6FC3-485B-9764-EAC9E56C1D49}" type="datetimeFigureOut">
               <a:rPr lang="en-US" smtClean="0"/>
-              <a:t>11/3/2018</a:t>
+              <a:t>11/5/2018</a:t>
             </a:fld>
             <a:endParaRPr lang="en-US"/>
           </a:p>
@@ -1413,7 +1413,7 @@
           <a:p>
             <a:fld id="{78C97017-6FC3-485B-9764-EAC9E56C1D49}" type="datetimeFigureOut">
               <a:rPr lang="en-US" smtClean="0"/>
-              <a:t>11/3/2018</a:t>
+              <a:t>11/5/2018</a:t>
             </a:fld>
             <a:endParaRPr lang="en-US"/>
           </a:p>
@@ -1698,7 +1698,7 @@
           <a:p>
             <a:fld id="{78C97017-6FC3-485B-9764-EAC9E56C1D49}" type="datetimeFigureOut">
               <a:rPr lang="en-US" smtClean="0"/>
-              <a:t>11/3/2018</a:t>
+              <a:t>11/5/2018</a:t>
             </a:fld>
             <a:endParaRPr lang="en-US"/>
           </a:p>
@@ -2117,7 +2117,7 @@
           <a:p>
             <a:fld id="{78C97017-6FC3-485B-9764-EAC9E56C1D49}" type="datetimeFigureOut">
               <a:rPr lang="en-US" smtClean="0"/>
-              <a:t>11/3/2018</a:t>
+              <a:t>11/5/2018</a:t>
             </a:fld>
             <a:endParaRPr lang="en-US"/>
           </a:p>
@@ -2234,7 +2234,7 @@
           <a:p>
             <a:fld id="{78C97017-6FC3-485B-9764-EAC9E56C1D49}" type="datetimeFigureOut">
               <a:rPr lang="en-US" smtClean="0"/>
-              <a:t>11/3/2018</a:t>
+              <a:t>11/5/2018</a:t>
             </a:fld>
             <a:endParaRPr lang="en-US"/>
           </a:p>
@@ -2329,7 +2329,7 @@
           <a:p>
             <a:fld id="{78C97017-6FC3-485B-9764-EAC9E56C1D49}" type="datetimeFigureOut">
               <a:rPr lang="en-US" smtClean="0"/>
-              <a:t>11/3/2018</a:t>
+              <a:t>11/5/2018</a:t>
             </a:fld>
             <a:endParaRPr lang="en-US"/>
           </a:p>
@@ -2604,7 +2604,7 @@
           <a:p>
             <a:fld id="{78C97017-6FC3-485B-9764-EAC9E56C1D49}" type="datetimeFigureOut">
               <a:rPr lang="en-US" smtClean="0"/>
-              <a:t>11/3/2018</a:t>
+              <a:t>11/5/2018</a:t>
             </a:fld>
             <a:endParaRPr lang="en-US"/>
           </a:p>
@@ -2856,7 +2856,7 @@
           <a:p>
             <a:fld id="{78C97017-6FC3-485B-9764-EAC9E56C1D49}" type="datetimeFigureOut">
               <a:rPr lang="en-US" smtClean="0"/>
-              <a:t>11/3/2018</a:t>
+              <a:t>11/5/2018</a:t>
             </a:fld>
             <a:endParaRPr lang="en-US"/>
           </a:p>
@@ -3067,7 +3067,7 @@
           <a:p>
             <a:fld id="{78C97017-6FC3-485B-9764-EAC9E56C1D49}" type="datetimeFigureOut">
               <a:rPr lang="en-US" smtClean="0"/>
-              <a:t>11/3/2018</a:t>
+              <a:t>11/5/2018</a:t>
             </a:fld>
             <a:endParaRPr lang="en-US"/>
           </a:p>
@@ -3723,7 +3723,7 @@
         </p:nvSpPr>
         <p:spPr>
           <a:xfrm>
-            <a:off x="466620" y="1749088"/>
+            <a:off x="368982" y="1754032"/>
             <a:ext cx="1767759" cy="184666"/>
           </a:xfrm>
           <a:prstGeom prst="rect">
@@ -4688,7 +4688,7 @@
         </p:nvSpPr>
         <p:spPr>
           <a:xfrm>
-            <a:off x="420313" y="2189974"/>
+            <a:off x="309597" y="2189066"/>
             <a:ext cx="1767759" cy="184666"/>
           </a:xfrm>
           <a:prstGeom prst="rect">
@@ -4881,7 +4881,7 @@
         </p:nvSpPr>
         <p:spPr>
           <a:xfrm>
-            <a:off x="204818" y="2603766"/>
+            <a:off x="100376" y="2604097"/>
             <a:ext cx="1767759" cy="184666"/>
           </a:xfrm>
           <a:prstGeom prst="rect">
@@ -5074,8 +5074,8 @@
         </p:nvSpPr>
         <p:spPr>
           <a:xfrm>
-            <a:off x="410364" y="2991902"/>
-            <a:ext cx="2004612" cy="184666"/>
+            <a:off x="333712" y="2989641"/>
+            <a:ext cx="2515457" cy="184666"/>
           </a:xfrm>
           <a:prstGeom prst="rect">
             <a:avLst/>
@@ -5101,7 +5101,7 @@
           <a:p>
             <a:r>
               <a:rPr lang="en-US" sz="1200" dirty="0" err="1"/>
-              <a:t>createDefaultFileIfInvalidDate</a:t>
+              <a:t>createDefaultFileIfInvalidDateOrRange</a:t>
             </a:r>
             <a:r>
               <a:rPr lang="en-US" sz="1200" dirty="0"/>

</xml_diff>

<commit_message>
update: MainApp sequence diagram
</commit_message>
<xml_diff>
--- a/docs/diagrams/LaunchMainAppSequenceDiagram.pptx
+++ b/docs/diagrams/LaunchMainAppSequenceDiagram.pptx
@@ -208,7 +208,7 @@
           <a:p>
             <a:fld id="{F5CC4B3F-88C1-4FFA-B1B6-F41C21DC6924}" type="datetimeFigureOut">
               <a:rPr lang="en-US" smtClean="0"/>
-              <a:t>11/5/2018</a:t>
+              <a:t>11/7/2018</a:t>
             </a:fld>
             <a:endParaRPr lang="en-US"/>
           </a:p>
@@ -654,7 +654,7 @@
           <a:p>
             <a:fld id="{78C97017-6FC3-485B-9764-EAC9E56C1D49}" type="datetimeFigureOut">
               <a:rPr lang="en-US" smtClean="0"/>
-              <a:t>11/5/2018</a:t>
+              <a:t>11/7/2018</a:t>
             </a:fld>
             <a:endParaRPr lang="en-US"/>
           </a:p>
@@ -822,7 +822,7 @@
           <a:p>
             <a:fld id="{78C97017-6FC3-485B-9764-EAC9E56C1D49}" type="datetimeFigureOut">
               <a:rPr lang="en-US" smtClean="0"/>
-              <a:t>11/5/2018</a:t>
+              <a:t>11/7/2018</a:t>
             </a:fld>
             <a:endParaRPr lang="en-US"/>
           </a:p>
@@ -1000,7 +1000,7 @@
           <a:p>
             <a:fld id="{78C97017-6FC3-485B-9764-EAC9E56C1D49}" type="datetimeFigureOut">
               <a:rPr lang="en-US" smtClean="0"/>
-              <a:t>11/5/2018</a:t>
+              <a:t>11/7/2018</a:t>
             </a:fld>
             <a:endParaRPr lang="en-US"/>
           </a:p>
@@ -1168,7 +1168,7 @@
           <a:p>
             <a:fld id="{78C97017-6FC3-485B-9764-EAC9E56C1D49}" type="datetimeFigureOut">
               <a:rPr lang="en-US" smtClean="0"/>
-              <a:t>11/5/2018</a:t>
+              <a:t>11/7/2018</a:t>
             </a:fld>
             <a:endParaRPr lang="en-US"/>
           </a:p>
@@ -1413,7 +1413,7 @@
           <a:p>
             <a:fld id="{78C97017-6FC3-485B-9764-EAC9E56C1D49}" type="datetimeFigureOut">
               <a:rPr lang="en-US" smtClean="0"/>
-              <a:t>11/5/2018</a:t>
+              <a:t>11/7/2018</a:t>
             </a:fld>
             <a:endParaRPr lang="en-US"/>
           </a:p>
@@ -1698,7 +1698,7 @@
           <a:p>
             <a:fld id="{78C97017-6FC3-485B-9764-EAC9E56C1D49}" type="datetimeFigureOut">
               <a:rPr lang="en-US" smtClean="0"/>
-              <a:t>11/5/2018</a:t>
+              <a:t>11/7/2018</a:t>
             </a:fld>
             <a:endParaRPr lang="en-US"/>
           </a:p>
@@ -2117,7 +2117,7 @@
           <a:p>
             <a:fld id="{78C97017-6FC3-485B-9764-EAC9E56C1D49}" type="datetimeFigureOut">
               <a:rPr lang="en-US" smtClean="0"/>
-              <a:t>11/5/2018</a:t>
+              <a:t>11/7/2018</a:t>
             </a:fld>
             <a:endParaRPr lang="en-US"/>
           </a:p>
@@ -2234,7 +2234,7 @@
           <a:p>
             <a:fld id="{78C97017-6FC3-485B-9764-EAC9E56C1D49}" type="datetimeFigureOut">
               <a:rPr lang="en-US" smtClean="0"/>
-              <a:t>11/5/2018</a:t>
+              <a:t>11/7/2018</a:t>
             </a:fld>
             <a:endParaRPr lang="en-US"/>
           </a:p>
@@ -2329,7 +2329,7 @@
           <a:p>
             <a:fld id="{78C97017-6FC3-485B-9764-EAC9E56C1D49}" type="datetimeFigureOut">
               <a:rPr lang="en-US" smtClean="0"/>
-              <a:t>11/5/2018</a:t>
+              <a:t>11/7/2018</a:t>
             </a:fld>
             <a:endParaRPr lang="en-US"/>
           </a:p>
@@ -2604,7 +2604,7 @@
           <a:p>
             <a:fld id="{78C97017-6FC3-485B-9764-EAC9E56C1D49}" type="datetimeFigureOut">
               <a:rPr lang="en-US" smtClean="0"/>
-              <a:t>11/5/2018</a:t>
+              <a:t>11/7/2018</a:t>
             </a:fld>
             <a:endParaRPr lang="en-US"/>
           </a:p>
@@ -2856,7 +2856,7 @@
           <a:p>
             <a:fld id="{78C97017-6FC3-485B-9764-EAC9E56C1D49}" type="datetimeFigureOut">
               <a:rPr lang="en-US" smtClean="0"/>
-              <a:t>11/5/2018</a:t>
+              <a:t>11/7/2018</a:t>
             </a:fld>
             <a:endParaRPr lang="en-US"/>
           </a:p>
@@ -3067,7 +3067,7 @@
           <a:p>
             <a:fld id="{78C97017-6FC3-485B-9764-EAC9E56C1D49}" type="datetimeFigureOut">
               <a:rPr lang="en-US" smtClean="0"/>
-              <a:t>11/5/2018</a:t>
+              <a:t>11/7/2018</a:t>
             </a:fld>
             <a:endParaRPr lang="en-US"/>
           </a:p>
@@ -3865,7 +3865,7 @@
         <p:spPr>
           <a:xfrm>
             <a:off x="2971800" y="1320186"/>
-            <a:ext cx="0" cy="2108814"/>
+            <a:ext cx="0" cy="2816335"/>
           </a:xfrm>
           <a:prstGeom prst="line">
             <a:avLst/>
@@ -4118,7 +4118,7 @@
         <p:spPr>
           <a:xfrm>
             <a:off x="4653318" y="1320186"/>
-            <a:ext cx="0" cy="3082020"/>
+            <a:ext cx="12663" cy="3286903"/>
           </a:xfrm>
           <a:prstGeom prst="line">
             <a:avLst/>
@@ -4162,7 +4162,7 @@
         </p:nvCxnSpPr>
         <p:spPr>
           <a:xfrm flipV="1">
-            <a:off x="171943" y="3866313"/>
+            <a:off x="165101" y="4298881"/>
             <a:ext cx="4414857" cy="25408"/>
           </a:xfrm>
           <a:prstGeom prst="straightConnector1">
@@ -4204,8 +4204,8 @@
         </p:nvSpPr>
         <p:spPr>
           <a:xfrm>
-            <a:off x="4579062" y="3862517"/>
-            <a:ext cx="173839" cy="357555"/>
+            <a:off x="4586093" y="4280753"/>
+            <a:ext cx="173839" cy="191237"/>
           </a:xfrm>
           <a:prstGeom prst="rect">
             <a:avLst/>
@@ -4259,8 +4259,8 @@
         </p:nvCxnSpPr>
         <p:spPr>
           <a:xfrm flipV="1">
-            <a:off x="162746" y="4195083"/>
-            <a:ext cx="4409119" cy="9957"/>
+            <a:off x="148481" y="4473193"/>
+            <a:ext cx="4434470" cy="913"/>
           </a:xfrm>
           <a:prstGeom prst="straightConnector1">
             <a:avLst/>
@@ -4303,7 +4303,7 @@
         </p:nvSpPr>
         <p:spPr>
           <a:xfrm>
-            <a:off x="436964" y="3613498"/>
+            <a:off x="368982" y="4044188"/>
             <a:ext cx="2114359" cy="184666"/>
           </a:xfrm>
           <a:prstGeom prst="rect">
@@ -4481,7 +4481,7 @@
         </p:nvCxnSpPr>
         <p:spPr>
           <a:xfrm flipV="1">
-            <a:off x="201248" y="4641970"/>
+            <a:off x="201211" y="4785309"/>
             <a:ext cx="5624922" cy="45871"/>
           </a:xfrm>
           <a:prstGeom prst="straightConnector1">
@@ -4523,8 +4523,8 @@
         </p:nvSpPr>
         <p:spPr>
           <a:xfrm>
-            <a:off x="5812085" y="4622529"/>
-            <a:ext cx="173839" cy="357555"/>
+            <a:off x="5812085" y="4772116"/>
+            <a:ext cx="173839" cy="207968"/>
           </a:xfrm>
           <a:prstGeom prst="rect">
             <a:avLst/>
@@ -4622,7 +4622,7 @@
         </p:nvSpPr>
         <p:spPr>
           <a:xfrm>
-            <a:off x="389535" y="4385817"/>
+            <a:off x="360378" y="4607089"/>
             <a:ext cx="2943239" cy="184666"/>
           </a:xfrm>
           <a:prstGeom prst="rect">
@@ -4688,7 +4688,7 @@
         </p:nvSpPr>
         <p:spPr>
           <a:xfrm>
-            <a:off x="309597" y="2189066"/>
+            <a:off x="309597" y="2604553"/>
             <a:ext cx="1767759" cy="184666"/>
           </a:xfrm>
           <a:prstGeom prst="rect">
@@ -4740,7 +4740,7 @@
         </p:nvCxnSpPr>
         <p:spPr>
           <a:xfrm flipV="1">
-            <a:off x="133032" y="2391420"/>
+            <a:off x="133032" y="2806907"/>
             <a:ext cx="2757860" cy="25408"/>
           </a:xfrm>
           <a:prstGeom prst="straightConnector1">
@@ -4782,7 +4782,7 @@
         </p:nvSpPr>
         <p:spPr>
           <a:xfrm>
-            <a:off x="2901612" y="2369033"/>
+            <a:off x="2901612" y="2784520"/>
             <a:ext cx="173839" cy="114346"/>
           </a:xfrm>
           <a:prstGeom prst="rect">
@@ -4837,7 +4837,7 @@
         </p:nvCxnSpPr>
         <p:spPr>
           <a:xfrm flipV="1">
-            <a:off x="151279" y="2477090"/>
+            <a:off x="151279" y="2892577"/>
             <a:ext cx="2753626" cy="19914"/>
           </a:xfrm>
           <a:prstGeom prst="straightConnector1">
@@ -4881,7 +4881,7 @@
         </p:nvSpPr>
         <p:spPr>
           <a:xfrm>
-            <a:off x="100376" y="2604097"/>
+            <a:off x="100376" y="3019584"/>
             <a:ext cx="1767759" cy="184666"/>
           </a:xfrm>
           <a:prstGeom prst="rect">
@@ -4933,7 +4933,7 @@
         </p:nvCxnSpPr>
         <p:spPr>
           <a:xfrm flipV="1">
-            <a:off x="127020" y="2811634"/>
+            <a:off x="127020" y="3227121"/>
             <a:ext cx="2757860" cy="25408"/>
           </a:xfrm>
           <a:prstGeom prst="straightConnector1">
@@ -4975,7 +4975,7 @@
         </p:nvSpPr>
         <p:spPr>
           <a:xfrm>
-            <a:off x="2895600" y="2789247"/>
+            <a:off x="2895600" y="3204734"/>
             <a:ext cx="173839" cy="114346"/>
           </a:xfrm>
           <a:prstGeom prst="rect">
@@ -5030,7 +5030,7 @@
         </p:nvCxnSpPr>
         <p:spPr>
           <a:xfrm flipV="1">
-            <a:off x="143195" y="2894016"/>
+            <a:off x="143195" y="3309503"/>
             <a:ext cx="2753626" cy="19914"/>
           </a:xfrm>
           <a:prstGeom prst="straightConnector1">
@@ -5074,7 +5074,7 @@
         </p:nvSpPr>
         <p:spPr>
           <a:xfrm>
-            <a:off x="333712" y="2989641"/>
+            <a:off x="333712" y="3405128"/>
             <a:ext cx="2515457" cy="184666"/>
           </a:xfrm>
           <a:prstGeom prst="rect">
@@ -5126,7 +5126,7 @@
         </p:nvCxnSpPr>
         <p:spPr>
           <a:xfrm flipV="1">
-            <a:off x="127020" y="3215616"/>
+            <a:off x="127020" y="3631103"/>
             <a:ext cx="2757860" cy="25408"/>
           </a:xfrm>
           <a:prstGeom prst="straightConnector1">
@@ -5168,7 +5168,7 @@
         </p:nvSpPr>
         <p:spPr>
           <a:xfrm>
-            <a:off x="2895600" y="3193229"/>
+            <a:off x="2895600" y="3608716"/>
             <a:ext cx="173839" cy="114346"/>
           </a:xfrm>
           <a:prstGeom prst="rect">
@@ -5223,7 +5223,200 @@
         </p:nvCxnSpPr>
         <p:spPr>
           <a:xfrm flipV="1">
-            <a:off x="139886" y="3298399"/>
+            <a:off x="139886" y="3713886"/>
+            <a:ext cx="2753626" cy="19914"/>
+          </a:xfrm>
+          <a:prstGeom prst="straightConnector1">
+            <a:avLst/>
+          </a:prstGeom>
+          <a:ln w="19050">
+            <a:solidFill>
+              <a:srgbClr val="0070C0"/>
+            </a:solidFill>
+            <a:prstDash val="sysDash"/>
+            <a:headEnd type="arrow" w="med" len="med"/>
+            <a:tailEnd type="none" w="med" len="med"/>
+          </a:ln>
+        </p:spPr>
+        <p:style>
+          <a:lnRef idx="1">
+            <a:schemeClr val="accent1"/>
+          </a:lnRef>
+          <a:fillRef idx="0">
+            <a:schemeClr val="accent1"/>
+          </a:fillRef>
+          <a:effectRef idx="0">
+            <a:schemeClr val="accent1"/>
+          </a:effectRef>
+          <a:fontRef idx="minor">
+            <a:schemeClr val="tx1"/>
+          </a:fontRef>
+        </p:style>
+      </p:cxnSp>
+      <p:sp>
+        <p:nvSpPr>
+          <p:cNvPr id="58" name="TextBox 57">
+            <a:extLst>
+              <a:ext uri="{FF2B5EF4-FFF2-40B4-BE49-F238E27FC236}">
+                <a16:creationId xmlns:a16="http://schemas.microsoft.com/office/drawing/2014/main" id="{1E341CC3-725C-42AE-97F8-A6BEE740D66C}"/>
+              </a:ext>
+            </a:extLst>
+          </p:cNvPr>
+          <p:cNvSpPr txBox="1"/>
+          <p:nvPr/>
+        </p:nvSpPr>
+        <p:spPr>
+          <a:xfrm>
+            <a:off x="41752" y="2187419"/>
+            <a:ext cx="2474174" cy="184666"/>
+          </a:xfrm>
+          <a:prstGeom prst="rect">
+            <a:avLst/>
+          </a:prstGeom>
+          <a:noFill/>
+        </p:spPr>
+        <p:txBody>
+          <a:bodyPr wrap="square" lIns="0" tIns="0" rIns="0" bIns="0" rtlCol="0">
+            <a:spAutoFit/>
+          </a:bodyPr>
+          <a:lstStyle>
+            <a:defPPr>
+              <a:defRPr lang="en-US"/>
+            </a:defPPr>
+            <a:lvl1pPr algn="r">
+              <a:defRPr sz="1400">
+                <a:solidFill>
+                  <a:srgbClr val="0070C0"/>
+                </a:solidFill>
+              </a:defRPr>
+            </a:lvl1pPr>
+          </a:lstStyle>
+          <a:p>
+            <a:r>
+              <a:rPr lang="en-US" sz="1200" dirty="0" err="1"/>
+              <a:t>createDefaultFileIfUnableConvert</a:t>
+            </a:r>
+            <a:r>
+              <a:rPr lang="en-US" sz="1200" dirty="0"/>
+              <a:t>()</a:t>
+            </a:r>
+          </a:p>
+        </p:txBody>
+      </p:sp>
+      <p:cxnSp>
+        <p:nvCxnSpPr>
+          <p:cNvPr id="59" name="Straight Arrow Connector 58">
+            <a:extLst>
+              <a:ext uri="{FF2B5EF4-FFF2-40B4-BE49-F238E27FC236}">
+                <a16:creationId xmlns:a16="http://schemas.microsoft.com/office/drawing/2014/main" id="{E38E36C3-8503-4C29-9832-4886BB3D464B}"/>
+              </a:ext>
+            </a:extLst>
+          </p:cNvPr>
+          <p:cNvCxnSpPr>
+            <a:cxnSpLocks/>
+          </p:cNvCxnSpPr>
+          <p:nvPr/>
+        </p:nvCxnSpPr>
+        <p:spPr>
+          <a:xfrm flipV="1">
+            <a:off x="133032" y="2389775"/>
+            <a:ext cx="2757860" cy="25408"/>
+          </a:xfrm>
+          <a:prstGeom prst="straightConnector1">
+            <a:avLst/>
+          </a:prstGeom>
+          <a:ln w="19050">
+            <a:solidFill>
+              <a:srgbClr val="0070C0"/>
+            </a:solidFill>
+            <a:tailEnd type="arrow"/>
+          </a:ln>
+        </p:spPr>
+        <p:style>
+          <a:lnRef idx="1">
+            <a:schemeClr val="accent1"/>
+          </a:lnRef>
+          <a:fillRef idx="0">
+            <a:schemeClr val="accent1"/>
+          </a:fillRef>
+          <a:effectRef idx="0">
+            <a:schemeClr val="accent1"/>
+          </a:effectRef>
+          <a:fontRef idx="minor">
+            <a:schemeClr val="tx1"/>
+          </a:fontRef>
+        </p:style>
+      </p:cxnSp>
+      <p:sp>
+        <p:nvSpPr>
+          <p:cNvPr id="62" name="Rectangle 61">
+            <a:extLst>
+              <a:ext uri="{FF2B5EF4-FFF2-40B4-BE49-F238E27FC236}">
+                <a16:creationId xmlns:a16="http://schemas.microsoft.com/office/drawing/2014/main" id="{1098B6C9-0ECC-4550-9472-6B5A958D1EB2}"/>
+              </a:ext>
+            </a:extLst>
+          </p:cNvPr>
+          <p:cNvSpPr/>
+          <p:nvPr/>
+        </p:nvSpPr>
+        <p:spPr>
+          <a:xfrm>
+            <a:off x="2901612" y="2367388"/>
+            <a:ext cx="173839" cy="114346"/>
+          </a:xfrm>
+          <a:prstGeom prst="rect">
+            <a:avLst/>
+          </a:prstGeom>
+          <a:solidFill>
+            <a:srgbClr val="0070C0"/>
+          </a:solidFill>
+          <a:ln>
+            <a:solidFill>
+              <a:srgbClr val="0070C0"/>
+            </a:solidFill>
+          </a:ln>
+          <a:effectLst/>
+        </p:spPr>
+        <p:style>
+          <a:lnRef idx="1">
+            <a:schemeClr val="accent3"/>
+          </a:lnRef>
+          <a:fillRef idx="2">
+            <a:schemeClr val="accent3"/>
+          </a:fillRef>
+          <a:effectRef idx="1">
+            <a:schemeClr val="accent3"/>
+          </a:effectRef>
+          <a:fontRef idx="minor">
+            <a:schemeClr val="dk1"/>
+          </a:fontRef>
+        </p:style>
+        <p:txBody>
+          <a:bodyPr rtlCol="0" anchor="ctr"/>
+          <a:lstStyle/>
+          <a:p>
+            <a:pPr algn="ctr"/>
+            <a:endParaRPr lang="en-SG" sz="1400"/>
+          </a:p>
+        </p:txBody>
+      </p:sp>
+      <p:cxnSp>
+        <p:nvCxnSpPr>
+          <p:cNvPr id="66" name="Straight Arrow Connector 65">
+            <a:extLst>
+              <a:ext uri="{FF2B5EF4-FFF2-40B4-BE49-F238E27FC236}">
+                <a16:creationId xmlns:a16="http://schemas.microsoft.com/office/drawing/2014/main" id="{CB27691D-7005-43C2-A8A5-4491DAA8D822}"/>
+              </a:ext>
+            </a:extLst>
+          </p:cNvPr>
+          <p:cNvCxnSpPr>
+            <a:cxnSpLocks/>
+          </p:cNvCxnSpPr>
+          <p:nvPr/>
+        </p:nvCxnSpPr>
+        <p:spPr>
+          <a:xfrm flipV="1">
+            <a:off x="149207" y="2473482"/>
             <a:ext cx="2753626" cy="19914"/>
           </a:xfrm>
           <a:prstGeom prst="straightConnector1">

</xml_diff>

<commit_message>
fix: LaunchMainApp sequence diagram
</commit_message>
<xml_diff>
--- a/docs/diagrams/LaunchMainAppSequenceDiagram.pptx
+++ b/docs/diagrams/LaunchMainAppSequenceDiagram.pptx
@@ -208,7 +208,7 @@
           <a:p>
             <a:fld id="{F5CC4B3F-88C1-4FFA-B1B6-F41C21DC6924}" type="datetimeFigureOut">
               <a:rPr lang="en-US" smtClean="0"/>
-              <a:t>11/7/2018</a:t>
+              <a:t>11/10/2018</a:t>
             </a:fld>
             <a:endParaRPr lang="en-US"/>
           </a:p>
@@ -654,7 +654,7 @@
           <a:p>
             <a:fld id="{78C97017-6FC3-485B-9764-EAC9E56C1D49}" type="datetimeFigureOut">
               <a:rPr lang="en-US" smtClean="0"/>
-              <a:t>11/7/2018</a:t>
+              <a:t>11/10/2018</a:t>
             </a:fld>
             <a:endParaRPr lang="en-US"/>
           </a:p>
@@ -822,7 +822,7 @@
           <a:p>
             <a:fld id="{78C97017-6FC3-485B-9764-EAC9E56C1D49}" type="datetimeFigureOut">
               <a:rPr lang="en-US" smtClean="0"/>
-              <a:t>11/7/2018</a:t>
+              <a:t>11/10/2018</a:t>
             </a:fld>
             <a:endParaRPr lang="en-US"/>
           </a:p>
@@ -1000,7 +1000,7 @@
           <a:p>
             <a:fld id="{78C97017-6FC3-485B-9764-EAC9E56C1D49}" type="datetimeFigureOut">
               <a:rPr lang="en-US" smtClean="0"/>
-              <a:t>11/7/2018</a:t>
+              <a:t>11/10/2018</a:t>
             </a:fld>
             <a:endParaRPr lang="en-US"/>
           </a:p>
@@ -1168,7 +1168,7 @@
           <a:p>
             <a:fld id="{78C97017-6FC3-485B-9764-EAC9E56C1D49}" type="datetimeFigureOut">
               <a:rPr lang="en-US" smtClean="0"/>
-              <a:t>11/7/2018</a:t>
+              <a:t>11/10/2018</a:t>
             </a:fld>
             <a:endParaRPr lang="en-US"/>
           </a:p>
@@ -1413,7 +1413,7 @@
           <a:p>
             <a:fld id="{78C97017-6FC3-485B-9764-EAC9E56C1D49}" type="datetimeFigureOut">
               <a:rPr lang="en-US" smtClean="0"/>
-              <a:t>11/7/2018</a:t>
+              <a:t>11/10/2018</a:t>
             </a:fld>
             <a:endParaRPr lang="en-US"/>
           </a:p>
@@ -1698,7 +1698,7 @@
           <a:p>
             <a:fld id="{78C97017-6FC3-485B-9764-EAC9E56C1D49}" type="datetimeFigureOut">
               <a:rPr lang="en-US" smtClean="0"/>
-              <a:t>11/7/2018</a:t>
+              <a:t>11/10/2018</a:t>
             </a:fld>
             <a:endParaRPr lang="en-US"/>
           </a:p>
@@ -2117,7 +2117,7 @@
           <a:p>
             <a:fld id="{78C97017-6FC3-485B-9764-EAC9E56C1D49}" type="datetimeFigureOut">
               <a:rPr lang="en-US" smtClean="0"/>
-              <a:t>11/7/2018</a:t>
+              <a:t>11/10/2018</a:t>
             </a:fld>
             <a:endParaRPr lang="en-US"/>
           </a:p>
@@ -2234,7 +2234,7 @@
           <a:p>
             <a:fld id="{78C97017-6FC3-485B-9764-EAC9E56C1D49}" type="datetimeFigureOut">
               <a:rPr lang="en-US" smtClean="0"/>
-              <a:t>11/7/2018</a:t>
+              <a:t>11/10/2018</a:t>
             </a:fld>
             <a:endParaRPr lang="en-US"/>
           </a:p>
@@ -2329,7 +2329,7 @@
           <a:p>
             <a:fld id="{78C97017-6FC3-485B-9764-EAC9E56C1D49}" type="datetimeFigureOut">
               <a:rPr lang="en-US" smtClean="0"/>
-              <a:t>11/7/2018</a:t>
+              <a:t>11/10/2018</a:t>
             </a:fld>
             <a:endParaRPr lang="en-US"/>
           </a:p>
@@ -2604,7 +2604,7 @@
           <a:p>
             <a:fld id="{78C97017-6FC3-485B-9764-EAC9E56C1D49}" type="datetimeFigureOut">
               <a:rPr lang="en-US" smtClean="0"/>
-              <a:t>11/7/2018</a:t>
+              <a:t>11/10/2018</a:t>
             </a:fld>
             <a:endParaRPr lang="en-US"/>
           </a:p>
@@ -2856,7 +2856,7 @@
           <a:p>
             <a:fld id="{78C97017-6FC3-485B-9764-EAC9E56C1D49}" type="datetimeFigureOut">
               <a:rPr lang="en-US" smtClean="0"/>
-              <a:t>11/7/2018</a:t>
+              <a:t>11/10/2018</a:t>
             </a:fld>
             <a:endParaRPr lang="en-US"/>
           </a:p>
@@ -3067,7 +3067,7 @@
           <a:p>
             <a:fld id="{78C97017-6FC3-485B-9764-EAC9E56C1D49}" type="datetimeFigureOut">
               <a:rPr lang="en-US" smtClean="0"/>
-              <a:t>11/7/2018</a:t>
+              <a:t>11/10/2018</a:t>
             </a:fld>
             <a:endParaRPr lang="en-US"/>
           </a:p>
@@ -4146,12 +4146,196 @@
           </a:fontRef>
         </p:style>
       </p:cxnSp>
+      <p:sp>
+        <p:nvSpPr>
+          <p:cNvPr id="53" name="Rectangle 52">
+            <a:extLst>
+              <a:ext uri="{FF2B5EF4-FFF2-40B4-BE49-F238E27FC236}">
+                <a16:creationId xmlns:a16="http://schemas.microsoft.com/office/drawing/2014/main" id="{FBE91152-CAA0-40F9-A636-95D6D3ED0062}"/>
+              </a:ext>
+            </a:extLst>
+          </p:cNvPr>
+          <p:cNvSpPr/>
+          <p:nvPr/>
+        </p:nvSpPr>
+        <p:spPr>
+          <a:xfrm>
+            <a:off x="4586093" y="4280753"/>
+            <a:ext cx="173839" cy="191237"/>
+          </a:xfrm>
+          <a:prstGeom prst="rect">
+            <a:avLst/>
+          </a:prstGeom>
+          <a:solidFill>
+            <a:srgbClr val="0070C0"/>
+          </a:solidFill>
+          <a:ln>
+            <a:solidFill>
+              <a:srgbClr val="0070C0"/>
+            </a:solidFill>
+          </a:ln>
+          <a:effectLst/>
+        </p:spPr>
+        <p:style>
+          <a:lnRef idx="1">
+            <a:schemeClr val="accent3"/>
+          </a:lnRef>
+          <a:fillRef idx="2">
+            <a:schemeClr val="accent3"/>
+          </a:fillRef>
+          <a:effectRef idx="1">
+            <a:schemeClr val="accent3"/>
+          </a:effectRef>
+          <a:fontRef idx="minor">
+            <a:schemeClr val="dk1"/>
+          </a:fontRef>
+        </p:style>
+        <p:txBody>
+          <a:bodyPr rtlCol="0" anchor="ctr"/>
+          <a:lstStyle/>
+          <a:p>
+            <a:pPr algn="ctr"/>
+            <a:endParaRPr lang="en-SG" sz="1400"/>
+          </a:p>
+        </p:txBody>
+      </p:sp>
+      <p:sp>
+        <p:nvSpPr>
+          <p:cNvPr id="56" name="TextBox 55">
+            <a:extLst>
+              <a:ext uri="{FF2B5EF4-FFF2-40B4-BE49-F238E27FC236}">
+                <a16:creationId xmlns:a16="http://schemas.microsoft.com/office/drawing/2014/main" id="{96035D04-72BC-4FEB-AC4C-51F9D3C361CE}"/>
+              </a:ext>
+            </a:extLst>
+          </p:cNvPr>
+          <p:cNvSpPr txBox="1"/>
+          <p:nvPr/>
+        </p:nvSpPr>
+        <p:spPr>
+          <a:xfrm>
+            <a:off x="368982" y="4044188"/>
+            <a:ext cx="2114359" cy="184666"/>
+          </a:xfrm>
+          <a:prstGeom prst="rect">
+            <a:avLst/>
+          </a:prstGeom>
+          <a:noFill/>
+        </p:spPr>
+        <p:txBody>
+          <a:bodyPr wrap="square" lIns="0" tIns="0" rIns="0" bIns="0" rtlCol="0">
+            <a:spAutoFit/>
+          </a:bodyPr>
+          <a:lstStyle>
+            <a:defPPr>
+              <a:defRPr lang="en-US"/>
+            </a:defPPr>
+            <a:lvl1pPr algn="r">
+              <a:defRPr sz="1400">
+                <a:solidFill>
+                  <a:srgbClr val="0070C0"/>
+                </a:solidFill>
+              </a:defRPr>
+            </a:lvl1pPr>
+          </a:lstStyle>
+          <a:p>
+            <a:r>
+              <a:rPr lang="en-US" sz="1200" dirty="0" err="1"/>
+              <a:t>setAppTitle</a:t>
+            </a:r>
+            <a:r>
+              <a:rPr lang="en-US" sz="1200" dirty="0"/>
+              <a:t>(</a:t>
+            </a:r>
+            <a:r>
+              <a:rPr lang="en-US" sz="1200" dirty="0" err="1"/>
+              <a:t>f.computeAppTitle</a:t>
+            </a:r>
+            <a:r>
+              <a:rPr lang="en-US" sz="1200" dirty="0"/>
+              <a:t>())</a:t>
+            </a:r>
+          </a:p>
+        </p:txBody>
+      </p:sp>
+      <p:sp>
+        <p:nvSpPr>
+          <p:cNvPr id="61" name="Rectangle 62">
+            <a:extLst>
+              <a:ext uri="{FF2B5EF4-FFF2-40B4-BE49-F238E27FC236}">
+                <a16:creationId xmlns:a16="http://schemas.microsoft.com/office/drawing/2014/main" id="{7A7FFF98-5CAF-43FF-BC90-40BBBC3669F4}"/>
+              </a:ext>
+            </a:extLst>
+          </p:cNvPr>
+          <p:cNvSpPr/>
+          <p:nvPr/>
+        </p:nvSpPr>
+        <p:spPr>
+          <a:xfrm>
+            <a:off x="5279228" y="871109"/>
+            <a:ext cx="1179592" cy="461538"/>
+          </a:xfrm>
+          <a:prstGeom prst="rect">
+            <a:avLst/>
+          </a:prstGeom>
+          <a:solidFill>
+            <a:srgbClr val="0070C0"/>
+          </a:solidFill>
+          <a:ln w="19050">
+            <a:solidFill>
+              <a:srgbClr val="0070C0"/>
+            </a:solidFill>
+          </a:ln>
+          <a:effectLst/>
+        </p:spPr>
+        <p:style>
+          <a:lnRef idx="1">
+            <a:schemeClr val="accent2"/>
+          </a:lnRef>
+          <a:fillRef idx="2">
+            <a:schemeClr val="accent2"/>
+          </a:fillRef>
+          <a:effectRef idx="1">
+            <a:schemeClr val="accent2"/>
+          </a:effectRef>
+          <a:fontRef idx="minor">
+            <a:schemeClr val="dk1"/>
+          </a:fontRef>
+        </p:style>
+        <p:txBody>
+          <a:bodyPr rtlCol="0" anchor="ctr"/>
+          <a:lstStyle/>
+          <a:p>
+            <a:pPr algn="ctr"/>
+            <a:r>
+              <a:rPr lang="en-US" sz="1600" dirty="0">
+                <a:solidFill>
+                  <a:schemeClr val="bg1"/>
+                </a:solidFill>
+              </a:rPr>
+              <a:t>:</a:t>
+            </a:r>
+            <a:r>
+              <a:rPr lang="en-US" sz="1600" dirty="0" err="1">
+                <a:solidFill>
+                  <a:schemeClr val="bg1"/>
+                </a:solidFill>
+              </a:rPr>
+              <a:t>ConfigUtil</a:t>
+            </a:r>
+            <a:endParaRPr lang="en-SG" sz="1600" dirty="0">
+              <a:solidFill>
+                <a:schemeClr val="bg1"/>
+              </a:solidFill>
+            </a:endParaRPr>
+          </a:p>
+        </p:txBody>
+      </p:sp>
       <p:cxnSp>
         <p:nvCxnSpPr>
-          <p:cNvPr id="51" name="Straight Arrow Connector 50">
+          <p:cNvPr id="63" name="Straight Connector 62">
             <a:extLst>
               <a:ext uri="{FF2B5EF4-FFF2-40B4-BE49-F238E27FC236}">
-                <a16:creationId xmlns:a16="http://schemas.microsoft.com/office/drawing/2014/main" id="{95E037EB-F239-4680-9DEE-BB036D9D1EAF}"/>
+                <a16:creationId xmlns:a16="http://schemas.microsoft.com/office/drawing/2014/main" id="{42E2022C-626A-49E1-A032-BC8B14B482D2}"/>
               </a:ext>
             </a:extLst>
           </p:cNvPr>
@@ -4161,9 +4345,223 @@
           <p:nvPr/>
         </p:nvCxnSpPr>
         <p:spPr>
+          <a:xfrm>
+            <a:off x="5867885" y="1256030"/>
+            <a:ext cx="0" cy="3973188"/>
+          </a:xfrm>
+          <a:prstGeom prst="line">
+            <a:avLst/>
+          </a:prstGeom>
+          <a:ln w="19050">
+            <a:solidFill>
+              <a:srgbClr val="0070C0"/>
+            </a:solidFill>
+            <a:prstDash val="sysDash"/>
+          </a:ln>
+          <a:effectLst/>
+        </p:spPr>
+        <p:style>
+          <a:lnRef idx="1">
+            <a:schemeClr val="accent1"/>
+          </a:lnRef>
+          <a:fillRef idx="2">
+            <a:schemeClr val="accent1"/>
+          </a:fillRef>
+          <a:effectRef idx="1">
+            <a:schemeClr val="accent1"/>
+          </a:effectRef>
+          <a:fontRef idx="minor">
+            <a:schemeClr val="dk1"/>
+          </a:fontRef>
+        </p:style>
+      </p:cxnSp>
+      <p:sp>
+        <p:nvSpPr>
+          <p:cNvPr id="65" name="Rectangle 64">
+            <a:extLst>
+              <a:ext uri="{FF2B5EF4-FFF2-40B4-BE49-F238E27FC236}">
+                <a16:creationId xmlns:a16="http://schemas.microsoft.com/office/drawing/2014/main" id="{D85A79D2-9577-4A71-B3B7-03C4B7F02E53}"/>
+              </a:ext>
+            </a:extLst>
+          </p:cNvPr>
+          <p:cNvSpPr/>
+          <p:nvPr/>
+        </p:nvSpPr>
+        <p:spPr>
+          <a:xfrm>
+            <a:off x="5812085" y="4772116"/>
+            <a:ext cx="173839" cy="207968"/>
+          </a:xfrm>
+          <a:prstGeom prst="rect">
+            <a:avLst/>
+          </a:prstGeom>
+          <a:solidFill>
+            <a:srgbClr val="0070C0"/>
+          </a:solidFill>
+          <a:ln>
+            <a:solidFill>
+              <a:srgbClr val="0070C0"/>
+            </a:solidFill>
+          </a:ln>
+          <a:effectLst/>
+        </p:spPr>
+        <p:style>
+          <a:lnRef idx="1">
+            <a:schemeClr val="accent3"/>
+          </a:lnRef>
+          <a:fillRef idx="2">
+            <a:schemeClr val="accent3"/>
+          </a:fillRef>
+          <a:effectRef idx="1">
+            <a:schemeClr val="accent3"/>
+          </a:effectRef>
+          <a:fontRef idx="minor">
+            <a:schemeClr val="dk1"/>
+          </a:fontRef>
+        </p:style>
+        <p:txBody>
+          <a:bodyPr rtlCol="0" anchor="ctr"/>
+          <a:lstStyle/>
+          <a:p>
+            <a:pPr algn="ctr"/>
+            <a:endParaRPr lang="en-SG" sz="1400"/>
+          </a:p>
+        </p:txBody>
+      </p:sp>
+      <p:sp>
+        <p:nvSpPr>
+          <p:cNvPr id="76" name="TextBox 75">
+            <a:extLst>
+              <a:ext uri="{FF2B5EF4-FFF2-40B4-BE49-F238E27FC236}">
+                <a16:creationId xmlns:a16="http://schemas.microsoft.com/office/drawing/2014/main" id="{9AC52F56-1BA5-4972-A07C-E11D427592EB}"/>
+              </a:ext>
+            </a:extLst>
+          </p:cNvPr>
+          <p:cNvSpPr txBox="1"/>
+          <p:nvPr/>
+        </p:nvSpPr>
+        <p:spPr>
+          <a:xfrm>
+            <a:off x="333712" y="4567911"/>
+            <a:ext cx="2943239" cy="184666"/>
+          </a:xfrm>
+          <a:prstGeom prst="rect">
+            <a:avLst/>
+          </a:prstGeom>
+          <a:noFill/>
+        </p:spPr>
+        <p:txBody>
+          <a:bodyPr wrap="square" lIns="0" tIns="0" rIns="0" bIns="0" rtlCol="0">
+            <a:spAutoFit/>
+          </a:bodyPr>
+          <a:lstStyle>
+            <a:defPPr>
+              <a:defRPr lang="en-US"/>
+            </a:defPPr>
+            <a:lvl1pPr algn="r">
+              <a:defRPr sz="1400">
+                <a:solidFill>
+                  <a:srgbClr val="0070C0"/>
+                </a:solidFill>
+              </a:defRPr>
+            </a:lvl1pPr>
+          </a:lstStyle>
+          <a:p>
+            <a:r>
+              <a:rPr lang="en-US" sz="1200" dirty="0" err="1"/>
+              <a:t>saveConfig</a:t>
+            </a:r>
+            <a:r>
+              <a:rPr lang="en-US" sz="1200" dirty="0"/>
+              <a:t>(</a:t>
+            </a:r>
+            <a:r>
+              <a:rPr lang="en-US" sz="1200" dirty="0" err="1"/>
+              <a:t>updateConfig</a:t>
+            </a:r>
+            <a:r>
+              <a:rPr lang="en-US" sz="1200" dirty="0"/>
+              <a:t>, </a:t>
+            </a:r>
+            <a:r>
+              <a:rPr lang="en-US" sz="1200" dirty="0" err="1"/>
+              <a:t>configFilePathUsed</a:t>
+            </a:r>
+            <a:r>
+              <a:rPr lang="en-US" sz="1200" dirty="0"/>
+              <a:t>)</a:t>
+            </a:r>
+          </a:p>
+        </p:txBody>
+      </p:sp>
+      <p:sp>
+        <p:nvSpPr>
+          <p:cNvPr id="30" name="TextBox 29">
+            <a:extLst>
+              <a:ext uri="{FF2B5EF4-FFF2-40B4-BE49-F238E27FC236}">
+                <a16:creationId xmlns:a16="http://schemas.microsoft.com/office/drawing/2014/main" id="{29F9C009-DB5D-4523-BD74-0B5EA60FE6BA}"/>
+              </a:ext>
+            </a:extLst>
+          </p:cNvPr>
+          <p:cNvSpPr txBox="1"/>
+          <p:nvPr/>
+        </p:nvSpPr>
+        <p:spPr>
+          <a:xfrm>
+            <a:off x="309597" y="2604553"/>
+            <a:ext cx="1767759" cy="184666"/>
+          </a:xfrm>
+          <a:prstGeom prst="rect">
+            <a:avLst/>
+          </a:prstGeom>
+          <a:noFill/>
+        </p:spPr>
+        <p:txBody>
+          <a:bodyPr wrap="square" lIns="0" tIns="0" rIns="0" bIns="0" rtlCol="0">
+            <a:spAutoFit/>
+          </a:bodyPr>
+          <a:lstStyle>
+            <a:defPPr>
+              <a:defRPr lang="en-US"/>
+            </a:defPPr>
+            <a:lvl1pPr algn="r">
+              <a:defRPr sz="1400">
+                <a:solidFill>
+                  <a:srgbClr val="0070C0"/>
+                </a:solidFill>
+              </a:defRPr>
+            </a:lvl1pPr>
+          </a:lstStyle>
+          <a:p>
+            <a:r>
+              <a:rPr lang="en-US" sz="1200" dirty="0" err="1"/>
+              <a:t>createDefaultFileIfSizeDiff</a:t>
+            </a:r>
+            <a:r>
+              <a:rPr lang="en-US" sz="1200" dirty="0"/>
+              <a:t>()</a:t>
+            </a:r>
+          </a:p>
+        </p:txBody>
+      </p:sp>
+      <p:cxnSp>
+        <p:nvCxnSpPr>
+          <p:cNvPr id="31" name="Straight Arrow Connector 30">
+            <a:extLst>
+              <a:ext uri="{FF2B5EF4-FFF2-40B4-BE49-F238E27FC236}">
+                <a16:creationId xmlns:a16="http://schemas.microsoft.com/office/drawing/2014/main" id="{9793A730-D5FD-4A4A-AF8E-69A3EF5D2A4C}"/>
+              </a:ext>
+            </a:extLst>
+          </p:cNvPr>
+          <p:cNvCxnSpPr>
+            <a:cxnSpLocks/>
+          </p:cNvCxnSpPr>
+          <p:nvPr/>
+        </p:nvCxnSpPr>
+        <p:spPr>
           <a:xfrm flipV="1">
-            <a:off x="165101" y="4298881"/>
-            <a:ext cx="4414857" cy="25408"/>
+            <a:off x="133032" y="2806907"/>
+            <a:ext cx="2757860" cy="25408"/>
           </a:xfrm>
           <a:prstGeom prst="straightConnector1">
             <a:avLst/>
@@ -4192,10 +4590,10 @@
       </p:cxnSp>
       <p:sp>
         <p:nvSpPr>
-          <p:cNvPr id="53" name="Rectangle 52">
+          <p:cNvPr id="32" name="Rectangle 31">
             <a:extLst>
               <a:ext uri="{FF2B5EF4-FFF2-40B4-BE49-F238E27FC236}">
-                <a16:creationId xmlns:a16="http://schemas.microsoft.com/office/drawing/2014/main" id="{FBE91152-CAA0-40F9-A636-95D6D3ED0062}"/>
+                <a16:creationId xmlns:a16="http://schemas.microsoft.com/office/drawing/2014/main" id="{845913CE-886E-4395-9012-F9B43F216B33}"/>
               </a:ext>
             </a:extLst>
           </p:cNvPr>
@@ -4204,8 +4602,8 @@
         </p:nvSpPr>
         <p:spPr>
           <a:xfrm>
-            <a:off x="4586093" y="4280753"/>
-            <a:ext cx="173839" cy="191237"/>
+            <a:off x="2901612" y="2784520"/>
+            <a:ext cx="173839" cy="114346"/>
           </a:xfrm>
           <a:prstGeom prst="rect">
             <a:avLst/>
@@ -4245,10 +4643,10 @@
       </p:sp>
       <p:cxnSp>
         <p:nvCxnSpPr>
-          <p:cNvPr id="55" name="Straight Arrow Connector 54">
+          <p:cNvPr id="33" name="Straight Arrow Connector 32">
             <a:extLst>
               <a:ext uri="{FF2B5EF4-FFF2-40B4-BE49-F238E27FC236}">
-                <a16:creationId xmlns:a16="http://schemas.microsoft.com/office/drawing/2014/main" id="{8E4B7BBA-25B6-4D0E-8872-29814D26F7DF}"/>
+                <a16:creationId xmlns:a16="http://schemas.microsoft.com/office/drawing/2014/main" id="{285B3D68-0EF7-4B85-B73C-7CEF6489353B}"/>
               </a:ext>
             </a:extLst>
           </p:cNvPr>
@@ -4259,8 +4657,8 @@
         </p:nvCxnSpPr>
         <p:spPr>
           <a:xfrm flipV="1">
-            <a:off x="148481" y="4473193"/>
-            <a:ext cx="4434470" cy="913"/>
+            <a:off x="151279" y="2892577"/>
+            <a:ext cx="2753626" cy="19914"/>
           </a:xfrm>
           <a:prstGeom prst="straightConnector1">
             <a:avLst/>
@@ -4291,10 +4689,10 @@
       </p:cxnSp>
       <p:sp>
         <p:nvSpPr>
-          <p:cNvPr id="56" name="TextBox 55">
+          <p:cNvPr id="42" name="TextBox 41">
             <a:extLst>
               <a:ext uri="{FF2B5EF4-FFF2-40B4-BE49-F238E27FC236}">
-                <a16:creationId xmlns:a16="http://schemas.microsoft.com/office/drawing/2014/main" id="{96035D04-72BC-4FEB-AC4C-51F9D3C361CE}"/>
+                <a16:creationId xmlns:a16="http://schemas.microsoft.com/office/drawing/2014/main" id="{F79E5E04-9B67-4E2C-BC85-012D2E94E717}"/>
               </a:ext>
             </a:extLst>
           </p:cNvPr>
@@ -4303,8 +4701,8 @@
         </p:nvSpPr>
         <p:spPr>
           <a:xfrm>
-            <a:off x="368982" y="4044188"/>
-            <a:ext cx="2114359" cy="184666"/>
+            <a:off x="100376" y="3019584"/>
+            <a:ext cx="1767759" cy="184666"/>
           </a:xfrm>
           <a:prstGeom prst="rect">
             <a:avLst/>
@@ -4330,102 +4728,21 @@
           <a:p>
             <a:r>
               <a:rPr lang="en-US" sz="1200" dirty="0" err="1"/>
-              <a:t>setAppTitle</a:t>
+              <a:t>createDefaultFileIfNull</a:t>
             </a:r>
             <a:r>
               <a:rPr lang="en-US" sz="1200" dirty="0"/>
-              <a:t>(</a:t>
-            </a:r>
-            <a:r>
-              <a:rPr lang="en-US" sz="1200" dirty="0" err="1"/>
-              <a:t>f.computeAppTitle</a:t>
-            </a:r>
-            <a:r>
-              <a:rPr lang="en-US" sz="1200" dirty="0"/>
-              <a:t>())</a:t>
-            </a:r>
-          </a:p>
-        </p:txBody>
-      </p:sp>
-      <p:sp>
-        <p:nvSpPr>
-          <p:cNvPr id="61" name="Rectangle 62">
+              <a:t>()</a:t>
+            </a:r>
+          </a:p>
+        </p:txBody>
+      </p:sp>
+      <p:cxnSp>
+        <p:nvCxnSpPr>
+          <p:cNvPr id="43" name="Straight Arrow Connector 42">
             <a:extLst>
               <a:ext uri="{FF2B5EF4-FFF2-40B4-BE49-F238E27FC236}">
-                <a16:creationId xmlns:a16="http://schemas.microsoft.com/office/drawing/2014/main" id="{7A7FFF98-5CAF-43FF-BC90-40BBBC3669F4}"/>
-              </a:ext>
-            </a:extLst>
-          </p:cNvPr>
-          <p:cNvSpPr/>
-          <p:nvPr/>
-        </p:nvSpPr>
-        <p:spPr>
-          <a:xfrm>
-            <a:off x="5279228" y="871109"/>
-            <a:ext cx="1179592" cy="461538"/>
-          </a:xfrm>
-          <a:prstGeom prst="rect">
-            <a:avLst/>
-          </a:prstGeom>
-          <a:solidFill>
-            <a:srgbClr val="0070C0"/>
-          </a:solidFill>
-          <a:ln w="19050">
-            <a:solidFill>
-              <a:srgbClr val="0070C0"/>
-            </a:solidFill>
-          </a:ln>
-          <a:effectLst/>
-        </p:spPr>
-        <p:style>
-          <a:lnRef idx="1">
-            <a:schemeClr val="accent2"/>
-          </a:lnRef>
-          <a:fillRef idx="2">
-            <a:schemeClr val="accent2"/>
-          </a:fillRef>
-          <a:effectRef idx="1">
-            <a:schemeClr val="accent2"/>
-          </a:effectRef>
-          <a:fontRef idx="minor">
-            <a:schemeClr val="dk1"/>
-          </a:fontRef>
-        </p:style>
-        <p:txBody>
-          <a:bodyPr rtlCol="0" anchor="ctr"/>
-          <a:lstStyle/>
-          <a:p>
-            <a:pPr algn="ctr"/>
-            <a:r>
-              <a:rPr lang="en-US" sz="1600" dirty="0">
-                <a:solidFill>
-                  <a:schemeClr val="bg1"/>
-                </a:solidFill>
-              </a:rPr>
-              <a:t>:</a:t>
-            </a:r>
-            <a:r>
-              <a:rPr lang="en-US" sz="1600" dirty="0" err="1">
-                <a:solidFill>
-                  <a:schemeClr val="bg1"/>
-                </a:solidFill>
-              </a:rPr>
-              <a:t>ConfigUtil</a:t>
-            </a:r>
-            <a:endParaRPr lang="en-SG" sz="1600" dirty="0">
-              <a:solidFill>
-                <a:schemeClr val="bg1"/>
-              </a:solidFill>
-            </a:endParaRPr>
-          </a:p>
-        </p:txBody>
-      </p:sp>
-      <p:cxnSp>
-        <p:nvCxnSpPr>
-          <p:cNvPr id="63" name="Straight Connector 62">
-            <a:extLst>
-              <a:ext uri="{FF2B5EF4-FFF2-40B4-BE49-F238E27FC236}">
-                <a16:creationId xmlns:a16="http://schemas.microsoft.com/office/drawing/2014/main" id="{42E2022C-626A-49E1-A032-BC8B14B482D2}"/>
+                <a16:creationId xmlns:a16="http://schemas.microsoft.com/office/drawing/2014/main" id="{9754F64E-CC35-430D-83AB-BA4FFB7C9E65}"/>
               </a:ext>
             </a:extLst>
           </p:cNvPr>
@@ -4435,54 +4752,9 @@
           <p:nvPr/>
         </p:nvCxnSpPr>
         <p:spPr>
-          <a:xfrm>
-            <a:off x="5867885" y="1256030"/>
-            <a:ext cx="0" cy="3973188"/>
-          </a:xfrm>
-          <a:prstGeom prst="line">
-            <a:avLst/>
-          </a:prstGeom>
-          <a:ln w="19050">
-            <a:solidFill>
-              <a:srgbClr val="0070C0"/>
-            </a:solidFill>
-            <a:prstDash val="sysDash"/>
-          </a:ln>
-          <a:effectLst/>
-        </p:spPr>
-        <p:style>
-          <a:lnRef idx="1">
-            <a:schemeClr val="accent1"/>
-          </a:lnRef>
-          <a:fillRef idx="2">
-            <a:schemeClr val="accent1"/>
-          </a:fillRef>
-          <a:effectRef idx="1">
-            <a:schemeClr val="accent1"/>
-          </a:effectRef>
-          <a:fontRef idx="minor">
-            <a:schemeClr val="dk1"/>
-          </a:fontRef>
-        </p:style>
-      </p:cxnSp>
-      <p:cxnSp>
-        <p:nvCxnSpPr>
-          <p:cNvPr id="64" name="Straight Arrow Connector 63">
-            <a:extLst>
-              <a:ext uri="{FF2B5EF4-FFF2-40B4-BE49-F238E27FC236}">
-                <a16:creationId xmlns:a16="http://schemas.microsoft.com/office/drawing/2014/main" id="{4534B8BC-AF36-4AA4-B1EA-15DE2A5F4BCC}"/>
-              </a:ext>
-            </a:extLst>
-          </p:cNvPr>
-          <p:cNvCxnSpPr>
-            <a:cxnSpLocks/>
-          </p:cNvCxnSpPr>
-          <p:nvPr/>
-        </p:nvCxnSpPr>
-        <p:spPr>
           <a:xfrm flipV="1">
-            <a:off x="201211" y="4785309"/>
-            <a:ext cx="5624922" cy="45871"/>
+            <a:off x="127020" y="3227121"/>
+            <a:ext cx="2757860" cy="25408"/>
           </a:xfrm>
           <a:prstGeom prst="straightConnector1">
             <a:avLst/>
@@ -4511,10 +4783,10 @@
       </p:cxnSp>
       <p:sp>
         <p:nvSpPr>
-          <p:cNvPr id="65" name="Rectangle 64">
+          <p:cNvPr id="44" name="Rectangle 43">
             <a:extLst>
               <a:ext uri="{FF2B5EF4-FFF2-40B4-BE49-F238E27FC236}">
-                <a16:creationId xmlns:a16="http://schemas.microsoft.com/office/drawing/2014/main" id="{D85A79D2-9577-4A71-B3B7-03C4B7F02E53}"/>
+                <a16:creationId xmlns:a16="http://schemas.microsoft.com/office/drawing/2014/main" id="{428018E2-A391-4CED-A9D8-DF9BF6B767D7}"/>
               </a:ext>
             </a:extLst>
           </p:cNvPr>
@@ -4523,8 +4795,8 @@
         </p:nvSpPr>
         <p:spPr>
           <a:xfrm>
-            <a:off x="5812085" y="4772116"/>
-            <a:ext cx="173839" cy="207968"/>
+            <a:off x="2895600" y="3204734"/>
+            <a:ext cx="173839" cy="114346"/>
           </a:xfrm>
           <a:prstGeom prst="rect">
             <a:avLst/>
@@ -4564,10 +4836,10 @@
       </p:sp>
       <p:cxnSp>
         <p:nvCxnSpPr>
-          <p:cNvPr id="75" name="Straight Arrow Connector 74">
+          <p:cNvPr id="46" name="Straight Arrow Connector 45">
             <a:extLst>
               <a:ext uri="{FF2B5EF4-FFF2-40B4-BE49-F238E27FC236}">
-                <a16:creationId xmlns:a16="http://schemas.microsoft.com/office/drawing/2014/main" id="{B3CA530F-9538-436E-9350-D70DB5A530A4}"/>
+                <a16:creationId xmlns:a16="http://schemas.microsoft.com/office/drawing/2014/main" id="{1070F122-2A28-40DA-BB75-E3A4776FDADE}"/>
               </a:ext>
             </a:extLst>
           </p:cNvPr>
@@ -4578,8 +4850,8 @@
         </p:nvCxnSpPr>
         <p:spPr>
           <a:xfrm flipV="1">
-            <a:off x="158140" y="4967443"/>
-            <a:ext cx="5663276" cy="12788"/>
+            <a:off x="143195" y="3309503"/>
+            <a:ext cx="2753626" cy="19914"/>
           </a:xfrm>
           <a:prstGeom prst="straightConnector1">
             <a:avLst/>
@@ -4610,10 +4882,10 @@
       </p:cxnSp>
       <p:sp>
         <p:nvSpPr>
-          <p:cNvPr id="76" name="TextBox 75">
+          <p:cNvPr id="47" name="TextBox 46">
             <a:extLst>
               <a:ext uri="{FF2B5EF4-FFF2-40B4-BE49-F238E27FC236}">
-                <a16:creationId xmlns:a16="http://schemas.microsoft.com/office/drawing/2014/main" id="{9AC52F56-1BA5-4972-A07C-E11D427592EB}"/>
+                <a16:creationId xmlns:a16="http://schemas.microsoft.com/office/drawing/2014/main" id="{174C0B68-8B55-4AEE-B0D3-03DE61BF1EB6}"/>
               </a:ext>
             </a:extLst>
           </p:cNvPr>
@@ -4622,8 +4894,8 @@
         </p:nvSpPr>
         <p:spPr>
           <a:xfrm>
-            <a:off x="360378" y="4607089"/>
-            <a:ext cx="2943239" cy="184666"/>
+            <a:off x="333712" y="3405128"/>
+            <a:ext cx="2515457" cy="184666"/>
           </a:xfrm>
           <a:prstGeom prst="rect">
             <a:avLst/>
@@ -4649,37 +4921,164 @@
           <a:p>
             <a:r>
               <a:rPr lang="en-US" sz="1200" dirty="0" err="1"/>
-              <a:t>saveConfig</a:t>
+              <a:t>createDefaultFileIfInvalidDateOrRange</a:t>
             </a:r>
             <a:r>
               <a:rPr lang="en-US" sz="1200" dirty="0"/>
-              <a:t>(</a:t>
-            </a:r>
-            <a:r>
-              <a:rPr lang="en-US" sz="1200" dirty="0" err="1"/>
-              <a:t>updateConfig</a:t>
-            </a:r>
-            <a:r>
-              <a:rPr lang="en-US" sz="1200" dirty="0"/>
-              <a:t>, </a:t>
-            </a:r>
-            <a:r>
-              <a:rPr lang="en-US" sz="1200" dirty="0" err="1"/>
-              <a:t>configFilePathUsed</a:t>
-            </a:r>
-            <a:r>
-              <a:rPr lang="en-US" sz="1200" dirty="0"/>
-              <a:t>)</a:t>
-            </a:r>
-          </a:p>
-        </p:txBody>
-      </p:sp>
-      <p:sp>
-        <p:nvSpPr>
-          <p:cNvPr id="30" name="TextBox 29">
+              <a:t>()</a:t>
+            </a:r>
+          </a:p>
+        </p:txBody>
+      </p:sp>
+      <p:cxnSp>
+        <p:nvCxnSpPr>
+          <p:cNvPr id="48" name="Straight Arrow Connector 47">
             <a:extLst>
               <a:ext uri="{FF2B5EF4-FFF2-40B4-BE49-F238E27FC236}">
-                <a16:creationId xmlns:a16="http://schemas.microsoft.com/office/drawing/2014/main" id="{29F9C009-DB5D-4523-BD74-0B5EA60FE6BA}"/>
+                <a16:creationId xmlns:a16="http://schemas.microsoft.com/office/drawing/2014/main" id="{16288FFD-B334-4145-8F05-7C98CF1F841A}"/>
+              </a:ext>
+            </a:extLst>
+          </p:cNvPr>
+          <p:cNvCxnSpPr>
+            <a:cxnSpLocks/>
+          </p:cNvCxnSpPr>
+          <p:nvPr/>
+        </p:nvCxnSpPr>
+        <p:spPr>
+          <a:xfrm flipV="1">
+            <a:off x="127020" y="3631103"/>
+            <a:ext cx="2757860" cy="25408"/>
+          </a:xfrm>
+          <a:prstGeom prst="straightConnector1">
+            <a:avLst/>
+          </a:prstGeom>
+          <a:ln w="19050">
+            <a:solidFill>
+              <a:srgbClr val="0070C0"/>
+            </a:solidFill>
+            <a:tailEnd type="arrow"/>
+          </a:ln>
+        </p:spPr>
+        <p:style>
+          <a:lnRef idx="1">
+            <a:schemeClr val="accent1"/>
+          </a:lnRef>
+          <a:fillRef idx="0">
+            <a:schemeClr val="accent1"/>
+          </a:fillRef>
+          <a:effectRef idx="0">
+            <a:schemeClr val="accent1"/>
+          </a:effectRef>
+          <a:fontRef idx="minor">
+            <a:schemeClr val="tx1"/>
+          </a:fontRef>
+        </p:style>
+      </p:cxnSp>
+      <p:sp>
+        <p:nvSpPr>
+          <p:cNvPr id="52" name="Rectangle 51">
+            <a:extLst>
+              <a:ext uri="{FF2B5EF4-FFF2-40B4-BE49-F238E27FC236}">
+                <a16:creationId xmlns:a16="http://schemas.microsoft.com/office/drawing/2014/main" id="{BAFABBE2-9773-46C8-8B4E-934752590DC4}"/>
+              </a:ext>
+            </a:extLst>
+          </p:cNvPr>
+          <p:cNvSpPr/>
+          <p:nvPr/>
+        </p:nvSpPr>
+        <p:spPr>
+          <a:xfrm>
+            <a:off x="2895600" y="3608716"/>
+            <a:ext cx="173839" cy="114346"/>
+          </a:xfrm>
+          <a:prstGeom prst="rect">
+            <a:avLst/>
+          </a:prstGeom>
+          <a:solidFill>
+            <a:srgbClr val="0070C0"/>
+          </a:solidFill>
+          <a:ln>
+            <a:solidFill>
+              <a:srgbClr val="0070C0"/>
+            </a:solidFill>
+          </a:ln>
+          <a:effectLst/>
+        </p:spPr>
+        <p:style>
+          <a:lnRef idx="1">
+            <a:schemeClr val="accent3"/>
+          </a:lnRef>
+          <a:fillRef idx="2">
+            <a:schemeClr val="accent3"/>
+          </a:fillRef>
+          <a:effectRef idx="1">
+            <a:schemeClr val="accent3"/>
+          </a:effectRef>
+          <a:fontRef idx="minor">
+            <a:schemeClr val="dk1"/>
+          </a:fontRef>
+        </p:style>
+        <p:txBody>
+          <a:bodyPr rtlCol="0" anchor="ctr"/>
+          <a:lstStyle/>
+          <a:p>
+            <a:pPr algn="ctr"/>
+            <a:endParaRPr lang="en-SG" sz="1400"/>
+          </a:p>
+        </p:txBody>
+      </p:sp>
+      <p:cxnSp>
+        <p:nvCxnSpPr>
+          <p:cNvPr id="54" name="Straight Arrow Connector 53">
+            <a:extLst>
+              <a:ext uri="{FF2B5EF4-FFF2-40B4-BE49-F238E27FC236}">
+                <a16:creationId xmlns:a16="http://schemas.microsoft.com/office/drawing/2014/main" id="{A778E405-8869-4954-80A5-2D0FEE8CEE65}"/>
+              </a:ext>
+            </a:extLst>
+          </p:cNvPr>
+          <p:cNvCxnSpPr>
+            <a:cxnSpLocks/>
+          </p:cNvCxnSpPr>
+          <p:nvPr/>
+        </p:nvCxnSpPr>
+        <p:spPr>
+          <a:xfrm flipV="1">
+            <a:off x="139886" y="3713886"/>
+            <a:ext cx="2753626" cy="19914"/>
+          </a:xfrm>
+          <a:prstGeom prst="straightConnector1">
+            <a:avLst/>
+          </a:prstGeom>
+          <a:ln w="19050">
+            <a:solidFill>
+              <a:srgbClr val="0070C0"/>
+            </a:solidFill>
+            <a:prstDash val="sysDash"/>
+            <a:headEnd type="arrow" w="med" len="med"/>
+            <a:tailEnd type="none" w="med" len="med"/>
+          </a:ln>
+        </p:spPr>
+        <p:style>
+          <a:lnRef idx="1">
+            <a:schemeClr val="accent1"/>
+          </a:lnRef>
+          <a:fillRef idx="0">
+            <a:schemeClr val="accent1"/>
+          </a:fillRef>
+          <a:effectRef idx="0">
+            <a:schemeClr val="accent1"/>
+          </a:effectRef>
+          <a:fontRef idx="minor">
+            <a:schemeClr val="tx1"/>
+          </a:fontRef>
+        </p:style>
+      </p:cxnSp>
+      <p:sp>
+        <p:nvSpPr>
+          <p:cNvPr id="58" name="TextBox 57">
+            <a:extLst>
+              <a:ext uri="{FF2B5EF4-FFF2-40B4-BE49-F238E27FC236}">
+                <a16:creationId xmlns:a16="http://schemas.microsoft.com/office/drawing/2014/main" id="{1E341CC3-725C-42AE-97F8-A6BEE740D66C}"/>
               </a:ext>
             </a:extLst>
           </p:cNvPr>
@@ -4688,8 +5087,8 @@
         </p:nvSpPr>
         <p:spPr>
           <a:xfrm>
-            <a:off x="309597" y="2604553"/>
-            <a:ext cx="1767759" cy="184666"/>
+            <a:off x="41752" y="2187419"/>
+            <a:ext cx="2474174" cy="184666"/>
           </a:xfrm>
           <a:prstGeom prst="rect">
             <a:avLst/>
@@ -4715,7 +5114,7 @@
           <a:p>
             <a:r>
               <a:rPr lang="en-US" sz="1200" dirty="0" err="1"/>
-              <a:t>createDefaultFileIfSizeDiff</a:t>
+              <a:t>createDefaultFileIfUnableConvert</a:t>
             </a:r>
             <a:r>
               <a:rPr lang="en-US" sz="1200" dirty="0"/>
@@ -4726,10 +5125,10 @@
       </p:sp>
       <p:cxnSp>
         <p:nvCxnSpPr>
-          <p:cNvPr id="31" name="Straight Arrow Connector 30">
+          <p:cNvPr id="59" name="Straight Arrow Connector 58">
             <a:extLst>
               <a:ext uri="{FF2B5EF4-FFF2-40B4-BE49-F238E27FC236}">
-                <a16:creationId xmlns:a16="http://schemas.microsoft.com/office/drawing/2014/main" id="{9793A730-D5FD-4A4A-AF8E-69A3EF5D2A4C}"/>
+                <a16:creationId xmlns:a16="http://schemas.microsoft.com/office/drawing/2014/main" id="{E38E36C3-8503-4C29-9832-4886BB3D464B}"/>
               </a:ext>
             </a:extLst>
           </p:cNvPr>
@@ -4740,7 +5139,7 @@
         </p:nvCxnSpPr>
         <p:spPr>
           <a:xfrm flipV="1">
-            <a:off x="133032" y="2806907"/>
+            <a:off x="133032" y="2389775"/>
             <a:ext cx="2757860" cy="25408"/>
           </a:xfrm>
           <a:prstGeom prst="straightConnector1">
@@ -4770,10 +5169,10 @@
       </p:cxnSp>
       <p:sp>
         <p:nvSpPr>
-          <p:cNvPr id="32" name="Rectangle 31">
+          <p:cNvPr id="62" name="Rectangle 61">
             <a:extLst>
               <a:ext uri="{FF2B5EF4-FFF2-40B4-BE49-F238E27FC236}">
-                <a16:creationId xmlns:a16="http://schemas.microsoft.com/office/drawing/2014/main" id="{845913CE-886E-4395-9012-F9B43F216B33}"/>
+                <a16:creationId xmlns:a16="http://schemas.microsoft.com/office/drawing/2014/main" id="{1098B6C9-0ECC-4550-9472-6B5A958D1EB2}"/>
               </a:ext>
             </a:extLst>
           </p:cNvPr>
@@ -4782,7 +5181,7 @@
         </p:nvSpPr>
         <p:spPr>
           <a:xfrm>
-            <a:off x="2901612" y="2784520"/>
+            <a:off x="2901612" y="2367388"/>
             <a:ext cx="173839" cy="114346"/>
           </a:xfrm>
           <a:prstGeom prst="rect">
@@ -4823,10 +5222,10 @@
       </p:sp>
       <p:cxnSp>
         <p:nvCxnSpPr>
-          <p:cNvPr id="33" name="Straight Arrow Connector 32">
+          <p:cNvPr id="66" name="Straight Arrow Connector 65">
             <a:extLst>
               <a:ext uri="{FF2B5EF4-FFF2-40B4-BE49-F238E27FC236}">
-                <a16:creationId xmlns:a16="http://schemas.microsoft.com/office/drawing/2014/main" id="{285B3D68-0EF7-4B85-B73C-7CEF6489353B}"/>
+                <a16:creationId xmlns:a16="http://schemas.microsoft.com/office/drawing/2014/main" id="{CB27691D-7005-43C2-A8A5-4491DAA8D822}"/>
               </a:ext>
             </a:extLst>
           </p:cNvPr>
@@ -4837,7 +5236,7 @@
         </p:nvCxnSpPr>
         <p:spPr>
           <a:xfrm flipV="1">
-            <a:off x="151279" y="2892577"/>
+            <a:off x="149207" y="2473482"/>
             <a:ext cx="2753626" cy="19914"/>
           </a:xfrm>
           <a:prstGeom prst="straightConnector1">
@@ -4867,62 +5266,12 @@
           </a:fontRef>
         </p:style>
       </p:cxnSp>
-      <p:sp>
-        <p:nvSpPr>
-          <p:cNvPr id="42" name="TextBox 41">
+      <p:cxnSp>
+        <p:nvCxnSpPr>
+          <p:cNvPr id="68" name="Straight Arrow Connector 67">
             <a:extLst>
               <a:ext uri="{FF2B5EF4-FFF2-40B4-BE49-F238E27FC236}">
-                <a16:creationId xmlns:a16="http://schemas.microsoft.com/office/drawing/2014/main" id="{F79E5E04-9B67-4E2C-BC85-012D2E94E717}"/>
-              </a:ext>
-            </a:extLst>
-          </p:cNvPr>
-          <p:cNvSpPr txBox="1"/>
-          <p:nvPr/>
-        </p:nvSpPr>
-        <p:spPr>
-          <a:xfrm>
-            <a:off x="100376" y="3019584"/>
-            <a:ext cx="1767759" cy="184666"/>
-          </a:xfrm>
-          <a:prstGeom prst="rect">
-            <a:avLst/>
-          </a:prstGeom>
-          <a:noFill/>
-        </p:spPr>
-        <p:txBody>
-          <a:bodyPr wrap="square" lIns="0" tIns="0" rIns="0" bIns="0" rtlCol="0">
-            <a:spAutoFit/>
-          </a:bodyPr>
-          <a:lstStyle>
-            <a:defPPr>
-              <a:defRPr lang="en-US"/>
-            </a:defPPr>
-            <a:lvl1pPr algn="r">
-              <a:defRPr sz="1400">
-                <a:solidFill>
-                  <a:srgbClr val="0070C0"/>
-                </a:solidFill>
-              </a:defRPr>
-            </a:lvl1pPr>
-          </a:lstStyle>
-          <a:p>
-            <a:r>
-              <a:rPr lang="en-US" sz="1200" dirty="0" err="1"/>
-              <a:t>createDefaultFileIfNull</a:t>
-            </a:r>
-            <a:r>
-              <a:rPr lang="en-US" sz="1200" dirty="0"/>
-              <a:t>()</a:t>
-            </a:r>
-          </a:p>
-        </p:txBody>
-      </p:sp>
-      <p:cxnSp>
-        <p:nvCxnSpPr>
-          <p:cNvPr id="43" name="Straight Arrow Connector 42">
-            <a:extLst>
-              <a:ext uri="{FF2B5EF4-FFF2-40B4-BE49-F238E27FC236}">
-                <a16:creationId xmlns:a16="http://schemas.microsoft.com/office/drawing/2014/main" id="{9754F64E-CC35-430D-83AB-BA4FFB7C9E65}"/>
+                <a16:creationId xmlns:a16="http://schemas.microsoft.com/office/drawing/2014/main" id="{BB95F54A-57E4-4884-9924-4F45BBC968D7}"/>
               </a:ext>
             </a:extLst>
           </p:cNvPr>
@@ -4933,8 +5282,8 @@
         </p:nvCxnSpPr>
         <p:spPr>
           <a:xfrm flipV="1">
-            <a:off x="127020" y="3227121"/>
-            <a:ext cx="2757860" cy="25408"/>
+            <a:off x="150008" y="4295762"/>
+            <a:ext cx="4436085" cy="19783"/>
           </a:xfrm>
           <a:prstGeom prst="straightConnector1">
             <a:avLst/>
@@ -4961,65 +5310,12 @@
           </a:fontRef>
         </p:style>
       </p:cxnSp>
-      <p:sp>
-        <p:nvSpPr>
-          <p:cNvPr id="44" name="Rectangle 43">
+      <p:cxnSp>
+        <p:nvCxnSpPr>
+          <p:cNvPr id="70" name="Straight Arrow Connector 69">
             <a:extLst>
               <a:ext uri="{FF2B5EF4-FFF2-40B4-BE49-F238E27FC236}">
-                <a16:creationId xmlns:a16="http://schemas.microsoft.com/office/drawing/2014/main" id="{428018E2-A391-4CED-A9D8-DF9BF6B767D7}"/>
-              </a:ext>
-            </a:extLst>
-          </p:cNvPr>
-          <p:cNvSpPr/>
-          <p:nvPr/>
-        </p:nvSpPr>
-        <p:spPr>
-          <a:xfrm>
-            <a:off x="2895600" y="3204734"/>
-            <a:ext cx="173839" cy="114346"/>
-          </a:xfrm>
-          <a:prstGeom prst="rect">
-            <a:avLst/>
-          </a:prstGeom>
-          <a:solidFill>
-            <a:srgbClr val="0070C0"/>
-          </a:solidFill>
-          <a:ln>
-            <a:solidFill>
-              <a:srgbClr val="0070C0"/>
-            </a:solidFill>
-          </a:ln>
-          <a:effectLst/>
-        </p:spPr>
-        <p:style>
-          <a:lnRef idx="1">
-            <a:schemeClr val="accent3"/>
-          </a:lnRef>
-          <a:fillRef idx="2">
-            <a:schemeClr val="accent3"/>
-          </a:fillRef>
-          <a:effectRef idx="1">
-            <a:schemeClr val="accent3"/>
-          </a:effectRef>
-          <a:fontRef idx="minor">
-            <a:schemeClr val="dk1"/>
-          </a:fontRef>
-        </p:style>
-        <p:txBody>
-          <a:bodyPr rtlCol="0" anchor="ctr"/>
-          <a:lstStyle/>
-          <a:p>
-            <a:pPr algn="ctr"/>
-            <a:endParaRPr lang="en-SG" sz="1400"/>
-          </a:p>
-        </p:txBody>
-      </p:sp>
-      <p:cxnSp>
-        <p:nvCxnSpPr>
-          <p:cNvPr id="46" name="Straight Arrow Connector 45">
-            <a:extLst>
-              <a:ext uri="{FF2B5EF4-FFF2-40B4-BE49-F238E27FC236}">
-                <a16:creationId xmlns:a16="http://schemas.microsoft.com/office/drawing/2014/main" id="{1070F122-2A28-40DA-BB75-E3A4776FDADE}"/>
+                <a16:creationId xmlns:a16="http://schemas.microsoft.com/office/drawing/2014/main" id="{C3CA1D88-E25B-49BC-BB5F-0A83A3A340D5}"/>
               </a:ext>
             </a:extLst>
           </p:cNvPr>
@@ -5030,8 +5326,8 @@
         </p:nvCxnSpPr>
         <p:spPr>
           <a:xfrm flipV="1">
-            <a:off x="143195" y="3309503"/>
-            <a:ext cx="2753626" cy="19914"/>
+            <a:off x="148986" y="4461800"/>
+            <a:ext cx="4441891" cy="22020"/>
           </a:xfrm>
           <a:prstGeom prst="straightConnector1">
             <a:avLst/>
@@ -5060,62 +5356,12 @@
           </a:fontRef>
         </p:style>
       </p:cxnSp>
-      <p:sp>
-        <p:nvSpPr>
-          <p:cNvPr id="47" name="TextBox 46">
+      <p:cxnSp>
+        <p:nvCxnSpPr>
+          <p:cNvPr id="71" name="Straight Arrow Connector 70">
             <a:extLst>
               <a:ext uri="{FF2B5EF4-FFF2-40B4-BE49-F238E27FC236}">
-                <a16:creationId xmlns:a16="http://schemas.microsoft.com/office/drawing/2014/main" id="{174C0B68-8B55-4AEE-B0D3-03DE61BF1EB6}"/>
-              </a:ext>
-            </a:extLst>
-          </p:cNvPr>
-          <p:cNvSpPr txBox="1"/>
-          <p:nvPr/>
-        </p:nvSpPr>
-        <p:spPr>
-          <a:xfrm>
-            <a:off x="333712" y="3405128"/>
-            <a:ext cx="2515457" cy="184666"/>
-          </a:xfrm>
-          <a:prstGeom prst="rect">
-            <a:avLst/>
-          </a:prstGeom>
-          <a:noFill/>
-        </p:spPr>
-        <p:txBody>
-          <a:bodyPr wrap="square" lIns="0" tIns="0" rIns="0" bIns="0" rtlCol="0">
-            <a:spAutoFit/>
-          </a:bodyPr>
-          <a:lstStyle>
-            <a:defPPr>
-              <a:defRPr lang="en-US"/>
-            </a:defPPr>
-            <a:lvl1pPr algn="r">
-              <a:defRPr sz="1400">
-                <a:solidFill>
-                  <a:srgbClr val="0070C0"/>
-                </a:solidFill>
-              </a:defRPr>
-            </a:lvl1pPr>
-          </a:lstStyle>
-          <a:p>
-            <a:r>
-              <a:rPr lang="en-US" sz="1200" dirty="0" err="1"/>
-              <a:t>createDefaultFileIfInvalidDateOrRange</a:t>
-            </a:r>
-            <a:r>
-              <a:rPr lang="en-US" sz="1200" dirty="0"/>
-              <a:t>()</a:t>
-            </a:r>
-          </a:p>
-        </p:txBody>
-      </p:sp>
-      <p:cxnSp>
-        <p:nvCxnSpPr>
-          <p:cNvPr id="48" name="Straight Arrow Connector 47">
-            <a:extLst>
-              <a:ext uri="{FF2B5EF4-FFF2-40B4-BE49-F238E27FC236}">
-                <a16:creationId xmlns:a16="http://schemas.microsoft.com/office/drawing/2014/main" id="{16288FFD-B334-4145-8F05-7C98CF1F841A}"/>
+                <a16:creationId xmlns:a16="http://schemas.microsoft.com/office/drawing/2014/main" id="{79A4752B-CF8D-4417-9AD6-76C48A7B92CD}"/>
               </a:ext>
             </a:extLst>
           </p:cNvPr>
@@ -5126,8 +5372,8 @@
         </p:nvCxnSpPr>
         <p:spPr>
           <a:xfrm flipV="1">
-            <a:off x="127020" y="3631103"/>
-            <a:ext cx="2757860" cy="25408"/>
+            <a:off x="143881" y="4977807"/>
+            <a:ext cx="5676915" cy="17765"/>
           </a:xfrm>
           <a:prstGeom prst="straightConnector1">
             <a:avLst/>
@@ -5136,7 +5382,9 @@
             <a:solidFill>
               <a:srgbClr val="0070C0"/>
             </a:solidFill>
-            <a:tailEnd type="arrow"/>
+            <a:prstDash val="sysDash"/>
+            <a:headEnd type="arrow" w="med" len="med"/>
+            <a:tailEnd type="none" w="med" len="med"/>
           </a:ln>
         </p:spPr>
         <p:style>
@@ -5154,65 +5402,12 @@
           </a:fontRef>
         </p:style>
       </p:cxnSp>
-      <p:sp>
-        <p:nvSpPr>
-          <p:cNvPr id="52" name="Rectangle 51">
+      <p:cxnSp>
+        <p:nvCxnSpPr>
+          <p:cNvPr id="72" name="Straight Arrow Connector 71">
             <a:extLst>
               <a:ext uri="{FF2B5EF4-FFF2-40B4-BE49-F238E27FC236}">
-                <a16:creationId xmlns:a16="http://schemas.microsoft.com/office/drawing/2014/main" id="{BAFABBE2-9773-46C8-8B4E-934752590DC4}"/>
-              </a:ext>
-            </a:extLst>
-          </p:cNvPr>
-          <p:cNvSpPr/>
-          <p:nvPr/>
-        </p:nvSpPr>
-        <p:spPr>
-          <a:xfrm>
-            <a:off x="2895600" y="3608716"/>
-            <a:ext cx="173839" cy="114346"/>
-          </a:xfrm>
-          <a:prstGeom prst="rect">
-            <a:avLst/>
-          </a:prstGeom>
-          <a:solidFill>
-            <a:srgbClr val="0070C0"/>
-          </a:solidFill>
-          <a:ln>
-            <a:solidFill>
-              <a:srgbClr val="0070C0"/>
-            </a:solidFill>
-          </a:ln>
-          <a:effectLst/>
-        </p:spPr>
-        <p:style>
-          <a:lnRef idx="1">
-            <a:schemeClr val="accent3"/>
-          </a:lnRef>
-          <a:fillRef idx="2">
-            <a:schemeClr val="accent3"/>
-          </a:fillRef>
-          <a:effectRef idx="1">
-            <a:schemeClr val="accent3"/>
-          </a:effectRef>
-          <a:fontRef idx="minor">
-            <a:schemeClr val="dk1"/>
-          </a:fontRef>
-        </p:style>
-        <p:txBody>
-          <a:bodyPr rtlCol="0" anchor="ctr"/>
-          <a:lstStyle/>
-          <a:p>
-            <a:pPr algn="ctr"/>
-            <a:endParaRPr lang="en-SG" sz="1400"/>
-          </a:p>
-        </p:txBody>
-      </p:sp>
-      <p:cxnSp>
-        <p:nvCxnSpPr>
-          <p:cNvPr id="54" name="Straight Arrow Connector 53">
-            <a:extLst>
-              <a:ext uri="{FF2B5EF4-FFF2-40B4-BE49-F238E27FC236}">
-                <a16:creationId xmlns:a16="http://schemas.microsoft.com/office/drawing/2014/main" id="{A778E405-8869-4954-80A5-2D0FEE8CEE65}"/>
+                <a16:creationId xmlns:a16="http://schemas.microsoft.com/office/drawing/2014/main" id="{32804427-B0DF-4ABB-8F16-362059B953EB}"/>
               </a:ext>
             </a:extLst>
           </p:cNvPr>
@@ -5223,104 +5418,8 @@
         </p:nvCxnSpPr>
         <p:spPr>
           <a:xfrm flipV="1">
-            <a:off x="139886" y="3713886"/>
-            <a:ext cx="2753626" cy="19914"/>
-          </a:xfrm>
-          <a:prstGeom prst="straightConnector1">
-            <a:avLst/>
-          </a:prstGeom>
-          <a:ln w="19050">
-            <a:solidFill>
-              <a:srgbClr val="0070C0"/>
-            </a:solidFill>
-            <a:prstDash val="sysDash"/>
-            <a:headEnd type="arrow" w="med" len="med"/>
-            <a:tailEnd type="none" w="med" len="med"/>
-          </a:ln>
-        </p:spPr>
-        <p:style>
-          <a:lnRef idx="1">
-            <a:schemeClr val="accent1"/>
-          </a:lnRef>
-          <a:fillRef idx="0">
-            <a:schemeClr val="accent1"/>
-          </a:fillRef>
-          <a:effectRef idx="0">
-            <a:schemeClr val="accent1"/>
-          </a:effectRef>
-          <a:fontRef idx="minor">
-            <a:schemeClr val="tx1"/>
-          </a:fontRef>
-        </p:style>
-      </p:cxnSp>
-      <p:sp>
-        <p:nvSpPr>
-          <p:cNvPr id="58" name="TextBox 57">
-            <a:extLst>
-              <a:ext uri="{FF2B5EF4-FFF2-40B4-BE49-F238E27FC236}">
-                <a16:creationId xmlns:a16="http://schemas.microsoft.com/office/drawing/2014/main" id="{1E341CC3-725C-42AE-97F8-A6BEE740D66C}"/>
-              </a:ext>
-            </a:extLst>
-          </p:cNvPr>
-          <p:cNvSpPr txBox="1"/>
-          <p:nvPr/>
-        </p:nvSpPr>
-        <p:spPr>
-          <a:xfrm>
-            <a:off x="41752" y="2187419"/>
-            <a:ext cx="2474174" cy="184666"/>
-          </a:xfrm>
-          <a:prstGeom prst="rect">
-            <a:avLst/>
-          </a:prstGeom>
-          <a:noFill/>
-        </p:spPr>
-        <p:txBody>
-          <a:bodyPr wrap="square" lIns="0" tIns="0" rIns="0" bIns="0" rtlCol="0">
-            <a:spAutoFit/>
-          </a:bodyPr>
-          <a:lstStyle>
-            <a:defPPr>
-              <a:defRPr lang="en-US"/>
-            </a:defPPr>
-            <a:lvl1pPr algn="r">
-              <a:defRPr sz="1400">
-                <a:solidFill>
-                  <a:srgbClr val="0070C0"/>
-                </a:solidFill>
-              </a:defRPr>
-            </a:lvl1pPr>
-          </a:lstStyle>
-          <a:p>
-            <a:r>
-              <a:rPr lang="en-US" sz="1200" dirty="0" err="1"/>
-              <a:t>createDefaultFileIfUnableConvert</a:t>
-            </a:r>
-            <a:r>
-              <a:rPr lang="en-US" sz="1200" dirty="0"/>
-              <a:t>()</a:t>
-            </a:r>
-          </a:p>
-        </p:txBody>
-      </p:sp>
-      <p:cxnSp>
-        <p:nvCxnSpPr>
-          <p:cNvPr id="59" name="Straight Arrow Connector 58">
-            <a:extLst>
-              <a:ext uri="{FF2B5EF4-FFF2-40B4-BE49-F238E27FC236}">
-                <a16:creationId xmlns:a16="http://schemas.microsoft.com/office/drawing/2014/main" id="{E38E36C3-8503-4C29-9832-4886BB3D464B}"/>
-              </a:ext>
-            </a:extLst>
-          </p:cNvPr>
-          <p:cNvCxnSpPr>
-            <a:cxnSpLocks/>
-          </p:cNvCxnSpPr>
-          <p:nvPr/>
-        </p:nvCxnSpPr>
-        <p:spPr>
-          <a:xfrm flipV="1">
-            <a:off x="133032" y="2389775"/>
-            <a:ext cx="2757860" cy="25408"/>
+            <a:off x="152593" y="4782276"/>
+            <a:ext cx="5659492" cy="22651"/>
           </a:xfrm>
           <a:prstGeom prst="straightConnector1">
             <a:avLst/>
@@ -5330,105 +5429,6 @@
               <a:srgbClr val="0070C0"/>
             </a:solidFill>
             <a:tailEnd type="arrow"/>
-          </a:ln>
-        </p:spPr>
-        <p:style>
-          <a:lnRef idx="1">
-            <a:schemeClr val="accent1"/>
-          </a:lnRef>
-          <a:fillRef idx="0">
-            <a:schemeClr val="accent1"/>
-          </a:fillRef>
-          <a:effectRef idx="0">
-            <a:schemeClr val="accent1"/>
-          </a:effectRef>
-          <a:fontRef idx="minor">
-            <a:schemeClr val="tx1"/>
-          </a:fontRef>
-        </p:style>
-      </p:cxnSp>
-      <p:sp>
-        <p:nvSpPr>
-          <p:cNvPr id="62" name="Rectangle 61">
-            <a:extLst>
-              <a:ext uri="{FF2B5EF4-FFF2-40B4-BE49-F238E27FC236}">
-                <a16:creationId xmlns:a16="http://schemas.microsoft.com/office/drawing/2014/main" id="{1098B6C9-0ECC-4550-9472-6B5A958D1EB2}"/>
-              </a:ext>
-            </a:extLst>
-          </p:cNvPr>
-          <p:cNvSpPr/>
-          <p:nvPr/>
-        </p:nvSpPr>
-        <p:spPr>
-          <a:xfrm>
-            <a:off x="2901612" y="2367388"/>
-            <a:ext cx="173839" cy="114346"/>
-          </a:xfrm>
-          <a:prstGeom prst="rect">
-            <a:avLst/>
-          </a:prstGeom>
-          <a:solidFill>
-            <a:srgbClr val="0070C0"/>
-          </a:solidFill>
-          <a:ln>
-            <a:solidFill>
-              <a:srgbClr val="0070C0"/>
-            </a:solidFill>
-          </a:ln>
-          <a:effectLst/>
-        </p:spPr>
-        <p:style>
-          <a:lnRef idx="1">
-            <a:schemeClr val="accent3"/>
-          </a:lnRef>
-          <a:fillRef idx="2">
-            <a:schemeClr val="accent3"/>
-          </a:fillRef>
-          <a:effectRef idx="1">
-            <a:schemeClr val="accent3"/>
-          </a:effectRef>
-          <a:fontRef idx="minor">
-            <a:schemeClr val="dk1"/>
-          </a:fontRef>
-        </p:style>
-        <p:txBody>
-          <a:bodyPr rtlCol="0" anchor="ctr"/>
-          <a:lstStyle/>
-          <a:p>
-            <a:pPr algn="ctr"/>
-            <a:endParaRPr lang="en-SG" sz="1400"/>
-          </a:p>
-        </p:txBody>
-      </p:sp>
-      <p:cxnSp>
-        <p:nvCxnSpPr>
-          <p:cNvPr id="66" name="Straight Arrow Connector 65">
-            <a:extLst>
-              <a:ext uri="{FF2B5EF4-FFF2-40B4-BE49-F238E27FC236}">
-                <a16:creationId xmlns:a16="http://schemas.microsoft.com/office/drawing/2014/main" id="{CB27691D-7005-43C2-A8A5-4491DAA8D822}"/>
-              </a:ext>
-            </a:extLst>
-          </p:cNvPr>
-          <p:cNvCxnSpPr>
-            <a:cxnSpLocks/>
-          </p:cNvCxnSpPr>
-          <p:nvPr/>
-        </p:nvCxnSpPr>
-        <p:spPr>
-          <a:xfrm flipV="1">
-            <a:off x="149207" y="2473482"/>
-            <a:ext cx="2753626" cy="19914"/>
-          </a:xfrm>
-          <a:prstGeom prst="straightConnector1">
-            <a:avLst/>
-          </a:prstGeom>
-          <a:ln w="19050">
-            <a:solidFill>
-              <a:srgbClr val="0070C0"/>
-            </a:solidFill>
-            <a:prstDash val="sysDash"/>
-            <a:headEnd type="arrow" w="med" len="med"/>
-            <a:tailEnd type="none" w="med" len="med"/>
           </a:ln>
         </p:spPr>
         <p:style>

</xml_diff>

<commit_message>
rename object name in LaunchMainApp sequence diagram to adhere to example object name
</commit_message>
<xml_diff>
--- a/docs/diagrams/LaunchMainAppSequenceDiagram.pptx
+++ b/docs/diagrams/LaunchMainAppSequenceDiagram.pptx
@@ -208,7 +208,7 @@
           <a:p>
             <a:fld id="{F5CC4B3F-88C1-4FFA-B1B6-F41C21DC6924}" type="datetimeFigureOut">
               <a:rPr lang="en-US" smtClean="0"/>
-              <a:t>11/10/2018</a:t>
+              <a:t>11/11/2018</a:t>
             </a:fld>
             <a:endParaRPr lang="en-US"/>
           </a:p>
@@ -654,7 +654,7 @@
           <a:p>
             <a:fld id="{78C97017-6FC3-485B-9764-EAC9E56C1D49}" type="datetimeFigureOut">
               <a:rPr lang="en-US" smtClean="0"/>
-              <a:t>11/10/2018</a:t>
+              <a:t>11/11/2018</a:t>
             </a:fld>
             <a:endParaRPr lang="en-US"/>
           </a:p>
@@ -822,7 +822,7 @@
           <a:p>
             <a:fld id="{78C97017-6FC3-485B-9764-EAC9E56C1D49}" type="datetimeFigureOut">
               <a:rPr lang="en-US" smtClean="0"/>
-              <a:t>11/10/2018</a:t>
+              <a:t>11/11/2018</a:t>
             </a:fld>
             <a:endParaRPr lang="en-US"/>
           </a:p>
@@ -1000,7 +1000,7 @@
           <a:p>
             <a:fld id="{78C97017-6FC3-485B-9764-EAC9E56C1D49}" type="datetimeFigureOut">
               <a:rPr lang="en-US" smtClean="0"/>
-              <a:t>11/10/2018</a:t>
+              <a:t>11/11/2018</a:t>
             </a:fld>
             <a:endParaRPr lang="en-US"/>
           </a:p>
@@ -1168,7 +1168,7 @@
           <a:p>
             <a:fld id="{78C97017-6FC3-485B-9764-EAC9E56C1D49}" type="datetimeFigureOut">
               <a:rPr lang="en-US" smtClean="0"/>
-              <a:t>11/10/2018</a:t>
+              <a:t>11/11/2018</a:t>
             </a:fld>
             <a:endParaRPr lang="en-US"/>
           </a:p>
@@ -1413,7 +1413,7 @@
           <a:p>
             <a:fld id="{78C97017-6FC3-485B-9764-EAC9E56C1D49}" type="datetimeFigureOut">
               <a:rPr lang="en-US" smtClean="0"/>
-              <a:t>11/10/2018</a:t>
+              <a:t>11/11/2018</a:t>
             </a:fld>
             <a:endParaRPr lang="en-US"/>
           </a:p>
@@ -1698,7 +1698,7 @@
           <a:p>
             <a:fld id="{78C97017-6FC3-485B-9764-EAC9E56C1D49}" type="datetimeFigureOut">
               <a:rPr lang="en-US" smtClean="0"/>
-              <a:t>11/10/2018</a:t>
+              <a:t>11/11/2018</a:t>
             </a:fld>
             <a:endParaRPr lang="en-US"/>
           </a:p>
@@ -2117,7 +2117,7 @@
           <a:p>
             <a:fld id="{78C97017-6FC3-485B-9764-EAC9E56C1D49}" type="datetimeFigureOut">
               <a:rPr lang="en-US" smtClean="0"/>
-              <a:t>11/10/2018</a:t>
+              <a:t>11/11/2018</a:t>
             </a:fld>
             <a:endParaRPr lang="en-US"/>
           </a:p>
@@ -2234,7 +2234,7 @@
           <a:p>
             <a:fld id="{78C97017-6FC3-485B-9764-EAC9E56C1D49}" type="datetimeFigureOut">
               <a:rPr lang="en-US" smtClean="0"/>
-              <a:t>11/10/2018</a:t>
+              <a:t>11/11/2018</a:t>
             </a:fld>
             <a:endParaRPr lang="en-US"/>
           </a:p>
@@ -2329,7 +2329,7 @@
           <a:p>
             <a:fld id="{78C97017-6FC3-485B-9764-EAC9E56C1D49}" type="datetimeFigureOut">
               <a:rPr lang="en-US" smtClean="0"/>
-              <a:t>11/10/2018</a:t>
+              <a:t>11/11/2018</a:t>
             </a:fld>
             <a:endParaRPr lang="en-US"/>
           </a:p>
@@ -2604,7 +2604,7 @@
           <a:p>
             <a:fld id="{78C97017-6FC3-485B-9764-EAC9E56C1D49}" type="datetimeFigureOut">
               <a:rPr lang="en-US" smtClean="0"/>
-              <a:t>11/10/2018</a:t>
+              <a:t>11/11/2018</a:t>
             </a:fld>
             <a:endParaRPr lang="en-US"/>
           </a:p>
@@ -2856,7 +2856,7 @@
           <a:p>
             <a:fld id="{78C97017-6FC3-485B-9764-EAC9E56C1D49}" type="datetimeFigureOut">
               <a:rPr lang="en-US" smtClean="0"/>
-              <a:t>11/10/2018</a:t>
+              <a:t>11/11/2018</a:t>
             </a:fld>
             <a:endParaRPr lang="en-US"/>
           </a:p>
@@ -3067,7 +3067,7 @@
           <a:p>
             <a:fld id="{78C97017-6FC3-485B-9764-EAC9E56C1D49}" type="datetimeFigureOut">
               <a:rPr lang="en-US" smtClean="0"/>
-              <a:t>11/10/2018</a:t>
+              <a:t>11/11/2018</a:t>
             </a:fld>
             <a:endParaRPr lang="en-US"/>
           </a:p>
@@ -3809,12 +3809,20 @@
           <a:p>
             <a:pPr algn="ctr"/>
             <a:r>
+              <a:rPr lang="en-US" sz="1600" dirty="0" err="1">
+                <a:solidFill>
+                  <a:schemeClr val="bg1"/>
+                </a:solidFill>
+              </a:rPr>
+              <a:t>fdc</a:t>
+            </a:r>
+            <a:r>
               <a:rPr lang="en-US" sz="1600" dirty="0">
                 <a:solidFill>
                   <a:schemeClr val="bg1"/>
                 </a:solidFill>
               </a:rPr>
-              <a:t>f: </a:t>
+              <a:t>: </a:t>
             </a:r>
             <a:r>
               <a:rPr lang="en-US" sz="1600" dirty="0" err="1">
@@ -4213,8 +4221,8 @@
         </p:nvSpPr>
         <p:spPr>
           <a:xfrm>
-            <a:off x="368982" y="4044188"/>
-            <a:ext cx="2114359" cy="184666"/>
+            <a:off x="229176" y="4053200"/>
+            <a:ext cx="2308026" cy="184666"/>
           </a:xfrm>
           <a:prstGeom prst="rect">
             <a:avLst/>
@@ -4248,7 +4256,7 @@
             </a:r>
             <a:r>
               <a:rPr lang="en-US" sz="1200" dirty="0" err="1"/>
-              <a:t>f.computeAppTitle</a:t>
+              <a:t>fdc.computeAppTitle</a:t>
             </a:r>
             <a:r>
               <a:rPr lang="en-US" sz="1200" dirty="0"/>

</xml_diff>